<commit_message>
update to PLAYTV PPT
</commit_message>
<xml_diff>
--- a/PLAYTV2020/rest-apis-intro.pptx
+++ b/PLAYTV2020/rest-apis-intro.pptx
@@ -5,73 +5,74 @@
     <p:sldMasterId id="2147483648" r:id="rId1"/>
   </p:sldMasterIdLst>
   <p:notesMasterIdLst>
-    <p:notesMasterId r:id="rId40"/>
+    <p:notesMasterId r:id="rId41"/>
   </p:notesMasterIdLst>
   <p:sldIdLst>
     <p:sldId id="256" r:id="rId2"/>
     <p:sldId id="260" r:id="rId3"/>
     <p:sldId id="261" r:id="rId4"/>
     <p:sldId id="285" r:id="rId5"/>
-    <p:sldId id="287" r:id="rId6"/>
-    <p:sldId id="290" r:id="rId7"/>
-    <p:sldId id="289" r:id="rId8"/>
-    <p:sldId id="291" r:id="rId9"/>
-    <p:sldId id="292" r:id="rId10"/>
-    <p:sldId id="293" r:id="rId11"/>
-    <p:sldId id="288" r:id="rId12"/>
-    <p:sldId id="257" r:id="rId13"/>
-    <p:sldId id="258" r:id="rId14"/>
-    <p:sldId id="259" r:id="rId15"/>
-    <p:sldId id="286" r:id="rId16"/>
-    <p:sldId id="262" r:id="rId17"/>
-    <p:sldId id="263" r:id="rId18"/>
-    <p:sldId id="264" r:id="rId19"/>
-    <p:sldId id="265" r:id="rId20"/>
-    <p:sldId id="266" r:id="rId21"/>
-    <p:sldId id="267" r:id="rId22"/>
-    <p:sldId id="268" r:id="rId23"/>
-    <p:sldId id="269" r:id="rId24"/>
-    <p:sldId id="270" r:id="rId25"/>
-    <p:sldId id="271" r:id="rId26"/>
-    <p:sldId id="272" r:id="rId27"/>
-    <p:sldId id="273" r:id="rId28"/>
-    <p:sldId id="274" r:id="rId29"/>
-    <p:sldId id="275" r:id="rId30"/>
-    <p:sldId id="276" r:id="rId31"/>
-    <p:sldId id="277" r:id="rId32"/>
-    <p:sldId id="278" r:id="rId33"/>
-    <p:sldId id="279" r:id="rId34"/>
-    <p:sldId id="280" r:id="rId35"/>
-    <p:sldId id="281" r:id="rId36"/>
-    <p:sldId id="282" r:id="rId37"/>
-    <p:sldId id="283" r:id="rId38"/>
-    <p:sldId id="284" r:id="rId39"/>
+    <p:sldId id="294" r:id="rId6"/>
+    <p:sldId id="287" r:id="rId7"/>
+    <p:sldId id="290" r:id="rId8"/>
+    <p:sldId id="289" r:id="rId9"/>
+    <p:sldId id="291" r:id="rId10"/>
+    <p:sldId id="292" r:id="rId11"/>
+    <p:sldId id="293" r:id="rId12"/>
+    <p:sldId id="288" r:id="rId13"/>
+    <p:sldId id="257" r:id="rId14"/>
+    <p:sldId id="258" r:id="rId15"/>
+    <p:sldId id="259" r:id="rId16"/>
+    <p:sldId id="286" r:id="rId17"/>
+    <p:sldId id="262" r:id="rId18"/>
+    <p:sldId id="263" r:id="rId19"/>
+    <p:sldId id="264" r:id="rId20"/>
+    <p:sldId id="265" r:id="rId21"/>
+    <p:sldId id="266" r:id="rId22"/>
+    <p:sldId id="267" r:id="rId23"/>
+    <p:sldId id="268" r:id="rId24"/>
+    <p:sldId id="269" r:id="rId25"/>
+    <p:sldId id="270" r:id="rId26"/>
+    <p:sldId id="271" r:id="rId27"/>
+    <p:sldId id="272" r:id="rId28"/>
+    <p:sldId id="273" r:id="rId29"/>
+    <p:sldId id="274" r:id="rId30"/>
+    <p:sldId id="275" r:id="rId31"/>
+    <p:sldId id="276" r:id="rId32"/>
+    <p:sldId id="277" r:id="rId33"/>
+    <p:sldId id="278" r:id="rId34"/>
+    <p:sldId id="279" r:id="rId35"/>
+    <p:sldId id="280" r:id="rId36"/>
+    <p:sldId id="281" r:id="rId37"/>
+    <p:sldId id="282" r:id="rId38"/>
+    <p:sldId id="283" r:id="rId39"/>
+    <p:sldId id="284" r:id="rId40"/>
   </p:sldIdLst>
   <p:sldSz cx="9144000" cy="5143500" type="screen16x9"/>
   <p:notesSz cx="6858000" cy="9144000"/>
   <p:embeddedFontLst>
     <p:embeddedFont>
       <p:font typeface="Arial Black" panose="020B0604020202020204" pitchFamily="34" charset="0"/>
-      <p:regular r:id="rId41"/>
+      <p:regular r:id="rId42"/>
     </p:embeddedFont>
     <p:embeddedFont>
       <p:font typeface="Montserrat" pitchFamily="2" charset="77"/>
-      <p:regular r:id="rId42"/>
-      <p:bold r:id="rId43"/>
-      <p:italic r:id="rId44"/>
-      <p:boldItalic r:id="rId45"/>
+      <p:regular r:id="rId43"/>
+      <p:bold r:id="rId44"/>
+      <p:italic r:id="rId45"/>
+      <p:boldItalic r:id="rId46"/>
     </p:embeddedFont>
     <p:embeddedFont>
       <p:font typeface="Montserrat ExtraBold" pitchFamily="2" charset="77"/>
-      <p:bold r:id="rId46"/>
-      <p:boldItalic r:id="rId47"/>
+      <p:bold r:id="rId47"/>
+      <p:boldItalic r:id="rId48"/>
     </p:embeddedFont>
     <p:embeddedFont>
       <p:font typeface="Montserrat Medium" pitchFamily="2" charset="77"/>
-      <p:regular r:id="rId48"/>
-      <p:bold r:id="rId49"/>
-      <p:italic r:id="rId50"/>
-      <p:boldItalic r:id="rId51"/>
+      <p:regular r:id="rId49"/>
+      <p:bold r:id="rId50"/>
+      <p:italic r:id="rId51"/>
+      <p:boldItalic r:id="rId52"/>
     </p:embeddedFont>
   </p:embeddedFontLst>
   <p:defaultTextStyle>
@@ -324,7 +325,7 @@
       </p15:sldGuideLst>
     </p:ext>
     <p:ext uri="http://customooxmlschemas.google.com/">
-      <go:slidesCustomData xmlns:go="http://customooxmlschemas.google.com/" xmlns:p15="http://schemas.microsoft.com/office/powerpoint/2012/main" xmlns:p14="http://schemas.microsoft.com/office/powerpoint/2010/main" xmlns:com="http://schemas.openxmlformats.org/drawingml/2006/compatibility" xmlns:pvml="urn:schemas-microsoft-com:office:powerpoint" xmlns:v="urn:schemas-microsoft-com:vml" xmlns:o="urn:schemas-microsoft-com:office:office" xmlns:dgm="http://schemas.openxmlformats.org/drawingml/2006/diagram" xmlns:c="http://schemas.openxmlformats.org/drawingml/2006/chart" xmlns:mv="urn:schemas-microsoft-com:mac:vml" xmlns:mc="http://schemas.openxmlformats.org/markup-compatibility/2006" xmlns="" r:id="rId52" roundtripDataSignature="AMtx7mgjmAWfAKicwO+rWd93JIWStvokbQ=="/>
+      <go:slidesCustomData xmlns="" xmlns:mc="http://schemas.openxmlformats.org/markup-compatibility/2006" xmlns:mv="urn:schemas-microsoft-com:mac:vml" xmlns:c="http://schemas.openxmlformats.org/drawingml/2006/chart" xmlns:dgm="http://schemas.openxmlformats.org/drawingml/2006/diagram" xmlns:o="urn:schemas-microsoft-com:office:office" xmlns:v="urn:schemas-microsoft-com:vml" xmlns:pvml="urn:schemas-microsoft-com:office:powerpoint" xmlns:com="http://schemas.openxmlformats.org/drawingml/2006/compatibility" xmlns:p14="http://schemas.microsoft.com/office/powerpoint/2010/main" xmlns:p15="http://schemas.microsoft.com/office/powerpoint/2012/main" xmlns:go="http://customooxmlschemas.google.com/" r:id="rId53" roundtripDataSignature="AMtx7mgjmAWfAKicwO+rWd93JIWStvokbQ=="/>
     </p:ext>
   </p:extLst>
 </p:presentation>
@@ -8376,6 +8377,115 @@
     </p:spTree>
     <p:extLst>
       <p:ext uri="{BB962C8B-B14F-4D97-AF65-F5344CB8AC3E}">
+        <p14:creationId xmlns:p14="http://schemas.microsoft.com/office/powerpoint/2010/main" val="4072977937"/>
+      </p:ext>
+    </p:extLst>
+  </p:cSld>
+  <p:clrMapOvr>
+    <a:masterClrMapping/>
+  </p:clrMapOvr>
+</p:notes>
+</file>
+
+<file path=ppt/notesSlides/notesSlide11.xml><?xml version="1.0" encoding="utf-8"?>
+<p:notes xmlns:a="http://schemas.openxmlformats.org/drawingml/2006/main" xmlns:r="http://schemas.openxmlformats.org/officeDocument/2006/relationships" xmlns:p="http://schemas.openxmlformats.org/presentationml/2006/main" showMasterSp="0" showMasterPhAnim="0">
+  <p:cSld>
+    <p:spTree>
+      <p:nvGrpSpPr>
+        <p:cNvPr id="1" name="Shape 207"/>
+        <p:cNvGrpSpPr/>
+        <p:nvPr/>
+      </p:nvGrpSpPr>
+      <p:grpSpPr>
+        <a:xfrm>
+          <a:off x="0" y="0"/>
+          <a:ext cx="0" cy="0"/>
+          <a:chOff x="0" y="0"/>
+          <a:chExt cx="0" cy="0"/>
+        </a:xfrm>
+      </p:grpSpPr>
+      <p:sp>
+        <p:nvSpPr>
+          <p:cNvPr id="208" name="Google Shape;208;p11:notes"/>
+          <p:cNvSpPr txBox="1">
+            <a:spLocks noGrp="1"/>
+          </p:cNvSpPr>
+          <p:nvPr>
+            <p:ph type="body" idx="1"/>
+          </p:nvPr>
+        </p:nvSpPr>
+        <p:spPr>
+          <a:xfrm>
+            <a:off x="685800" y="4400550"/>
+            <a:ext cx="5486400" cy="3600450"/>
+          </a:xfrm>
+          <a:prstGeom prst="rect">
+            <a:avLst/>
+          </a:prstGeom>
+        </p:spPr>
+        <p:txBody>
+          <a:bodyPr spcFirstLastPara="1" wrap="square" lIns="91425" tIns="45700" rIns="91425" bIns="45700" anchor="t" anchorCtr="0">
+            <a:noAutofit/>
+          </a:bodyPr>
+          <a:lstStyle/>
+          <a:p>
+            <a:pPr marL="0" lvl="0" indent="0" algn="l" rtl="0">
+              <a:spcBef>
+                <a:spcPts val="0"/>
+              </a:spcBef>
+              <a:spcAft>
+                <a:spcPts val="0"/>
+              </a:spcAft>
+              <a:buNone/>
+            </a:pPr>
+            <a:endParaRPr/>
+          </a:p>
+        </p:txBody>
+      </p:sp>
+      <p:sp>
+        <p:nvSpPr>
+          <p:cNvPr id="209" name="Google Shape;209;p11:notes"/>
+          <p:cNvSpPr>
+            <a:spLocks noGrp="1" noRot="1" noChangeAspect="1"/>
+          </p:cNvSpPr>
+          <p:nvPr>
+            <p:ph type="sldImg" idx="2"/>
+          </p:nvPr>
+        </p:nvSpPr>
+        <p:spPr>
+          <a:xfrm>
+            <a:off x="685800" y="1143000"/>
+            <a:ext cx="5486400" cy="3086100"/>
+          </a:xfrm>
+          <a:custGeom>
+            <a:avLst/>
+            <a:gdLst/>
+            <a:ahLst/>
+            <a:cxnLst/>
+            <a:rect l="l" t="t" r="r" b="b"/>
+            <a:pathLst>
+              <a:path w="120000" h="120000" extrusionOk="0">
+                <a:moveTo>
+                  <a:pt x="0" y="0"/>
+                </a:moveTo>
+                <a:lnTo>
+                  <a:pt x="120000" y="0"/>
+                </a:lnTo>
+                <a:lnTo>
+                  <a:pt x="120000" y="120000"/>
+                </a:lnTo>
+                <a:lnTo>
+                  <a:pt x="0" y="120000"/>
+                </a:lnTo>
+                <a:close/>
+              </a:path>
+            </a:pathLst>
+          </a:custGeom>
+        </p:spPr>
+      </p:sp>
+    </p:spTree>
+    <p:extLst>
+      <p:ext uri="{BB962C8B-B14F-4D97-AF65-F5344CB8AC3E}">
         <p14:creationId xmlns:p14="http://schemas.microsoft.com/office/powerpoint/2010/main" val="3724564808"/>
       </p:ext>
     </p:extLst>
@@ -8386,7 +8496,7 @@
 </p:notes>
 </file>
 
-<file path=ppt/notesSlides/notesSlide11.xml><?xml version="1.0" encoding="utf-8"?>
+<file path=ppt/notesSlides/notesSlide12.xml><?xml version="1.0" encoding="utf-8"?>
 <p:notes xmlns:a="http://schemas.openxmlformats.org/drawingml/2006/main" xmlns:r="http://schemas.openxmlformats.org/officeDocument/2006/relationships" xmlns:p="http://schemas.openxmlformats.org/presentationml/2006/main" showMasterSp="0" showMasterPhAnim="0">
   <p:cSld>
     <p:spTree>
@@ -8495,7 +8605,7 @@
 </p:notes>
 </file>
 
-<file path=ppt/notesSlides/notesSlide12.xml><?xml version="1.0" encoding="utf-8"?>
+<file path=ppt/notesSlides/notesSlide13.xml><?xml version="1.0" encoding="utf-8"?>
 <p:notes xmlns:a="http://schemas.openxmlformats.org/drawingml/2006/main" xmlns:r="http://schemas.openxmlformats.org/officeDocument/2006/relationships" xmlns:p="http://schemas.openxmlformats.org/presentationml/2006/main" showMasterSp="0" showMasterPhAnim="0">
   <p:cSld>
     <p:spTree>
@@ -8599,7 +8709,7 @@
 </p:notes>
 </file>
 
-<file path=ppt/notesSlides/notesSlide13.xml><?xml version="1.0" encoding="utf-8"?>
+<file path=ppt/notesSlides/notesSlide14.xml><?xml version="1.0" encoding="utf-8"?>
 <p:notes xmlns:a="http://schemas.openxmlformats.org/drawingml/2006/main" xmlns:r="http://schemas.openxmlformats.org/officeDocument/2006/relationships" xmlns:p="http://schemas.openxmlformats.org/presentationml/2006/main" showMasterSp="0" showMasterPhAnim="0">
   <p:cSld>
     <p:spTree>
@@ -8703,7 +8813,7 @@
 </p:notes>
 </file>
 
-<file path=ppt/notesSlides/notesSlide14.xml><?xml version="1.0" encoding="utf-8"?>
+<file path=ppt/notesSlides/notesSlide15.xml><?xml version="1.0" encoding="utf-8"?>
 <p:notes xmlns:a="http://schemas.openxmlformats.org/drawingml/2006/main" xmlns:r="http://schemas.openxmlformats.org/officeDocument/2006/relationships" xmlns:p="http://schemas.openxmlformats.org/presentationml/2006/main" showMasterSp="0" showMasterPhAnim="0">
   <p:cSld>
     <p:spTree>
@@ -8807,7 +8917,7 @@
 </p:notes>
 </file>
 
-<file path=ppt/notesSlides/notesSlide15.xml><?xml version="1.0" encoding="utf-8"?>
+<file path=ppt/notesSlides/notesSlide16.xml><?xml version="1.0" encoding="utf-8"?>
 <p:notes xmlns:a="http://schemas.openxmlformats.org/drawingml/2006/main" xmlns:r="http://schemas.openxmlformats.org/officeDocument/2006/relationships" xmlns:p="http://schemas.openxmlformats.org/presentationml/2006/main" showMasterSp="0" showMasterPhAnim="0">
   <p:cSld>
     <p:spTree>
@@ -8916,7 +9026,7 @@
 </p:notes>
 </file>
 
-<file path=ppt/notesSlides/notesSlide16.xml><?xml version="1.0" encoding="utf-8"?>
+<file path=ppt/notesSlides/notesSlide17.xml><?xml version="1.0" encoding="utf-8"?>
 <p:notes xmlns:a="http://schemas.openxmlformats.org/drawingml/2006/main" xmlns:r="http://schemas.openxmlformats.org/officeDocument/2006/relationships" xmlns:p="http://schemas.openxmlformats.org/presentationml/2006/main" showMasterSp="0" showMasterPhAnim="0">
   <p:cSld>
     <p:spTree>
@@ -9020,7 +9130,7 @@
 </p:notes>
 </file>
 
-<file path=ppt/notesSlides/notesSlide17.xml><?xml version="1.0" encoding="utf-8"?>
+<file path=ppt/notesSlides/notesSlide18.xml><?xml version="1.0" encoding="utf-8"?>
 <p:notes xmlns:a="http://schemas.openxmlformats.org/drawingml/2006/main" xmlns:r="http://schemas.openxmlformats.org/officeDocument/2006/relationships" xmlns:p="http://schemas.openxmlformats.org/presentationml/2006/main" showMasterSp="0" showMasterPhAnim="0">
   <p:cSld>
     <p:spTree>
@@ -9124,7 +9234,7 @@
 </p:notes>
 </file>
 
-<file path=ppt/notesSlides/notesSlide18.xml><?xml version="1.0" encoding="utf-8"?>
+<file path=ppt/notesSlides/notesSlide19.xml><?xml version="1.0" encoding="utf-8"?>
 <p:notes xmlns:a="http://schemas.openxmlformats.org/drawingml/2006/main" xmlns:r="http://schemas.openxmlformats.org/officeDocument/2006/relationships" xmlns:p="http://schemas.openxmlformats.org/presentationml/2006/main" showMasterSp="0" showMasterPhAnim="0">
   <p:cSld>
     <p:spTree>
@@ -9182,110 +9292,6 @@
       <p:sp>
         <p:nvSpPr>
           <p:cNvPr id="196" name="Google Shape;196;p9:notes"/>
-          <p:cNvSpPr>
-            <a:spLocks noGrp="1" noRot="1" noChangeAspect="1"/>
-          </p:cNvSpPr>
-          <p:nvPr>
-            <p:ph type="sldImg" idx="2"/>
-          </p:nvPr>
-        </p:nvSpPr>
-        <p:spPr>
-          <a:xfrm>
-            <a:off x="685800" y="1143000"/>
-            <a:ext cx="5486400" cy="3086100"/>
-          </a:xfrm>
-          <a:custGeom>
-            <a:avLst/>
-            <a:gdLst/>
-            <a:ahLst/>
-            <a:cxnLst/>
-            <a:rect l="l" t="t" r="r" b="b"/>
-            <a:pathLst>
-              <a:path w="120000" h="120000" extrusionOk="0">
-                <a:moveTo>
-                  <a:pt x="0" y="0"/>
-                </a:moveTo>
-                <a:lnTo>
-                  <a:pt x="120000" y="0"/>
-                </a:lnTo>
-                <a:lnTo>
-                  <a:pt x="120000" y="120000"/>
-                </a:lnTo>
-                <a:lnTo>
-                  <a:pt x="0" y="120000"/>
-                </a:lnTo>
-                <a:close/>
-              </a:path>
-            </a:pathLst>
-          </a:custGeom>
-        </p:spPr>
-      </p:sp>
-    </p:spTree>
-  </p:cSld>
-  <p:clrMapOvr>
-    <a:masterClrMapping/>
-  </p:clrMapOvr>
-</p:notes>
-</file>
-
-<file path=ppt/notesSlides/notesSlide19.xml><?xml version="1.0" encoding="utf-8"?>
-<p:notes xmlns:a="http://schemas.openxmlformats.org/drawingml/2006/main" xmlns:r="http://schemas.openxmlformats.org/officeDocument/2006/relationships" xmlns:p="http://schemas.openxmlformats.org/presentationml/2006/main" showMasterSp="0" showMasterPhAnim="0">
-  <p:cSld>
-    <p:spTree>
-      <p:nvGrpSpPr>
-        <p:cNvPr id="1" name="Shape 200"/>
-        <p:cNvGrpSpPr/>
-        <p:nvPr/>
-      </p:nvGrpSpPr>
-      <p:grpSpPr>
-        <a:xfrm>
-          <a:off x="0" y="0"/>
-          <a:ext cx="0" cy="0"/>
-          <a:chOff x="0" y="0"/>
-          <a:chExt cx="0" cy="0"/>
-        </a:xfrm>
-      </p:grpSpPr>
-      <p:sp>
-        <p:nvSpPr>
-          <p:cNvPr id="201" name="Google Shape;201;p10:notes"/>
-          <p:cNvSpPr txBox="1">
-            <a:spLocks noGrp="1"/>
-          </p:cNvSpPr>
-          <p:nvPr>
-            <p:ph type="body" idx="1"/>
-          </p:nvPr>
-        </p:nvSpPr>
-        <p:spPr>
-          <a:xfrm>
-            <a:off x="685800" y="4400550"/>
-            <a:ext cx="5486400" cy="3600450"/>
-          </a:xfrm>
-          <a:prstGeom prst="rect">
-            <a:avLst/>
-          </a:prstGeom>
-        </p:spPr>
-        <p:txBody>
-          <a:bodyPr spcFirstLastPara="1" wrap="square" lIns="91425" tIns="45700" rIns="91425" bIns="45700" anchor="t" anchorCtr="0">
-            <a:noAutofit/>
-          </a:bodyPr>
-          <a:lstStyle/>
-          <a:p>
-            <a:pPr marL="0" lvl="0" indent="0" algn="l" rtl="0">
-              <a:spcBef>
-                <a:spcPts val="0"/>
-              </a:spcBef>
-              <a:spcAft>
-                <a:spcPts val="0"/>
-              </a:spcAft>
-              <a:buNone/>
-            </a:pPr>
-            <a:endParaRPr/>
-          </a:p>
-        </p:txBody>
-      </p:sp>
-      <p:sp>
-        <p:nvSpPr>
-          <p:cNvPr id="202" name="Google Shape;202;p10:notes"/>
           <p:cNvSpPr>
             <a:spLocks noGrp="1" noRot="1" noChangeAspect="1"/>
           </p:cNvSpPr>
@@ -9441,6 +9447,110 @@
   <p:cSld>
     <p:spTree>
       <p:nvGrpSpPr>
+        <p:cNvPr id="1" name="Shape 200"/>
+        <p:cNvGrpSpPr/>
+        <p:nvPr/>
+      </p:nvGrpSpPr>
+      <p:grpSpPr>
+        <a:xfrm>
+          <a:off x="0" y="0"/>
+          <a:ext cx="0" cy="0"/>
+          <a:chOff x="0" y="0"/>
+          <a:chExt cx="0" cy="0"/>
+        </a:xfrm>
+      </p:grpSpPr>
+      <p:sp>
+        <p:nvSpPr>
+          <p:cNvPr id="201" name="Google Shape;201;p10:notes"/>
+          <p:cNvSpPr txBox="1">
+            <a:spLocks noGrp="1"/>
+          </p:cNvSpPr>
+          <p:nvPr>
+            <p:ph type="body" idx="1"/>
+          </p:nvPr>
+        </p:nvSpPr>
+        <p:spPr>
+          <a:xfrm>
+            <a:off x="685800" y="4400550"/>
+            <a:ext cx="5486400" cy="3600450"/>
+          </a:xfrm>
+          <a:prstGeom prst="rect">
+            <a:avLst/>
+          </a:prstGeom>
+        </p:spPr>
+        <p:txBody>
+          <a:bodyPr spcFirstLastPara="1" wrap="square" lIns="91425" tIns="45700" rIns="91425" bIns="45700" anchor="t" anchorCtr="0">
+            <a:noAutofit/>
+          </a:bodyPr>
+          <a:lstStyle/>
+          <a:p>
+            <a:pPr marL="0" lvl="0" indent="0" algn="l" rtl="0">
+              <a:spcBef>
+                <a:spcPts val="0"/>
+              </a:spcBef>
+              <a:spcAft>
+                <a:spcPts val="0"/>
+              </a:spcAft>
+              <a:buNone/>
+            </a:pPr>
+            <a:endParaRPr/>
+          </a:p>
+        </p:txBody>
+      </p:sp>
+      <p:sp>
+        <p:nvSpPr>
+          <p:cNvPr id="202" name="Google Shape;202;p10:notes"/>
+          <p:cNvSpPr>
+            <a:spLocks noGrp="1" noRot="1" noChangeAspect="1"/>
+          </p:cNvSpPr>
+          <p:nvPr>
+            <p:ph type="sldImg" idx="2"/>
+          </p:nvPr>
+        </p:nvSpPr>
+        <p:spPr>
+          <a:xfrm>
+            <a:off x="685800" y="1143000"/>
+            <a:ext cx="5486400" cy="3086100"/>
+          </a:xfrm>
+          <a:custGeom>
+            <a:avLst/>
+            <a:gdLst/>
+            <a:ahLst/>
+            <a:cxnLst/>
+            <a:rect l="l" t="t" r="r" b="b"/>
+            <a:pathLst>
+              <a:path w="120000" h="120000" extrusionOk="0">
+                <a:moveTo>
+                  <a:pt x="0" y="0"/>
+                </a:moveTo>
+                <a:lnTo>
+                  <a:pt x="120000" y="0"/>
+                </a:lnTo>
+                <a:lnTo>
+                  <a:pt x="120000" y="120000"/>
+                </a:lnTo>
+                <a:lnTo>
+                  <a:pt x="0" y="120000"/>
+                </a:lnTo>
+                <a:close/>
+              </a:path>
+            </a:pathLst>
+          </a:custGeom>
+        </p:spPr>
+      </p:sp>
+    </p:spTree>
+  </p:cSld>
+  <p:clrMapOvr>
+    <a:masterClrMapping/>
+  </p:clrMapOvr>
+</p:notes>
+</file>
+
+<file path=ppt/notesSlides/notesSlide21.xml><?xml version="1.0" encoding="utf-8"?>
+<p:notes xmlns:a="http://schemas.openxmlformats.org/drawingml/2006/main" xmlns:r="http://schemas.openxmlformats.org/officeDocument/2006/relationships" xmlns:p="http://schemas.openxmlformats.org/presentationml/2006/main" showMasterSp="0" showMasterPhAnim="0">
+  <p:cSld>
+    <p:spTree>
+      <p:nvGrpSpPr>
         <p:cNvPr id="1" name="Shape 207"/>
         <p:cNvGrpSpPr/>
         <p:nvPr/>
@@ -9540,7 +9650,7 @@
 </p:notes>
 </file>
 
-<file path=ppt/notesSlides/notesSlide21.xml><?xml version="1.0" encoding="utf-8"?>
+<file path=ppt/notesSlides/notesSlide22.xml><?xml version="1.0" encoding="utf-8"?>
 <p:notes xmlns:a="http://schemas.openxmlformats.org/drawingml/2006/main" xmlns:r="http://schemas.openxmlformats.org/officeDocument/2006/relationships" xmlns:p="http://schemas.openxmlformats.org/presentationml/2006/main" showMasterSp="0" showMasterPhAnim="0">
   <p:cSld>
     <p:spTree>
@@ -9644,7 +9754,7 @@
 </p:notes>
 </file>
 
-<file path=ppt/notesSlides/notesSlide22.xml><?xml version="1.0" encoding="utf-8"?>
+<file path=ppt/notesSlides/notesSlide23.xml><?xml version="1.0" encoding="utf-8"?>
 <p:notes xmlns:a="http://schemas.openxmlformats.org/drawingml/2006/main" xmlns:r="http://schemas.openxmlformats.org/officeDocument/2006/relationships" xmlns:p="http://schemas.openxmlformats.org/presentationml/2006/main" showMasterSp="0" showMasterPhAnim="0">
   <p:cSld>
     <p:spTree>
@@ -9748,7 +9858,7 @@
 </p:notes>
 </file>
 
-<file path=ppt/notesSlides/notesSlide23.xml><?xml version="1.0" encoding="utf-8"?>
+<file path=ppt/notesSlides/notesSlide24.xml><?xml version="1.0" encoding="utf-8"?>
 <p:notes xmlns:a="http://schemas.openxmlformats.org/drawingml/2006/main" xmlns:r="http://schemas.openxmlformats.org/officeDocument/2006/relationships" xmlns:p="http://schemas.openxmlformats.org/presentationml/2006/main" showMasterSp="0" showMasterPhAnim="0">
   <p:cSld>
     <p:spTree>
@@ -9852,7 +9962,7 @@
 </p:notes>
 </file>
 
-<file path=ppt/notesSlides/notesSlide24.xml><?xml version="1.0" encoding="utf-8"?>
+<file path=ppt/notesSlides/notesSlide25.xml><?xml version="1.0" encoding="utf-8"?>
 <p:notes xmlns:a="http://schemas.openxmlformats.org/drawingml/2006/main" xmlns:r="http://schemas.openxmlformats.org/officeDocument/2006/relationships" xmlns:p="http://schemas.openxmlformats.org/presentationml/2006/main" showMasterSp="0" showMasterPhAnim="0">
   <p:cSld>
     <p:spTree>
@@ -9956,7 +10066,7 @@
 </p:notes>
 </file>
 
-<file path=ppt/notesSlides/notesSlide25.xml><?xml version="1.0" encoding="utf-8"?>
+<file path=ppt/notesSlides/notesSlide26.xml><?xml version="1.0" encoding="utf-8"?>
 <p:notes xmlns:a="http://schemas.openxmlformats.org/drawingml/2006/main" xmlns:r="http://schemas.openxmlformats.org/officeDocument/2006/relationships" xmlns:p="http://schemas.openxmlformats.org/presentationml/2006/main" showMasterSp="0" showMasterPhAnim="0">
   <p:cSld>
     <p:spTree>
@@ -10060,7 +10170,7 @@
 </p:notes>
 </file>
 
-<file path=ppt/notesSlides/notesSlide26.xml><?xml version="1.0" encoding="utf-8"?>
+<file path=ppt/notesSlides/notesSlide27.xml><?xml version="1.0" encoding="utf-8"?>
 <p:notes xmlns:a="http://schemas.openxmlformats.org/drawingml/2006/main" xmlns:r="http://schemas.openxmlformats.org/officeDocument/2006/relationships" xmlns:p="http://schemas.openxmlformats.org/presentationml/2006/main" showMasterSp="0" showMasterPhAnim="0">
   <p:cSld>
     <p:spTree>
@@ -10164,7 +10274,7 @@
 </p:notes>
 </file>
 
-<file path=ppt/notesSlides/notesSlide27.xml><?xml version="1.0" encoding="utf-8"?>
+<file path=ppt/notesSlides/notesSlide28.xml><?xml version="1.0" encoding="utf-8"?>
 <p:notes xmlns:a="http://schemas.openxmlformats.org/drawingml/2006/main" xmlns:r="http://schemas.openxmlformats.org/officeDocument/2006/relationships" xmlns:p="http://schemas.openxmlformats.org/presentationml/2006/main" showMasterSp="0" showMasterPhAnim="0">
   <p:cSld>
     <p:spTree>
@@ -10268,7 +10378,7 @@
 </p:notes>
 </file>
 
-<file path=ppt/notesSlides/notesSlide28.xml><?xml version="1.0" encoding="utf-8"?>
+<file path=ppt/notesSlides/notesSlide29.xml><?xml version="1.0" encoding="utf-8"?>
 <p:notes xmlns:a="http://schemas.openxmlformats.org/drawingml/2006/main" xmlns:r="http://schemas.openxmlformats.org/officeDocument/2006/relationships" xmlns:p="http://schemas.openxmlformats.org/presentationml/2006/main" showMasterSp="0" showMasterPhAnim="0">
   <p:cSld>
     <p:spTree>
@@ -10372,7 +10482,111 @@
 </p:notes>
 </file>
 
-<file path=ppt/notesSlides/notesSlide29.xml><?xml version="1.0" encoding="utf-8"?>
+<file path=ppt/notesSlides/notesSlide3.xml><?xml version="1.0" encoding="utf-8"?>
+<p:notes xmlns:a="http://schemas.openxmlformats.org/drawingml/2006/main" xmlns:r="http://schemas.openxmlformats.org/officeDocument/2006/relationships" xmlns:p="http://schemas.openxmlformats.org/presentationml/2006/main" showMasterSp="0" showMasterPhAnim="0">
+  <p:cSld>
+    <p:spTree>
+      <p:nvGrpSpPr>
+        <p:cNvPr id="1" name="Shape 168"/>
+        <p:cNvGrpSpPr/>
+        <p:nvPr/>
+      </p:nvGrpSpPr>
+      <p:grpSpPr>
+        <a:xfrm>
+          <a:off x="0" y="0"/>
+          <a:ext cx="0" cy="0"/>
+          <a:chOff x="0" y="0"/>
+          <a:chExt cx="0" cy="0"/>
+        </a:xfrm>
+      </p:grpSpPr>
+      <p:sp>
+        <p:nvSpPr>
+          <p:cNvPr id="169" name="Google Shape;169;p6:notes"/>
+          <p:cNvSpPr txBox="1">
+            <a:spLocks noGrp="1"/>
+          </p:cNvSpPr>
+          <p:nvPr>
+            <p:ph type="body" idx="1"/>
+          </p:nvPr>
+        </p:nvSpPr>
+        <p:spPr>
+          <a:xfrm>
+            <a:off x="685800" y="4400550"/>
+            <a:ext cx="5486400" cy="3600450"/>
+          </a:xfrm>
+          <a:prstGeom prst="rect">
+            <a:avLst/>
+          </a:prstGeom>
+        </p:spPr>
+        <p:txBody>
+          <a:bodyPr spcFirstLastPara="1" wrap="square" lIns="91425" tIns="45700" rIns="91425" bIns="45700" anchor="t" anchorCtr="0">
+            <a:noAutofit/>
+          </a:bodyPr>
+          <a:lstStyle/>
+          <a:p>
+            <a:pPr marL="0" lvl="0" indent="0" algn="l" rtl="0">
+              <a:spcBef>
+                <a:spcPts val="0"/>
+              </a:spcBef>
+              <a:spcAft>
+                <a:spcPts val="0"/>
+              </a:spcAft>
+              <a:buNone/>
+            </a:pPr>
+            <a:endParaRPr/>
+          </a:p>
+        </p:txBody>
+      </p:sp>
+      <p:sp>
+        <p:nvSpPr>
+          <p:cNvPr id="170" name="Google Shape;170;p6:notes"/>
+          <p:cNvSpPr>
+            <a:spLocks noGrp="1" noRot="1" noChangeAspect="1"/>
+          </p:cNvSpPr>
+          <p:nvPr>
+            <p:ph type="sldImg" idx="2"/>
+          </p:nvPr>
+        </p:nvSpPr>
+        <p:spPr>
+          <a:xfrm>
+            <a:off x="685800" y="1143000"/>
+            <a:ext cx="5486400" cy="3086100"/>
+          </a:xfrm>
+          <a:custGeom>
+            <a:avLst/>
+            <a:gdLst/>
+            <a:ahLst/>
+            <a:cxnLst/>
+            <a:rect l="l" t="t" r="r" b="b"/>
+            <a:pathLst>
+              <a:path w="120000" h="120000" extrusionOk="0">
+                <a:moveTo>
+                  <a:pt x="0" y="0"/>
+                </a:moveTo>
+                <a:lnTo>
+                  <a:pt x="120000" y="0"/>
+                </a:lnTo>
+                <a:lnTo>
+                  <a:pt x="120000" y="120000"/>
+                </a:lnTo>
+                <a:lnTo>
+                  <a:pt x="0" y="120000"/>
+                </a:lnTo>
+                <a:close/>
+              </a:path>
+            </a:pathLst>
+          </a:custGeom>
+        </p:spPr>
+      </p:sp>
+    </p:spTree>
+  </p:cSld>
+  <p:clrMapOvr>
+    <a:masterClrMapping/>
+  </p:clrMapOvr>
+</p:notes>
+</file>
+
+<file path=ppt/notesSlides/notesSlide30.xml><?xml version="1.0" encoding="utf-8"?>
 <p:notes xmlns:a="http://schemas.openxmlformats.org/drawingml/2006/main" xmlns:r="http://schemas.openxmlformats.org/officeDocument/2006/relationships" xmlns:p="http://schemas.openxmlformats.org/presentationml/2006/main" showMasterSp="0" showMasterPhAnim="0">
   <p:cSld>
     <p:spTree>
@@ -10522,7 +10736,7 @@
             </a:pPr>
             <a:fld id="{00000000-1234-1234-1234-123412341234}" type="slidenum">
               <a:rPr lang="en-US"/>
-              <a:t>29</a:t>
+              <a:t>30</a:t>
             </a:fld>
             <a:endParaRPr/>
           </a:p>
@@ -10536,111 +10750,7 @@
 </p:notes>
 </file>
 
-<file path=ppt/notesSlides/notesSlide3.xml><?xml version="1.0" encoding="utf-8"?>
-<p:notes xmlns:a="http://schemas.openxmlformats.org/drawingml/2006/main" xmlns:r="http://schemas.openxmlformats.org/officeDocument/2006/relationships" xmlns:p="http://schemas.openxmlformats.org/presentationml/2006/main" showMasterSp="0" showMasterPhAnim="0">
-  <p:cSld>
-    <p:spTree>
-      <p:nvGrpSpPr>
-        <p:cNvPr id="1" name="Shape 168"/>
-        <p:cNvGrpSpPr/>
-        <p:nvPr/>
-      </p:nvGrpSpPr>
-      <p:grpSpPr>
-        <a:xfrm>
-          <a:off x="0" y="0"/>
-          <a:ext cx="0" cy="0"/>
-          <a:chOff x="0" y="0"/>
-          <a:chExt cx="0" cy="0"/>
-        </a:xfrm>
-      </p:grpSpPr>
-      <p:sp>
-        <p:nvSpPr>
-          <p:cNvPr id="169" name="Google Shape;169;p6:notes"/>
-          <p:cNvSpPr txBox="1">
-            <a:spLocks noGrp="1"/>
-          </p:cNvSpPr>
-          <p:nvPr>
-            <p:ph type="body" idx="1"/>
-          </p:nvPr>
-        </p:nvSpPr>
-        <p:spPr>
-          <a:xfrm>
-            <a:off x="685800" y="4400550"/>
-            <a:ext cx="5486400" cy="3600450"/>
-          </a:xfrm>
-          <a:prstGeom prst="rect">
-            <a:avLst/>
-          </a:prstGeom>
-        </p:spPr>
-        <p:txBody>
-          <a:bodyPr spcFirstLastPara="1" wrap="square" lIns="91425" tIns="45700" rIns="91425" bIns="45700" anchor="t" anchorCtr="0">
-            <a:noAutofit/>
-          </a:bodyPr>
-          <a:lstStyle/>
-          <a:p>
-            <a:pPr marL="0" lvl="0" indent="0" algn="l" rtl="0">
-              <a:spcBef>
-                <a:spcPts val="0"/>
-              </a:spcBef>
-              <a:spcAft>
-                <a:spcPts val="0"/>
-              </a:spcAft>
-              <a:buNone/>
-            </a:pPr>
-            <a:endParaRPr/>
-          </a:p>
-        </p:txBody>
-      </p:sp>
-      <p:sp>
-        <p:nvSpPr>
-          <p:cNvPr id="170" name="Google Shape;170;p6:notes"/>
-          <p:cNvSpPr>
-            <a:spLocks noGrp="1" noRot="1" noChangeAspect="1"/>
-          </p:cNvSpPr>
-          <p:nvPr>
-            <p:ph type="sldImg" idx="2"/>
-          </p:nvPr>
-        </p:nvSpPr>
-        <p:spPr>
-          <a:xfrm>
-            <a:off x="685800" y="1143000"/>
-            <a:ext cx="5486400" cy="3086100"/>
-          </a:xfrm>
-          <a:custGeom>
-            <a:avLst/>
-            <a:gdLst/>
-            <a:ahLst/>
-            <a:cxnLst/>
-            <a:rect l="l" t="t" r="r" b="b"/>
-            <a:pathLst>
-              <a:path w="120000" h="120000" extrusionOk="0">
-                <a:moveTo>
-                  <a:pt x="0" y="0"/>
-                </a:moveTo>
-                <a:lnTo>
-                  <a:pt x="120000" y="0"/>
-                </a:lnTo>
-                <a:lnTo>
-                  <a:pt x="120000" y="120000"/>
-                </a:lnTo>
-                <a:lnTo>
-                  <a:pt x="0" y="120000"/>
-                </a:lnTo>
-                <a:close/>
-              </a:path>
-            </a:pathLst>
-          </a:custGeom>
-        </p:spPr>
-      </p:sp>
-    </p:spTree>
-  </p:cSld>
-  <p:clrMapOvr>
-    <a:masterClrMapping/>
-  </p:clrMapOvr>
-</p:notes>
-</file>
-
-<file path=ppt/notesSlides/notesSlide30.xml><?xml version="1.0" encoding="utf-8"?>
+<file path=ppt/notesSlides/notesSlide31.xml><?xml version="1.0" encoding="utf-8"?>
 <p:notes xmlns:a="http://schemas.openxmlformats.org/drawingml/2006/main" xmlns:r="http://schemas.openxmlformats.org/officeDocument/2006/relationships" xmlns:p="http://schemas.openxmlformats.org/presentationml/2006/main" showMasterSp="0" showMasterPhAnim="0">
   <p:cSld>
     <p:spTree>
@@ -10790,7 +10900,7 @@
             </a:pPr>
             <a:fld id="{00000000-1234-1234-1234-123412341234}" type="slidenum">
               <a:rPr lang="en-US"/>
-              <a:t>30</a:t>
+              <a:t>31</a:t>
             </a:fld>
             <a:endParaRPr/>
           </a:p>
@@ -10804,7 +10914,7 @@
 </p:notes>
 </file>
 
-<file path=ppt/notesSlides/notesSlide31.xml><?xml version="1.0" encoding="utf-8"?>
+<file path=ppt/notesSlides/notesSlide32.xml><?xml version="1.0" encoding="utf-8"?>
 <p:notes xmlns:a="http://schemas.openxmlformats.org/drawingml/2006/main" xmlns:r="http://schemas.openxmlformats.org/officeDocument/2006/relationships" xmlns:p="http://schemas.openxmlformats.org/presentationml/2006/main" showMasterSp="0" showMasterPhAnim="0">
   <p:cSld>
     <p:spTree>
@@ -10908,7 +11018,7 @@
 </p:notes>
 </file>
 
-<file path=ppt/notesSlides/notesSlide32.xml><?xml version="1.0" encoding="utf-8"?>
+<file path=ppt/notesSlides/notesSlide33.xml><?xml version="1.0" encoding="utf-8"?>
 <p:notes xmlns:a="http://schemas.openxmlformats.org/drawingml/2006/main" xmlns:r="http://schemas.openxmlformats.org/officeDocument/2006/relationships" xmlns:p="http://schemas.openxmlformats.org/presentationml/2006/main" showMasterSp="0" showMasterPhAnim="0">
   <p:cSld>
     <p:spTree>
@@ -11012,7 +11122,7 @@
 </p:notes>
 </file>
 
-<file path=ppt/notesSlides/notesSlide33.xml><?xml version="1.0" encoding="utf-8"?>
+<file path=ppt/notesSlides/notesSlide34.xml><?xml version="1.0" encoding="utf-8"?>
 <p:notes xmlns:a="http://schemas.openxmlformats.org/drawingml/2006/main" xmlns:r="http://schemas.openxmlformats.org/officeDocument/2006/relationships" xmlns:p="http://schemas.openxmlformats.org/presentationml/2006/main" showMasterSp="0" showMasterPhAnim="0">
   <p:cSld>
     <p:spTree>
@@ -11116,7 +11226,7 @@
 </p:notes>
 </file>
 
-<file path=ppt/notesSlides/notesSlide34.xml><?xml version="1.0" encoding="utf-8"?>
+<file path=ppt/notesSlides/notesSlide35.xml><?xml version="1.0" encoding="utf-8"?>
 <p:notes xmlns:a="http://schemas.openxmlformats.org/drawingml/2006/main" xmlns:r="http://schemas.openxmlformats.org/officeDocument/2006/relationships" xmlns:p="http://schemas.openxmlformats.org/presentationml/2006/main" showMasterSp="0" showMasterPhAnim="0">
   <p:cSld>
     <p:spTree>
@@ -11220,7 +11330,7 @@
 </p:notes>
 </file>
 
-<file path=ppt/notesSlides/notesSlide35.xml><?xml version="1.0" encoding="utf-8"?>
+<file path=ppt/notesSlides/notesSlide36.xml><?xml version="1.0" encoding="utf-8"?>
 <p:notes xmlns:a="http://schemas.openxmlformats.org/drawingml/2006/main" xmlns:r="http://schemas.openxmlformats.org/officeDocument/2006/relationships" xmlns:p="http://schemas.openxmlformats.org/presentationml/2006/main" showMasterSp="0" showMasterPhAnim="0">
   <p:cSld>
     <p:spTree>
@@ -11324,7 +11434,7 @@
 </p:notes>
 </file>
 
-<file path=ppt/notesSlides/notesSlide36.xml><?xml version="1.0" encoding="utf-8"?>
+<file path=ppt/notesSlides/notesSlide37.xml><?xml version="1.0" encoding="utf-8"?>
 <p:notes xmlns:a="http://schemas.openxmlformats.org/drawingml/2006/main" xmlns:r="http://schemas.openxmlformats.org/officeDocument/2006/relationships" xmlns:p="http://schemas.openxmlformats.org/presentationml/2006/main" showMasterSp="0" showMasterPhAnim="0">
   <p:cSld>
     <p:spTree>
@@ -11474,7 +11584,7 @@
             </a:pPr>
             <a:fld id="{00000000-1234-1234-1234-123412341234}" type="slidenum">
               <a:rPr lang="en-US"/>
-              <a:t>36</a:t>
+              <a:t>37</a:t>
             </a:fld>
             <a:endParaRPr/>
           </a:p>
@@ -11488,7 +11598,7 @@
 </p:notes>
 </file>
 
-<file path=ppt/notesSlides/notesSlide37.xml><?xml version="1.0" encoding="utf-8"?>
+<file path=ppt/notesSlides/notesSlide38.xml><?xml version="1.0" encoding="utf-8"?>
 <p:notes xmlns:a="http://schemas.openxmlformats.org/drawingml/2006/main" xmlns:r="http://schemas.openxmlformats.org/officeDocument/2006/relationships" xmlns:p="http://schemas.openxmlformats.org/presentationml/2006/main" showMasterSp="0" showMasterPhAnim="0">
   <p:cSld>
     <p:spTree>
@@ -11638,7 +11748,7 @@
             </a:pPr>
             <a:fld id="{00000000-1234-1234-1234-123412341234}" type="slidenum">
               <a:rPr lang="en-US"/>
-              <a:t>37</a:t>
+              <a:t>38</a:t>
             </a:fld>
             <a:endParaRPr/>
           </a:p>
@@ -11652,7 +11762,7 @@
 </p:notes>
 </file>
 
-<file path=ppt/notesSlides/notesSlide38.xml><?xml version="1.0" encoding="utf-8"?>
+<file path=ppt/notesSlides/notesSlide39.xml><?xml version="1.0" encoding="utf-8"?>
 <p:notes xmlns:a="http://schemas.openxmlformats.org/drawingml/2006/main" xmlns:r="http://schemas.openxmlformats.org/officeDocument/2006/relationships" xmlns:p="http://schemas.openxmlformats.org/presentationml/2006/main" showMasterSp="0" showMasterPhAnim="0">
   <p:cSld>
     <p:spTree>
@@ -11802,7 +11912,7 @@
             </a:pPr>
             <a:fld id="{00000000-1234-1234-1234-123412341234}" type="slidenum">
               <a:rPr lang="en-US"/>
-              <a:t>38</a:t>
+              <a:t>39</a:t>
             </a:fld>
             <a:endParaRPr/>
           </a:p>
@@ -11930,6 +12040,115 @@
   <p:cSld>
     <p:spTree>
       <p:nvGrpSpPr>
+        <p:cNvPr id="1" name="Shape 168"/>
+        <p:cNvGrpSpPr/>
+        <p:nvPr/>
+      </p:nvGrpSpPr>
+      <p:grpSpPr>
+        <a:xfrm>
+          <a:off x="0" y="0"/>
+          <a:ext cx="0" cy="0"/>
+          <a:chOff x="0" y="0"/>
+          <a:chExt cx="0" cy="0"/>
+        </a:xfrm>
+      </p:grpSpPr>
+      <p:sp>
+        <p:nvSpPr>
+          <p:cNvPr id="169" name="Google Shape;169;p6:notes"/>
+          <p:cNvSpPr txBox="1">
+            <a:spLocks noGrp="1"/>
+          </p:cNvSpPr>
+          <p:nvPr>
+            <p:ph type="body" idx="1"/>
+          </p:nvPr>
+        </p:nvSpPr>
+        <p:spPr>
+          <a:xfrm>
+            <a:off x="685800" y="4400550"/>
+            <a:ext cx="5486400" cy="3600450"/>
+          </a:xfrm>
+          <a:prstGeom prst="rect">
+            <a:avLst/>
+          </a:prstGeom>
+        </p:spPr>
+        <p:txBody>
+          <a:bodyPr spcFirstLastPara="1" wrap="square" lIns="91425" tIns="45700" rIns="91425" bIns="45700" anchor="t" anchorCtr="0">
+            <a:noAutofit/>
+          </a:bodyPr>
+          <a:lstStyle/>
+          <a:p>
+            <a:pPr marL="0" lvl="0" indent="0" algn="l" rtl="0">
+              <a:spcBef>
+                <a:spcPts val="0"/>
+              </a:spcBef>
+              <a:spcAft>
+                <a:spcPts val="0"/>
+              </a:spcAft>
+              <a:buNone/>
+            </a:pPr>
+            <a:endParaRPr/>
+          </a:p>
+        </p:txBody>
+      </p:sp>
+      <p:sp>
+        <p:nvSpPr>
+          <p:cNvPr id="170" name="Google Shape;170;p6:notes"/>
+          <p:cNvSpPr>
+            <a:spLocks noGrp="1" noRot="1" noChangeAspect="1"/>
+          </p:cNvSpPr>
+          <p:nvPr>
+            <p:ph type="sldImg" idx="2"/>
+          </p:nvPr>
+        </p:nvSpPr>
+        <p:spPr>
+          <a:xfrm>
+            <a:off x="685800" y="1143000"/>
+            <a:ext cx="5486400" cy="3086100"/>
+          </a:xfrm>
+          <a:custGeom>
+            <a:avLst/>
+            <a:gdLst/>
+            <a:ahLst/>
+            <a:cxnLst/>
+            <a:rect l="l" t="t" r="r" b="b"/>
+            <a:pathLst>
+              <a:path w="120000" h="120000" extrusionOk="0">
+                <a:moveTo>
+                  <a:pt x="0" y="0"/>
+                </a:moveTo>
+                <a:lnTo>
+                  <a:pt x="120000" y="0"/>
+                </a:lnTo>
+                <a:lnTo>
+                  <a:pt x="120000" y="120000"/>
+                </a:lnTo>
+                <a:lnTo>
+                  <a:pt x="0" y="120000"/>
+                </a:lnTo>
+                <a:close/>
+              </a:path>
+            </a:pathLst>
+          </a:custGeom>
+        </p:spPr>
+      </p:sp>
+    </p:spTree>
+    <p:extLst>
+      <p:ext uri="{BB962C8B-B14F-4D97-AF65-F5344CB8AC3E}">
+        <p14:creationId xmlns:p14="http://schemas.microsoft.com/office/powerpoint/2010/main" val="2942748448"/>
+      </p:ext>
+    </p:extLst>
+  </p:cSld>
+  <p:clrMapOvr>
+    <a:masterClrMapping/>
+  </p:clrMapOvr>
+</p:notes>
+</file>
+
+<file path=ppt/notesSlides/notesSlide6.xml><?xml version="1.0" encoding="utf-8"?>
+<p:notes xmlns:a="http://schemas.openxmlformats.org/drawingml/2006/main" xmlns:r="http://schemas.openxmlformats.org/officeDocument/2006/relationships" xmlns:p="http://schemas.openxmlformats.org/presentationml/2006/main" showMasterSp="0" showMasterPhAnim="0">
+  <p:cSld>
+    <p:spTree>
+      <p:nvGrpSpPr>
         <p:cNvPr id="1" name="Shape 207"/>
         <p:cNvGrpSpPr/>
         <p:nvPr/>
@@ -12034,7 +12253,7 @@
 </p:notes>
 </file>
 
-<file path=ppt/notesSlides/notesSlide6.xml><?xml version="1.0" encoding="utf-8"?>
+<file path=ppt/notesSlides/notesSlide7.xml><?xml version="1.0" encoding="utf-8"?>
 <p:notes xmlns:a="http://schemas.openxmlformats.org/drawingml/2006/main" xmlns:r="http://schemas.openxmlformats.org/officeDocument/2006/relationships" xmlns:p="http://schemas.openxmlformats.org/presentationml/2006/main" showMasterSp="0" showMasterPhAnim="0">
   <p:cSld>
     <p:spTree>
@@ -12143,7 +12362,7 @@
 </p:notes>
 </file>
 
-<file path=ppt/notesSlides/notesSlide7.xml><?xml version="1.0" encoding="utf-8"?>
+<file path=ppt/notesSlides/notesSlide8.xml><?xml version="1.0" encoding="utf-8"?>
 <p:notes xmlns:a="http://schemas.openxmlformats.org/drawingml/2006/main" xmlns:r="http://schemas.openxmlformats.org/officeDocument/2006/relationships" xmlns:p="http://schemas.openxmlformats.org/presentationml/2006/main" showMasterSp="0" showMasterPhAnim="0">
   <p:cSld>
     <p:spTree>
@@ -12252,7 +12471,7 @@
 </p:notes>
 </file>
 
-<file path=ppt/notesSlides/notesSlide8.xml><?xml version="1.0" encoding="utf-8"?>
+<file path=ppt/notesSlides/notesSlide9.xml><?xml version="1.0" encoding="utf-8"?>
 <p:notes xmlns:a="http://schemas.openxmlformats.org/drawingml/2006/main" xmlns:r="http://schemas.openxmlformats.org/officeDocument/2006/relationships" xmlns:p="http://schemas.openxmlformats.org/presentationml/2006/main" showMasterSp="0" showMasterPhAnim="0">
   <p:cSld>
     <p:spTree>
@@ -12352,115 +12571,6 @@
     <p:extLst>
       <p:ext uri="{BB962C8B-B14F-4D97-AF65-F5344CB8AC3E}">
         <p14:creationId xmlns:p14="http://schemas.microsoft.com/office/powerpoint/2010/main" val="3460152439"/>
-      </p:ext>
-    </p:extLst>
-  </p:cSld>
-  <p:clrMapOvr>
-    <a:masterClrMapping/>
-  </p:clrMapOvr>
-</p:notes>
-</file>
-
-<file path=ppt/notesSlides/notesSlide9.xml><?xml version="1.0" encoding="utf-8"?>
-<p:notes xmlns:a="http://schemas.openxmlformats.org/drawingml/2006/main" xmlns:r="http://schemas.openxmlformats.org/officeDocument/2006/relationships" xmlns:p="http://schemas.openxmlformats.org/presentationml/2006/main" showMasterSp="0" showMasterPhAnim="0">
-  <p:cSld>
-    <p:spTree>
-      <p:nvGrpSpPr>
-        <p:cNvPr id="1" name="Shape 207"/>
-        <p:cNvGrpSpPr/>
-        <p:nvPr/>
-      </p:nvGrpSpPr>
-      <p:grpSpPr>
-        <a:xfrm>
-          <a:off x="0" y="0"/>
-          <a:ext cx="0" cy="0"/>
-          <a:chOff x="0" y="0"/>
-          <a:chExt cx="0" cy="0"/>
-        </a:xfrm>
-      </p:grpSpPr>
-      <p:sp>
-        <p:nvSpPr>
-          <p:cNvPr id="208" name="Google Shape;208;p11:notes"/>
-          <p:cNvSpPr txBox="1">
-            <a:spLocks noGrp="1"/>
-          </p:cNvSpPr>
-          <p:nvPr>
-            <p:ph type="body" idx="1"/>
-          </p:nvPr>
-        </p:nvSpPr>
-        <p:spPr>
-          <a:xfrm>
-            <a:off x="685800" y="4400550"/>
-            <a:ext cx="5486400" cy="3600450"/>
-          </a:xfrm>
-          <a:prstGeom prst="rect">
-            <a:avLst/>
-          </a:prstGeom>
-        </p:spPr>
-        <p:txBody>
-          <a:bodyPr spcFirstLastPara="1" wrap="square" lIns="91425" tIns="45700" rIns="91425" bIns="45700" anchor="t" anchorCtr="0">
-            <a:noAutofit/>
-          </a:bodyPr>
-          <a:lstStyle/>
-          <a:p>
-            <a:pPr marL="0" lvl="0" indent="0" algn="l" rtl="0">
-              <a:spcBef>
-                <a:spcPts val="0"/>
-              </a:spcBef>
-              <a:spcAft>
-                <a:spcPts val="0"/>
-              </a:spcAft>
-              <a:buNone/>
-            </a:pPr>
-            <a:endParaRPr/>
-          </a:p>
-        </p:txBody>
-      </p:sp>
-      <p:sp>
-        <p:nvSpPr>
-          <p:cNvPr id="209" name="Google Shape;209;p11:notes"/>
-          <p:cNvSpPr>
-            <a:spLocks noGrp="1" noRot="1" noChangeAspect="1"/>
-          </p:cNvSpPr>
-          <p:nvPr>
-            <p:ph type="sldImg" idx="2"/>
-          </p:nvPr>
-        </p:nvSpPr>
-        <p:spPr>
-          <a:xfrm>
-            <a:off x="685800" y="1143000"/>
-            <a:ext cx="5486400" cy="3086100"/>
-          </a:xfrm>
-          <a:custGeom>
-            <a:avLst/>
-            <a:gdLst/>
-            <a:ahLst/>
-            <a:cxnLst/>
-            <a:rect l="l" t="t" r="r" b="b"/>
-            <a:pathLst>
-              <a:path w="120000" h="120000" extrusionOk="0">
-                <a:moveTo>
-                  <a:pt x="0" y="0"/>
-                </a:moveTo>
-                <a:lnTo>
-                  <a:pt x="120000" y="0"/>
-                </a:lnTo>
-                <a:lnTo>
-                  <a:pt x="120000" y="120000"/>
-                </a:lnTo>
-                <a:lnTo>
-                  <a:pt x="0" y="120000"/>
-                </a:lnTo>
-                <a:close/>
-              </a:path>
-            </a:pathLst>
-          </a:custGeom>
-        </p:spPr>
-      </p:sp>
-    </p:spTree>
-    <p:extLst>
-      <p:ext uri="{BB962C8B-B14F-4D97-AF65-F5344CB8AC3E}">
-        <p14:creationId xmlns:p14="http://schemas.microsoft.com/office/powerpoint/2010/main" val="4072977937"/>
       </p:ext>
     </p:extLst>
   </p:cSld>
@@ -28364,6 +28474,502 @@
               <a:buNone/>
             </a:pPr>
             <a:r>
+              <a:rPr lang="en-US"/>
+              <a:t>CLICK TO ADD MAIN TITLE</a:t>
+            </a:r>
+            <a:endParaRPr/>
+          </a:p>
+        </p:txBody>
+      </p:sp>
+      <p:sp>
+        <p:nvSpPr>
+          <p:cNvPr id="212" name="Google Shape;212;p11"/>
+          <p:cNvSpPr txBox="1">
+            <a:spLocks noGrp="1"/>
+          </p:cNvSpPr>
+          <p:nvPr>
+            <p:ph type="body" idx="1"/>
+          </p:nvPr>
+        </p:nvSpPr>
+        <p:spPr>
+          <a:xfrm>
+            <a:off x="310896" y="834607"/>
+            <a:ext cx="8204454" cy="1934719"/>
+          </a:xfrm>
+          <a:prstGeom prst="rect">
+            <a:avLst/>
+          </a:prstGeom>
+          <a:noFill/>
+          <a:ln>
+            <a:noFill/>
+          </a:ln>
+        </p:spPr>
+        <p:txBody>
+          <a:bodyPr spcFirstLastPara="1" wrap="square" lIns="91425" tIns="45700" rIns="91425" bIns="45700" anchor="t" anchorCtr="0">
+            <a:noAutofit/>
+          </a:bodyPr>
+          <a:lstStyle/>
+          <a:p>
+            <a:pPr marL="102870" lvl="0" indent="-102870" algn="l" rtl="0">
+              <a:lnSpc>
+                <a:spcPct val="90000"/>
+              </a:lnSpc>
+              <a:spcBef>
+                <a:spcPts val="0"/>
+              </a:spcBef>
+              <a:spcAft>
+                <a:spcPts val="0"/>
+              </a:spcAft>
+              <a:buClr>
+                <a:srgbClr val="949595"/>
+              </a:buClr>
+              <a:buSzPts val="1400"/>
+              <a:buFont typeface="Arial"/>
+              <a:buChar char="•"/>
+            </a:pPr>
+            <a:r>
+              <a:rPr lang="en-US"/>
+              <a:t>Supporting copy here.</a:t>
+            </a:r>
+            <a:endParaRPr/>
+          </a:p>
+          <a:p>
+            <a:pPr marL="448056" lvl="1" indent="-173735" algn="l" rtl="0">
+              <a:lnSpc>
+                <a:spcPct val="90000"/>
+              </a:lnSpc>
+              <a:spcBef>
+                <a:spcPts val="375"/>
+              </a:spcBef>
+              <a:spcAft>
+                <a:spcPts val="0"/>
+              </a:spcAft>
+              <a:buClr>
+                <a:srgbClr val="949595"/>
+              </a:buClr>
+              <a:buSzPts val="980"/>
+              <a:buChar char="◦"/>
+            </a:pPr>
+            <a:r>
+              <a:rPr lang="en-US"/>
+              <a:t>Secondary copy here.</a:t>
+            </a:r>
+            <a:endParaRPr/>
+          </a:p>
+          <a:p>
+            <a:pPr marL="813816" lvl="2" indent="-173736" algn="l" rtl="0">
+              <a:lnSpc>
+                <a:spcPct val="90000"/>
+              </a:lnSpc>
+              <a:spcBef>
+                <a:spcPts val="375"/>
+              </a:spcBef>
+              <a:spcAft>
+                <a:spcPts val="0"/>
+              </a:spcAft>
+              <a:buClr>
+                <a:srgbClr val="949595"/>
+              </a:buClr>
+              <a:buSzPts val="1400"/>
+              <a:buChar char="•"/>
+            </a:pPr>
+            <a:r>
+              <a:rPr lang="en-US"/>
+              <a:t>Third-level copy here.</a:t>
+            </a:r>
+            <a:endParaRPr/>
+          </a:p>
+          <a:p>
+            <a:pPr marL="1179576" lvl="3" indent="-173736" algn="l" rtl="0">
+              <a:lnSpc>
+                <a:spcPct val="90000"/>
+              </a:lnSpc>
+              <a:spcBef>
+                <a:spcPts val="375"/>
+              </a:spcBef>
+              <a:spcAft>
+                <a:spcPts val="0"/>
+              </a:spcAft>
+              <a:buClr>
+                <a:srgbClr val="949595"/>
+              </a:buClr>
+              <a:buSzPts val="1400"/>
+              <a:buChar char="•"/>
+            </a:pPr>
+            <a:r>
+              <a:rPr lang="en-US"/>
+              <a:t>Fourth-level copy here.</a:t>
+            </a:r>
+            <a:endParaRPr/>
+          </a:p>
+          <a:p>
+            <a:pPr marL="1545336" lvl="4" indent="-173736" algn="l" rtl="0">
+              <a:lnSpc>
+                <a:spcPct val="90000"/>
+              </a:lnSpc>
+              <a:spcBef>
+                <a:spcPts val="375"/>
+              </a:spcBef>
+              <a:spcAft>
+                <a:spcPts val="0"/>
+              </a:spcAft>
+              <a:buClr>
+                <a:srgbClr val="949595"/>
+              </a:buClr>
+              <a:buSzPts val="1400"/>
+              <a:buChar char="•"/>
+            </a:pPr>
+            <a:r>
+              <a:rPr lang="en-US"/>
+              <a:t>Fifth-level copy here.</a:t>
+            </a:r>
+            <a:endParaRPr/>
+          </a:p>
+        </p:txBody>
+      </p:sp>
+    </p:spTree>
+    <p:extLst>
+      <p:ext uri="{BB962C8B-B14F-4D97-AF65-F5344CB8AC3E}">
+        <p14:creationId xmlns:p14="http://schemas.microsoft.com/office/powerpoint/2010/main" val="2524564217"/>
+      </p:ext>
+    </p:extLst>
+  </p:cSld>
+  <p:clrMapOvr>
+    <a:masterClrMapping/>
+  </p:clrMapOvr>
+  <p:timing>
+    <p:tnLst>
+      <p:par>
+        <p:cTn id="1" dur="indefinite" restart="never" nodeType="tmRoot">
+          <p:childTnLst>
+            <p:seq concurrent="1" nextAc="seek">
+              <p:cTn id="2" dur="indefinite" nodeType="mainSeq">
+                <p:childTnLst>
+                  <p:par>
+                    <p:cTn id="3" fill="hold">
+                      <p:stCondLst>
+                        <p:cond delay="indefinite"/>
+                        <p:cond evt="onBegin" delay="0">
+                          <p:tn val="2"/>
+                        </p:cond>
+                      </p:stCondLst>
+                      <p:childTnLst>
+                        <p:par>
+                          <p:cTn id="4" fill="hold">
+                            <p:stCondLst>
+                              <p:cond delay="0"/>
+                            </p:stCondLst>
+                            <p:childTnLst>
+                              <p:par>
+                                <p:cTn id="5" presetID="10" presetClass="entr" presetSubtype="0" fill="hold" nodeType="withEffect">
+                                  <p:stCondLst>
+                                    <p:cond delay="0"/>
+                                  </p:stCondLst>
+                                  <p:childTnLst>
+                                    <p:set>
+                                      <p:cBhvr>
+                                        <p:cTn id="6" dur="1" fill="hold">
+                                          <p:stCondLst>
+                                            <p:cond delay="0"/>
+                                          </p:stCondLst>
+                                        </p:cTn>
+                                        <p:tgtEl>
+                                          <p:spTgt spid="212">
+                                            <p:txEl>
+                                              <p:pRg st="0" end="0"/>
+                                            </p:txEl>
+                                          </p:spTgt>
+                                        </p:tgtEl>
+                                        <p:attrNameLst>
+                                          <p:attrName>style.visibility</p:attrName>
+                                        </p:attrNameLst>
+                                      </p:cBhvr>
+                                      <p:to>
+                                        <p:strVal val="visible"/>
+                                      </p:to>
+                                    </p:set>
+                                    <p:animEffect transition="in" filter="fade">
+                                      <p:cBhvr>
+                                        <p:cTn id="7" dur="1000"/>
+                                        <p:tgtEl>
+                                          <p:spTgt spid="212">
+                                            <p:txEl>
+                                              <p:pRg st="0" end="0"/>
+                                            </p:txEl>
+                                          </p:spTgt>
+                                        </p:tgtEl>
+                                      </p:cBhvr>
+                                    </p:animEffect>
+                                  </p:childTnLst>
+                                </p:cTn>
+                              </p:par>
+                              <p:par>
+                                <p:cTn id="8" presetID="10" presetClass="entr" presetSubtype="0" fill="hold" nodeType="withEffect">
+                                  <p:stCondLst>
+                                    <p:cond delay="0"/>
+                                  </p:stCondLst>
+                                  <p:childTnLst>
+                                    <p:set>
+                                      <p:cBhvr>
+                                        <p:cTn id="9" dur="1" fill="hold">
+                                          <p:stCondLst>
+                                            <p:cond delay="0"/>
+                                          </p:stCondLst>
+                                        </p:cTn>
+                                        <p:tgtEl>
+                                          <p:spTgt spid="212">
+                                            <p:txEl>
+                                              <p:pRg st="1" end="1"/>
+                                            </p:txEl>
+                                          </p:spTgt>
+                                        </p:tgtEl>
+                                        <p:attrNameLst>
+                                          <p:attrName>style.visibility</p:attrName>
+                                        </p:attrNameLst>
+                                      </p:cBhvr>
+                                      <p:to>
+                                        <p:strVal val="visible"/>
+                                      </p:to>
+                                    </p:set>
+                                    <p:animEffect transition="in" filter="fade">
+                                      <p:cBhvr>
+                                        <p:cTn id="10" dur="1000"/>
+                                        <p:tgtEl>
+                                          <p:spTgt spid="212">
+                                            <p:txEl>
+                                              <p:pRg st="1" end="1"/>
+                                            </p:txEl>
+                                          </p:spTgt>
+                                        </p:tgtEl>
+                                      </p:cBhvr>
+                                    </p:animEffect>
+                                  </p:childTnLst>
+                                </p:cTn>
+                              </p:par>
+                              <p:par>
+                                <p:cTn id="11" presetID="10" presetClass="entr" presetSubtype="0" fill="hold" nodeType="withEffect">
+                                  <p:stCondLst>
+                                    <p:cond delay="0"/>
+                                  </p:stCondLst>
+                                  <p:childTnLst>
+                                    <p:set>
+                                      <p:cBhvr>
+                                        <p:cTn id="12" dur="1" fill="hold">
+                                          <p:stCondLst>
+                                            <p:cond delay="0"/>
+                                          </p:stCondLst>
+                                        </p:cTn>
+                                        <p:tgtEl>
+                                          <p:spTgt spid="212">
+                                            <p:txEl>
+                                              <p:pRg st="2" end="2"/>
+                                            </p:txEl>
+                                          </p:spTgt>
+                                        </p:tgtEl>
+                                        <p:attrNameLst>
+                                          <p:attrName>style.visibility</p:attrName>
+                                        </p:attrNameLst>
+                                      </p:cBhvr>
+                                      <p:to>
+                                        <p:strVal val="visible"/>
+                                      </p:to>
+                                    </p:set>
+                                    <p:animEffect transition="in" filter="fade">
+                                      <p:cBhvr>
+                                        <p:cTn id="13" dur="1000"/>
+                                        <p:tgtEl>
+                                          <p:spTgt spid="212">
+                                            <p:txEl>
+                                              <p:pRg st="2" end="2"/>
+                                            </p:txEl>
+                                          </p:spTgt>
+                                        </p:tgtEl>
+                                      </p:cBhvr>
+                                    </p:animEffect>
+                                  </p:childTnLst>
+                                </p:cTn>
+                              </p:par>
+                              <p:par>
+                                <p:cTn id="14" presetID="10" presetClass="entr" presetSubtype="0" fill="hold" nodeType="withEffect">
+                                  <p:stCondLst>
+                                    <p:cond delay="0"/>
+                                  </p:stCondLst>
+                                  <p:childTnLst>
+                                    <p:set>
+                                      <p:cBhvr>
+                                        <p:cTn id="15" dur="1" fill="hold">
+                                          <p:stCondLst>
+                                            <p:cond delay="0"/>
+                                          </p:stCondLst>
+                                        </p:cTn>
+                                        <p:tgtEl>
+                                          <p:spTgt spid="212">
+                                            <p:txEl>
+                                              <p:pRg st="3" end="3"/>
+                                            </p:txEl>
+                                          </p:spTgt>
+                                        </p:tgtEl>
+                                        <p:attrNameLst>
+                                          <p:attrName>style.visibility</p:attrName>
+                                        </p:attrNameLst>
+                                      </p:cBhvr>
+                                      <p:to>
+                                        <p:strVal val="visible"/>
+                                      </p:to>
+                                    </p:set>
+                                    <p:animEffect transition="in" filter="fade">
+                                      <p:cBhvr>
+                                        <p:cTn id="16" dur="1000"/>
+                                        <p:tgtEl>
+                                          <p:spTgt spid="212">
+                                            <p:txEl>
+                                              <p:pRg st="3" end="3"/>
+                                            </p:txEl>
+                                          </p:spTgt>
+                                        </p:tgtEl>
+                                      </p:cBhvr>
+                                    </p:animEffect>
+                                  </p:childTnLst>
+                                </p:cTn>
+                              </p:par>
+                              <p:par>
+                                <p:cTn id="17" presetID="10" presetClass="entr" presetSubtype="0" fill="hold" nodeType="withEffect">
+                                  <p:stCondLst>
+                                    <p:cond delay="0"/>
+                                  </p:stCondLst>
+                                  <p:childTnLst>
+                                    <p:set>
+                                      <p:cBhvr>
+                                        <p:cTn id="18" dur="1" fill="hold">
+                                          <p:stCondLst>
+                                            <p:cond delay="0"/>
+                                          </p:stCondLst>
+                                        </p:cTn>
+                                        <p:tgtEl>
+                                          <p:spTgt spid="212">
+                                            <p:txEl>
+                                              <p:pRg st="4" end="4"/>
+                                            </p:txEl>
+                                          </p:spTgt>
+                                        </p:tgtEl>
+                                        <p:attrNameLst>
+                                          <p:attrName>style.visibility</p:attrName>
+                                        </p:attrNameLst>
+                                      </p:cBhvr>
+                                      <p:to>
+                                        <p:strVal val="visible"/>
+                                      </p:to>
+                                    </p:set>
+                                    <p:animEffect transition="in" filter="fade">
+                                      <p:cBhvr>
+                                        <p:cTn id="19" dur="1000"/>
+                                        <p:tgtEl>
+                                          <p:spTgt spid="212">
+                                            <p:txEl>
+                                              <p:pRg st="4" end="4"/>
+                                            </p:txEl>
+                                          </p:spTgt>
+                                        </p:tgtEl>
+                                      </p:cBhvr>
+                                    </p:animEffect>
+                                  </p:childTnLst>
+                                </p:cTn>
+                              </p:par>
+                            </p:childTnLst>
+                          </p:cTn>
+                        </p:par>
+                      </p:childTnLst>
+                    </p:cTn>
+                  </p:par>
+                </p:childTnLst>
+              </p:cTn>
+              <p:prevCondLst>
+                <p:cond evt="onPrev" delay="0">
+                  <p:tgtEl>
+                    <p:sldTgt/>
+                  </p:tgtEl>
+                </p:cond>
+              </p:prevCondLst>
+              <p:nextCondLst>
+                <p:cond evt="onNext" delay="0">
+                  <p:tgtEl>
+                    <p:sldTgt/>
+                  </p:tgtEl>
+                </p:cond>
+              </p:nextCondLst>
+            </p:seq>
+          </p:childTnLst>
+        </p:cTn>
+      </p:par>
+    </p:tnLst>
+  </p:timing>
+</p:sld>
+</file>
+
+<file path=ppt/slides/slide11.xml><?xml version="1.0" encoding="utf-8"?>
+<p:sld xmlns:a="http://schemas.openxmlformats.org/drawingml/2006/main" xmlns:r="http://schemas.openxmlformats.org/officeDocument/2006/relationships" xmlns:p="http://schemas.openxmlformats.org/presentationml/2006/main">
+  <p:cSld>
+    <p:spTree>
+      <p:nvGrpSpPr>
+        <p:cNvPr id="1" name="Shape 210"/>
+        <p:cNvGrpSpPr/>
+        <p:nvPr/>
+      </p:nvGrpSpPr>
+      <p:grpSpPr>
+        <a:xfrm>
+          <a:off x="0" y="0"/>
+          <a:ext cx="0" cy="0"/>
+          <a:chOff x="0" y="0"/>
+          <a:chExt cx="0" cy="0"/>
+        </a:xfrm>
+      </p:grpSpPr>
+      <p:sp>
+        <p:nvSpPr>
+          <p:cNvPr id="211" name="Google Shape;211;p11"/>
+          <p:cNvSpPr txBox="1">
+            <a:spLocks noGrp="1"/>
+          </p:cNvSpPr>
+          <p:nvPr>
+            <p:ph type="title"/>
+          </p:nvPr>
+        </p:nvSpPr>
+        <p:spPr>
+          <a:xfrm>
+            <a:off x="253863" y="133285"/>
+            <a:ext cx="8204454" cy="342163"/>
+          </a:xfrm>
+          <a:prstGeom prst="rect">
+            <a:avLst/>
+          </a:prstGeom>
+          <a:noFill/>
+          <a:ln>
+            <a:noFill/>
+          </a:ln>
+        </p:spPr>
+        <p:txBody>
+          <a:bodyPr spcFirstLastPara="1" wrap="square" lIns="91425" tIns="45700" rIns="91425" bIns="45700" anchor="t" anchorCtr="0">
+            <a:noAutofit/>
+          </a:bodyPr>
+          <a:lstStyle/>
+          <a:p>
+            <a:pPr marL="0" lvl="0" indent="0" algn="l" rtl="0">
+              <a:lnSpc>
+                <a:spcPct val="90000"/>
+              </a:lnSpc>
+              <a:spcBef>
+                <a:spcPts val="0"/>
+              </a:spcBef>
+              <a:spcAft>
+                <a:spcPts val="0"/>
+              </a:spcAft>
+              <a:buClr>
+                <a:srgbClr val="22C2EB"/>
+              </a:buClr>
+              <a:buSzPts val="2200"/>
+              <a:buFont typeface="Montserrat ExtraBold"/>
+              <a:buNone/>
+            </a:pPr>
+            <a:r>
               <a:rPr lang="en-US" dirty="0"/>
               <a:t>Client Functionality Overview</a:t>
             </a:r>
@@ -28393,8 +28999,8 @@
         </p:blipFill>
         <p:spPr>
           <a:xfrm>
-            <a:off x="292608" y="739548"/>
-            <a:ext cx="5310029" cy="4403952"/>
+            <a:off x="1701075" y="475448"/>
+            <a:ext cx="5628465" cy="4668052"/>
           </a:xfrm>
           <a:prstGeom prst="rect">
             <a:avLst/>
@@ -28414,7 +29020,7 @@
 </p:sld>
 </file>
 
-<file path=ppt/slides/slide11.xml><?xml version="1.0" encoding="utf-8"?>
+<file path=ppt/slides/slide12.xml><?xml version="1.0" encoding="utf-8"?>
 <p:sld xmlns:a="http://schemas.openxmlformats.org/drawingml/2006/main" xmlns:r="http://schemas.openxmlformats.org/officeDocument/2006/relationships" xmlns:p="http://schemas.openxmlformats.org/presentationml/2006/main">
   <p:cSld>
     <p:spTree>
@@ -28910,7 +29516,7 @@
 </p:sld>
 </file>
 
-<file path=ppt/slides/slide12.xml><?xml version="1.0" encoding="utf-8"?>
+<file path=ppt/slides/slide13.xml><?xml version="1.0" encoding="utf-8"?>
 <p:sld xmlns:a="http://schemas.openxmlformats.org/drawingml/2006/main" xmlns:r="http://schemas.openxmlformats.org/officeDocument/2006/relationships" xmlns:p="http://schemas.openxmlformats.org/presentationml/2006/main">
   <p:cSld>
     <p:spTree>
@@ -29136,7 +29742,7 @@
 </p:sld>
 </file>
 
-<file path=ppt/slides/slide13.xml><?xml version="1.0" encoding="utf-8"?>
+<file path=ppt/slides/slide14.xml><?xml version="1.0" encoding="utf-8"?>
 <p:sld xmlns:a="http://schemas.openxmlformats.org/drawingml/2006/main" xmlns:r="http://schemas.openxmlformats.org/officeDocument/2006/relationships" xmlns:p="http://schemas.openxmlformats.org/presentationml/2006/main">
   <p:cSld>
     <p:spTree>
@@ -29215,7 +29821,7 @@
 </p:sld>
 </file>
 
-<file path=ppt/slides/slide14.xml><?xml version="1.0" encoding="utf-8"?>
+<file path=ppt/slides/slide15.xml><?xml version="1.0" encoding="utf-8"?>
 <p:sld xmlns:a="http://schemas.openxmlformats.org/drawingml/2006/main" xmlns:r="http://schemas.openxmlformats.org/officeDocument/2006/relationships" xmlns:p="http://schemas.openxmlformats.org/presentationml/2006/main">
   <p:cSld>
     <p:spTree>
@@ -29441,7 +30047,7 @@
 </p:sld>
 </file>
 
-<file path=ppt/slides/slide15.xml><?xml version="1.0" encoding="utf-8"?>
+<file path=ppt/slides/slide16.xml><?xml version="1.0" encoding="utf-8"?>
 <p:sld xmlns:a="http://schemas.openxmlformats.org/drawingml/2006/main" xmlns:r="http://schemas.openxmlformats.org/officeDocument/2006/relationships" xmlns:p="http://schemas.openxmlformats.org/presentationml/2006/main">
   <p:cSld>
     <p:spTree>
@@ -29912,7 +30518,7 @@
 </p:sld>
 </file>
 
-<file path=ppt/slides/slide16.xml><?xml version="1.0" encoding="utf-8"?>
+<file path=ppt/slides/slide17.xml><?xml version="1.0" encoding="utf-8"?>
 <p:sld xmlns:a="http://schemas.openxmlformats.org/drawingml/2006/main" xmlns:r="http://schemas.openxmlformats.org/officeDocument/2006/relationships" xmlns:p="http://schemas.openxmlformats.org/presentationml/2006/main">
   <p:cSld>
     <p:spTree>
@@ -31150,7 +31756,7 @@
 </p:sld>
 </file>
 
-<file path=ppt/slides/slide17.xml><?xml version="1.0" encoding="utf-8"?>
+<file path=ppt/slides/slide18.xml><?xml version="1.0" encoding="utf-8"?>
 <p:sld xmlns:a="http://schemas.openxmlformats.org/drawingml/2006/main" xmlns:r="http://schemas.openxmlformats.org/officeDocument/2006/relationships" xmlns:p="http://schemas.openxmlformats.org/presentationml/2006/main">
   <p:cSld>
     <p:spTree>
@@ -31739,7 +32345,7 @@
 </p:sld>
 </file>
 
-<file path=ppt/slides/slide18.xml><?xml version="1.0" encoding="utf-8"?>
+<file path=ppt/slides/slide19.xml><?xml version="1.0" encoding="utf-8"?>
 <p:sld xmlns:a="http://schemas.openxmlformats.org/drawingml/2006/main" xmlns:r="http://schemas.openxmlformats.org/officeDocument/2006/relationships" xmlns:p="http://schemas.openxmlformats.org/presentationml/2006/main">
   <p:cSld>
     <p:spTree>
@@ -32275,7 +32881,304 @@
 </p:sld>
 </file>
 
-<file path=ppt/slides/slide19.xml><?xml version="1.0" encoding="utf-8"?>
+<file path=ppt/slides/slide2.xml><?xml version="1.0" encoding="utf-8"?>
+<p:sld xmlns:a="http://schemas.openxmlformats.org/drawingml/2006/main" xmlns:r="http://schemas.openxmlformats.org/officeDocument/2006/relationships" xmlns:p="http://schemas.openxmlformats.org/presentationml/2006/main">
+  <p:cSld>
+    <p:spTree>
+      <p:nvGrpSpPr>
+        <p:cNvPr id="1" name="Shape 162"/>
+        <p:cNvGrpSpPr/>
+        <p:nvPr/>
+      </p:nvGrpSpPr>
+      <p:grpSpPr>
+        <a:xfrm>
+          <a:off x="0" y="0"/>
+          <a:ext cx="0" cy="0"/>
+          <a:chOff x="0" y="0"/>
+          <a:chExt cx="0" cy="0"/>
+        </a:xfrm>
+      </p:grpSpPr>
+      <p:sp>
+        <p:nvSpPr>
+          <p:cNvPr id="164" name="Google Shape;164;p5"/>
+          <p:cNvSpPr txBox="1">
+            <a:spLocks noGrp="1"/>
+          </p:cNvSpPr>
+          <p:nvPr>
+            <p:ph type="body" idx="1"/>
+          </p:nvPr>
+        </p:nvSpPr>
+        <p:spPr>
+          <a:xfrm>
+            <a:off x="91440" y="1828800"/>
+            <a:ext cx="4114800" cy="1225296"/>
+          </a:xfrm>
+          <a:prstGeom prst="rect">
+            <a:avLst/>
+          </a:prstGeom>
+          <a:noFill/>
+          <a:ln>
+            <a:noFill/>
+          </a:ln>
+        </p:spPr>
+        <p:txBody>
+          <a:bodyPr spcFirstLastPara="1" wrap="square" lIns="91425" tIns="45700" rIns="91425" bIns="45700" anchor="t" anchorCtr="0">
+            <a:noAutofit/>
+          </a:bodyPr>
+          <a:lstStyle/>
+          <a:p>
+            <a:pPr marL="0" lvl="0" indent="0" algn="ctr" rtl="0">
+              <a:lnSpc>
+                <a:spcPct val="107142"/>
+              </a:lnSpc>
+              <a:spcBef>
+                <a:spcPts val="0"/>
+              </a:spcBef>
+              <a:spcAft>
+                <a:spcPts val="0"/>
+              </a:spcAft>
+              <a:buClr>
+                <a:schemeClr val="lt1"/>
+              </a:buClr>
+              <a:buSzPts val="2800"/>
+              <a:buNone/>
+            </a:pPr>
+            <a:r>
+              <a:rPr lang="en-US" dirty="0"/>
+              <a:t>Agenda</a:t>
+            </a:r>
+            <a:endParaRPr dirty="0"/>
+          </a:p>
+        </p:txBody>
+      </p:sp>
+      <p:sp>
+        <p:nvSpPr>
+          <p:cNvPr id="165" name="Google Shape;165;p5"/>
+          <p:cNvSpPr txBox="1">
+            <a:spLocks noGrp="1"/>
+          </p:cNvSpPr>
+          <p:nvPr>
+            <p:ph type="body" idx="2"/>
+          </p:nvPr>
+        </p:nvSpPr>
+        <p:spPr>
+          <a:xfrm>
+            <a:off x="4553712" y="365760"/>
+            <a:ext cx="4343400" cy="326571"/>
+          </a:xfrm>
+          <a:prstGeom prst="rect">
+            <a:avLst/>
+          </a:prstGeom>
+          <a:noFill/>
+          <a:ln>
+            <a:noFill/>
+          </a:ln>
+        </p:spPr>
+        <p:txBody>
+          <a:bodyPr spcFirstLastPara="1" wrap="square" lIns="91425" tIns="45700" rIns="91425" bIns="45700" anchor="t" anchorCtr="0">
+            <a:noAutofit/>
+          </a:bodyPr>
+          <a:lstStyle/>
+          <a:p>
+            <a:pPr lvl="0" indent="-457200" algn="l" rtl="0">
+              <a:lnSpc>
+                <a:spcPct val="90000"/>
+              </a:lnSpc>
+              <a:spcBef>
+                <a:spcPts val="0"/>
+              </a:spcBef>
+              <a:spcAft>
+                <a:spcPts val="0"/>
+              </a:spcAft>
+              <a:buClr>
+                <a:srgbClr val="22C2EB"/>
+              </a:buClr>
+              <a:buSzPts val="2200"/>
+              <a:buAutoNum type="arabicPeriod"/>
+            </a:pPr>
+            <a:r>
+              <a:rPr lang="en-US" dirty="0"/>
+              <a:t>What Are REST APIs?</a:t>
+            </a:r>
+          </a:p>
+          <a:p>
+            <a:pPr lvl="0" indent="-457200" algn="l" rtl="0">
+              <a:lnSpc>
+                <a:spcPct val="90000"/>
+              </a:lnSpc>
+              <a:spcBef>
+                <a:spcPts val="0"/>
+              </a:spcBef>
+              <a:spcAft>
+                <a:spcPts val="0"/>
+              </a:spcAft>
+              <a:buClr>
+                <a:srgbClr val="22C2EB"/>
+              </a:buClr>
+              <a:buSzPts val="2200"/>
+              <a:buAutoNum type="arabicPeriod"/>
+            </a:pPr>
+            <a:r>
+              <a:rPr lang="en-US" dirty="0"/>
+              <a:t>Why Use the Brightcove REST APIs?</a:t>
+            </a:r>
+          </a:p>
+          <a:p>
+            <a:pPr lvl="0" indent="-457200" algn="l" rtl="0">
+              <a:lnSpc>
+                <a:spcPct val="90000"/>
+              </a:lnSpc>
+              <a:spcBef>
+                <a:spcPts val="0"/>
+              </a:spcBef>
+              <a:spcAft>
+                <a:spcPts val="0"/>
+              </a:spcAft>
+              <a:buClr>
+                <a:srgbClr val="22C2EB"/>
+              </a:buClr>
+              <a:buSzPts val="2200"/>
+              <a:buAutoNum type="arabicPeriod"/>
+            </a:pPr>
+            <a:r>
+              <a:rPr lang="en-US" dirty="0"/>
+              <a:t>High Level Implementation View</a:t>
+            </a:r>
+          </a:p>
+          <a:p>
+            <a:pPr lvl="0" indent="-457200" algn="l" rtl="0">
+              <a:lnSpc>
+                <a:spcPct val="90000"/>
+              </a:lnSpc>
+              <a:spcBef>
+                <a:spcPts val="0"/>
+              </a:spcBef>
+              <a:spcAft>
+                <a:spcPts val="0"/>
+              </a:spcAft>
+              <a:buClr>
+                <a:srgbClr val="22C2EB"/>
+              </a:buClr>
+              <a:buSzPts val="2200"/>
+              <a:buAutoNum type="arabicPeriod"/>
+            </a:pPr>
+            <a:r>
+              <a:rPr lang="en-US" dirty="0"/>
+              <a:t>Understanding the Client Side Code</a:t>
+            </a:r>
+          </a:p>
+          <a:p>
+            <a:pPr lvl="0" indent="-457200" algn="l" rtl="0">
+              <a:lnSpc>
+                <a:spcPct val="90000"/>
+              </a:lnSpc>
+              <a:spcBef>
+                <a:spcPts val="0"/>
+              </a:spcBef>
+              <a:spcAft>
+                <a:spcPts val="0"/>
+              </a:spcAft>
+              <a:buClr>
+                <a:srgbClr val="22C2EB"/>
+              </a:buClr>
+              <a:buSzPts val="2200"/>
+              <a:buAutoNum type="arabicPeriod"/>
+            </a:pPr>
+            <a:r>
+              <a:rPr lang="en-US" dirty="0"/>
+              <a:t>Example Code Deep Dive</a:t>
+            </a:r>
+          </a:p>
+          <a:p>
+            <a:pPr lvl="0" indent="-457200" algn="l" rtl="0">
+              <a:lnSpc>
+                <a:spcPct val="90000"/>
+              </a:lnSpc>
+              <a:spcBef>
+                <a:spcPts val="0"/>
+              </a:spcBef>
+              <a:spcAft>
+                <a:spcPts val="0"/>
+              </a:spcAft>
+              <a:buClr>
+                <a:srgbClr val="22C2EB"/>
+              </a:buClr>
+              <a:buSzPts val="2200"/>
+              <a:buAutoNum type="arabicPeriod"/>
+            </a:pPr>
+            <a:r>
+              <a:rPr lang="en-US" dirty="0"/>
+              <a:t>Wrap It Up!</a:t>
+            </a:r>
+          </a:p>
+          <a:p>
+            <a:pPr lvl="0" indent="-457200" algn="l" rtl="0">
+              <a:lnSpc>
+                <a:spcPct val="90000"/>
+              </a:lnSpc>
+              <a:spcBef>
+                <a:spcPts val="0"/>
+              </a:spcBef>
+              <a:spcAft>
+                <a:spcPts val="0"/>
+              </a:spcAft>
+              <a:buClr>
+                <a:srgbClr val="22C2EB"/>
+              </a:buClr>
+              <a:buSzPts val="2200"/>
+              <a:buAutoNum type="arabicPeriod"/>
+            </a:pPr>
+            <a:endParaRPr lang="en-US" dirty="0"/>
+          </a:p>
+          <a:p>
+            <a:pPr lvl="0" indent="-457200" algn="l" rtl="0">
+              <a:lnSpc>
+                <a:spcPct val="90000"/>
+              </a:lnSpc>
+              <a:spcBef>
+                <a:spcPts val="0"/>
+              </a:spcBef>
+              <a:spcAft>
+                <a:spcPts val="0"/>
+              </a:spcAft>
+              <a:buClr>
+                <a:srgbClr val="22C2EB"/>
+              </a:buClr>
+              <a:buSzPts val="2200"/>
+              <a:buAutoNum type="arabicPeriod"/>
+            </a:pPr>
+            <a:endParaRPr lang="en-US" dirty="0"/>
+          </a:p>
+          <a:p>
+            <a:pPr lvl="0" indent="-457200" algn="l" rtl="0">
+              <a:lnSpc>
+                <a:spcPct val="90000"/>
+              </a:lnSpc>
+              <a:spcBef>
+                <a:spcPts val="0"/>
+              </a:spcBef>
+              <a:spcAft>
+                <a:spcPts val="0"/>
+              </a:spcAft>
+              <a:buClr>
+                <a:srgbClr val="22C2EB"/>
+              </a:buClr>
+              <a:buSzPts val="2200"/>
+              <a:buAutoNum type="arabicPeriod"/>
+            </a:pPr>
+            <a:endParaRPr dirty="0"/>
+          </a:p>
+        </p:txBody>
+      </p:sp>
+    </p:spTree>
+  </p:cSld>
+  <p:clrMapOvr>
+    <a:masterClrMapping/>
+  </p:clrMapOvr>
+</p:sld>
+</file>
+
+<file path=ppt/slides/slide20.xml><?xml version="1.0" encoding="utf-8"?>
 <p:sld xmlns:a="http://schemas.openxmlformats.org/drawingml/2006/main" xmlns:r="http://schemas.openxmlformats.org/officeDocument/2006/relationships" xmlns:p="http://schemas.openxmlformats.org/presentationml/2006/main">
   <p:cSld>
     <p:spTree>
@@ -32934,304 +33837,7 @@
 </p:sld>
 </file>
 
-<file path=ppt/slides/slide2.xml><?xml version="1.0" encoding="utf-8"?>
-<p:sld xmlns:a="http://schemas.openxmlformats.org/drawingml/2006/main" xmlns:r="http://schemas.openxmlformats.org/officeDocument/2006/relationships" xmlns:p="http://schemas.openxmlformats.org/presentationml/2006/main">
-  <p:cSld>
-    <p:spTree>
-      <p:nvGrpSpPr>
-        <p:cNvPr id="1" name="Shape 162"/>
-        <p:cNvGrpSpPr/>
-        <p:nvPr/>
-      </p:nvGrpSpPr>
-      <p:grpSpPr>
-        <a:xfrm>
-          <a:off x="0" y="0"/>
-          <a:ext cx="0" cy="0"/>
-          <a:chOff x="0" y="0"/>
-          <a:chExt cx="0" cy="0"/>
-        </a:xfrm>
-      </p:grpSpPr>
-      <p:sp>
-        <p:nvSpPr>
-          <p:cNvPr id="164" name="Google Shape;164;p5"/>
-          <p:cNvSpPr txBox="1">
-            <a:spLocks noGrp="1"/>
-          </p:cNvSpPr>
-          <p:nvPr>
-            <p:ph type="body" idx="1"/>
-          </p:nvPr>
-        </p:nvSpPr>
-        <p:spPr>
-          <a:xfrm>
-            <a:off x="91440" y="1828800"/>
-            <a:ext cx="4114800" cy="1225296"/>
-          </a:xfrm>
-          <a:prstGeom prst="rect">
-            <a:avLst/>
-          </a:prstGeom>
-          <a:noFill/>
-          <a:ln>
-            <a:noFill/>
-          </a:ln>
-        </p:spPr>
-        <p:txBody>
-          <a:bodyPr spcFirstLastPara="1" wrap="square" lIns="91425" tIns="45700" rIns="91425" bIns="45700" anchor="t" anchorCtr="0">
-            <a:noAutofit/>
-          </a:bodyPr>
-          <a:lstStyle/>
-          <a:p>
-            <a:pPr marL="0" lvl="0" indent="0" algn="ctr" rtl="0">
-              <a:lnSpc>
-                <a:spcPct val="107142"/>
-              </a:lnSpc>
-              <a:spcBef>
-                <a:spcPts val="0"/>
-              </a:spcBef>
-              <a:spcAft>
-                <a:spcPts val="0"/>
-              </a:spcAft>
-              <a:buClr>
-                <a:schemeClr val="lt1"/>
-              </a:buClr>
-              <a:buSzPts val="2800"/>
-              <a:buNone/>
-            </a:pPr>
-            <a:r>
-              <a:rPr lang="en-US" dirty="0"/>
-              <a:t>Agenda</a:t>
-            </a:r>
-            <a:endParaRPr dirty="0"/>
-          </a:p>
-        </p:txBody>
-      </p:sp>
-      <p:sp>
-        <p:nvSpPr>
-          <p:cNvPr id="165" name="Google Shape;165;p5"/>
-          <p:cNvSpPr txBox="1">
-            <a:spLocks noGrp="1"/>
-          </p:cNvSpPr>
-          <p:nvPr>
-            <p:ph type="body" idx="2"/>
-          </p:nvPr>
-        </p:nvSpPr>
-        <p:spPr>
-          <a:xfrm>
-            <a:off x="4553712" y="365760"/>
-            <a:ext cx="4343400" cy="326571"/>
-          </a:xfrm>
-          <a:prstGeom prst="rect">
-            <a:avLst/>
-          </a:prstGeom>
-          <a:noFill/>
-          <a:ln>
-            <a:noFill/>
-          </a:ln>
-        </p:spPr>
-        <p:txBody>
-          <a:bodyPr spcFirstLastPara="1" wrap="square" lIns="91425" tIns="45700" rIns="91425" bIns="45700" anchor="t" anchorCtr="0">
-            <a:noAutofit/>
-          </a:bodyPr>
-          <a:lstStyle/>
-          <a:p>
-            <a:pPr lvl="0" indent="-457200" algn="l" rtl="0">
-              <a:lnSpc>
-                <a:spcPct val="90000"/>
-              </a:lnSpc>
-              <a:spcBef>
-                <a:spcPts val="0"/>
-              </a:spcBef>
-              <a:spcAft>
-                <a:spcPts val="0"/>
-              </a:spcAft>
-              <a:buClr>
-                <a:srgbClr val="22C2EB"/>
-              </a:buClr>
-              <a:buSzPts val="2200"/>
-              <a:buAutoNum type="arabicPeriod"/>
-            </a:pPr>
-            <a:r>
-              <a:rPr lang="en-US" dirty="0"/>
-              <a:t>What Are REST APIs?</a:t>
-            </a:r>
-          </a:p>
-          <a:p>
-            <a:pPr lvl="0" indent="-457200" algn="l" rtl="0">
-              <a:lnSpc>
-                <a:spcPct val="90000"/>
-              </a:lnSpc>
-              <a:spcBef>
-                <a:spcPts val="0"/>
-              </a:spcBef>
-              <a:spcAft>
-                <a:spcPts val="0"/>
-              </a:spcAft>
-              <a:buClr>
-                <a:srgbClr val="22C2EB"/>
-              </a:buClr>
-              <a:buSzPts val="2200"/>
-              <a:buAutoNum type="arabicPeriod"/>
-            </a:pPr>
-            <a:r>
-              <a:rPr lang="en-US" dirty="0"/>
-              <a:t>Why Use the Brightcove REST APIs?</a:t>
-            </a:r>
-          </a:p>
-          <a:p>
-            <a:pPr lvl="0" indent="-457200" algn="l" rtl="0">
-              <a:lnSpc>
-                <a:spcPct val="90000"/>
-              </a:lnSpc>
-              <a:spcBef>
-                <a:spcPts val="0"/>
-              </a:spcBef>
-              <a:spcAft>
-                <a:spcPts val="0"/>
-              </a:spcAft>
-              <a:buClr>
-                <a:srgbClr val="22C2EB"/>
-              </a:buClr>
-              <a:buSzPts val="2200"/>
-              <a:buAutoNum type="arabicPeriod"/>
-            </a:pPr>
-            <a:r>
-              <a:rPr lang="en-US" dirty="0"/>
-              <a:t>High Level Implementation View</a:t>
-            </a:r>
-          </a:p>
-          <a:p>
-            <a:pPr lvl="0" indent="-457200" algn="l" rtl="0">
-              <a:lnSpc>
-                <a:spcPct val="90000"/>
-              </a:lnSpc>
-              <a:spcBef>
-                <a:spcPts val="0"/>
-              </a:spcBef>
-              <a:spcAft>
-                <a:spcPts val="0"/>
-              </a:spcAft>
-              <a:buClr>
-                <a:srgbClr val="22C2EB"/>
-              </a:buClr>
-              <a:buSzPts val="2200"/>
-              <a:buAutoNum type="arabicPeriod"/>
-            </a:pPr>
-            <a:r>
-              <a:rPr lang="en-US" dirty="0"/>
-              <a:t>Understanding the Client Side Code</a:t>
-            </a:r>
-          </a:p>
-          <a:p>
-            <a:pPr lvl="0" indent="-457200" algn="l" rtl="0">
-              <a:lnSpc>
-                <a:spcPct val="90000"/>
-              </a:lnSpc>
-              <a:spcBef>
-                <a:spcPts val="0"/>
-              </a:spcBef>
-              <a:spcAft>
-                <a:spcPts val="0"/>
-              </a:spcAft>
-              <a:buClr>
-                <a:srgbClr val="22C2EB"/>
-              </a:buClr>
-              <a:buSzPts val="2200"/>
-              <a:buAutoNum type="arabicPeriod"/>
-            </a:pPr>
-            <a:r>
-              <a:rPr lang="en-US" dirty="0"/>
-              <a:t>Example Code Deep Dive</a:t>
-            </a:r>
-          </a:p>
-          <a:p>
-            <a:pPr lvl="0" indent="-457200" algn="l" rtl="0">
-              <a:lnSpc>
-                <a:spcPct val="90000"/>
-              </a:lnSpc>
-              <a:spcBef>
-                <a:spcPts val="0"/>
-              </a:spcBef>
-              <a:spcAft>
-                <a:spcPts val="0"/>
-              </a:spcAft>
-              <a:buClr>
-                <a:srgbClr val="22C2EB"/>
-              </a:buClr>
-              <a:buSzPts val="2200"/>
-              <a:buAutoNum type="arabicPeriod"/>
-            </a:pPr>
-            <a:r>
-              <a:rPr lang="en-US" dirty="0"/>
-              <a:t>Wrap It Up!</a:t>
-            </a:r>
-          </a:p>
-          <a:p>
-            <a:pPr lvl="0" indent="-457200" algn="l" rtl="0">
-              <a:lnSpc>
-                <a:spcPct val="90000"/>
-              </a:lnSpc>
-              <a:spcBef>
-                <a:spcPts val="0"/>
-              </a:spcBef>
-              <a:spcAft>
-                <a:spcPts val="0"/>
-              </a:spcAft>
-              <a:buClr>
-                <a:srgbClr val="22C2EB"/>
-              </a:buClr>
-              <a:buSzPts val="2200"/>
-              <a:buAutoNum type="arabicPeriod"/>
-            </a:pPr>
-            <a:endParaRPr lang="en-US" dirty="0"/>
-          </a:p>
-          <a:p>
-            <a:pPr lvl="0" indent="-457200" algn="l" rtl="0">
-              <a:lnSpc>
-                <a:spcPct val="90000"/>
-              </a:lnSpc>
-              <a:spcBef>
-                <a:spcPts val="0"/>
-              </a:spcBef>
-              <a:spcAft>
-                <a:spcPts val="0"/>
-              </a:spcAft>
-              <a:buClr>
-                <a:srgbClr val="22C2EB"/>
-              </a:buClr>
-              <a:buSzPts val="2200"/>
-              <a:buAutoNum type="arabicPeriod"/>
-            </a:pPr>
-            <a:endParaRPr lang="en-US" dirty="0"/>
-          </a:p>
-          <a:p>
-            <a:pPr lvl="0" indent="-457200" algn="l" rtl="0">
-              <a:lnSpc>
-                <a:spcPct val="90000"/>
-              </a:lnSpc>
-              <a:spcBef>
-                <a:spcPts val="0"/>
-              </a:spcBef>
-              <a:spcAft>
-                <a:spcPts val="0"/>
-              </a:spcAft>
-              <a:buClr>
-                <a:srgbClr val="22C2EB"/>
-              </a:buClr>
-              <a:buSzPts val="2200"/>
-              <a:buAutoNum type="arabicPeriod"/>
-            </a:pPr>
-            <a:endParaRPr dirty="0"/>
-          </a:p>
-        </p:txBody>
-      </p:sp>
-    </p:spTree>
-  </p:cSld>
-  <p:clrMapOvr>
-    <a:masterClrMapping/>
-  </p:clrMapOvr>
-</p:sld>
-</file>
-
-<file path=ppt/slides/slide20.xml><?xml version="1.0" encoding="utf-8"?>
+<file path=ppt/slides/slide21.xml><?xml version="1.0" encoding="utf-8"?>
 <p:sld xmlns:a="http://schemas.openxmlformats.org/drawingml/2006/main" xmlns:r="http://schemas.openxmlformats.org/officeDocument/2006/relationships" xmlns:p="http://schemas.openxmlformats.org/presentationml/2006/main">
   <p:cSld>
     <p:spTree>
@@ -33722,7 +34328,7 @@
 </p:sld>
 </file>
 
-<file path=ppt/slides/slide21.xml><?xml version="1.0" encoding="utf-8"?>
+<file path=ppt/slides/slide22.xml><?xml version="1.0" encoding="utf-8"?>
 <p:sld xmlns:a="http://schemas.openxmlformats.org/drawingml/2006/main" xmlns:r="http://schemas.openxmlformats.org/officeDocument/2006/relationships" xmlns:p="http://schemas.openxmlformats.org/presentationml/2006/main">
   <p:cSld>
     <p:spTree>
@@ -34777,7 +35383,7 @@
 </p:sld>
 </file>
 
-<file path=ppt/slides/slide22.xml><?xml version="1.0" encoding="utf-8"?>
+<file path=ppt/slides/slide23.xml><?xml version="1.0" encoding="utf-8"?>
 <p:sld xmlns:a="http://schemas.openxmlformats.org/drawingml/2006/main" xmlns:r="http://schemas.openxmlformats.org/officeDocument/2006/relationships" xmlns:p="http://schemas.openxmlformats.org/presentationml/2006/main">
   <p:cSld>
     <p:spTree>
@@ -35337,7 +35943,7 @@
 </p:sld>
 </file>
 
-<file path=ppt/slides/slide23.xml><?xml version="1.0" encoding="utf-8"?>
+<file path=ppt/slides/slide24.xml><?xml version="1.0" encoding="utf-8"?>
 <p:sld xmlns:a="http://schemas.openxmlformats.org/drawingml/2006/main" xmlns:r="http://schemas.openxmlformats.org/officeDocument/2006/relationships" xmlns:p="http://schemas.openxmlformats.org/presentationml/2006/main">
   <p:cSld>
     <p:spTree>
@@ -35844,7 +36450,7 @@
 </p:sld>
 </file>
 
-<file path=ppt/slides/slide24.xml><?xml version="1.0" encoding="utf-8"?>
+<file path=ppt/slides/slide25.xml><?xml version="1.0" encoding="utf-8"?>
 <p:sld xmlns:a="http://schemas.openxmlformats.org/drawingml/2006/main" xmlns:r="http://schemas.openxmlformats.org/officeDocument/2006/relationships" xmlns:p="http://schemas.openxmlformats.org/presentationml/2006/main">
   <p:cSld>
     <p:spTree>
@@ -36404,7 +37010,7 @@
 </p:sld>
 </file>
 
-<file path=ppt/slides/slide25.xml><?xml version="1.0" encoding="utf-8"?>
+<file path=ppt/slides/slide26.xml><?xml version="1.0" encoding="utf-8"?>
 <p:sld xmlns:a="http://schemas.openxmlformats.org/drawingml/2006/main" xmlns:r="http://schemas.openxmlformats.org/officeDocument/2006/relationships" xmlns:p="http://schemas.openxmlformats.org/presentationml/2006/main">
   <p:cSld>
     <p:spTree>
@@ -36911,7 +37517,7 @@
 </p:sld>
 </file>
 
-<file path=ppt/slides/slide26.xml><?xml version="1.0" encoding="utf-8"?>
+<file path=ppt/slides/slide27.xml><?xml version="1.0" encoding="utf-8"?>
 <p:sld xmlns:a="http://schemas.openxmlformats.org/drawingml/2006/main" xmlns:r="http://schemas.openxmlformats.org/officeDocument/2006/relationships" xmlns:p="http://schemas.openxmlformats.org/presentationml/2006/main">
   <p:cSld>
     <p:spTree>
@@ -37168,7 +37774,7 @@
 </p:sld>
 </file>
 
-<file path=ppt/slides/slide27.xml><?xml version="1.0" encoding="utf-8"?>
+<file path=ppt/slides/slide28.xml><?xml version="1.0" encoding="utf-8"?>
 <p:sld xmlns:a="http://schemas.openxmlformats.org/drawingml/2006/main" xmlns:r="http://schemas.openxmlformats.org/officeDocument/2006/relationships" xmlns:p="http://schemas.openxmlformats.org/presentationml/2006/main">
   <p:cSld>
     <p:spTree>
@@ -37988,7 +38594,7 @@
 </p:sld>
 </file>
 
-<file path=ppt/slides/slide28.xml><?xml version="1.0" encoding="utf-8"?>
+<file path=ppt/slides/slide29.xml><?xml version="1.0" encoding="utf-8"?>
 <p:sld xmlns:a="http://schemas.openxmlformats.org/drawingml/2006/main" xmlns:r="http://schemas.openxmlformats.org/officeDocument/2006/relationships" xmlns:p="http://schemas.openxmlformats.org/presentationml/2006/main">
   <p:cSld>
     <p:spTree>
@@ -38931,7 +39537,580 @@
 </p:sld>
 </file>
 
-<file path=ppt/slides/slide29.xml><?xml version="1.0" encoding="utf-8"?>
+<file path=ppt/slides/slide3.xml><?xml version="1.0" encoding="utf-8"?>
+<p:sld xmlns:a="http://schemas.openxmlformats.org/drawingml/2006/main" xmlns:r="http://schemas.openxmlformats.org/officeDocument/2006/relationships" xmlns:p="http://schemas.openxmlformats.org/presentationml/2006/main">
+  <p:cSld>
+    <p:spTree>
+      <p:nvGrpSpPr>
+        <p:cNvPr id="1" name="Shape 171"/>
+        <p:cNvGrpSpPr/>
+        <p:nvPr/>
+      </p:nvGrpSpPr>
+      <p:grpSpPr>
+        <a:xfrm>
+          <a:off x="0" y="0"/>
+          <a:ext cx="0" cy="0"/>
+          <a:chOff x="0" y="0"/>
+          <a:chExt cx="0" cy="0"/>
+        </a:xfrm>
+      </p:grpSpPr>
+      <p:sp>
+        <p:nvSpPr>
+          <p:cNvPr id="172" name="Google Shape;172;p6"/>
+          <p:cNvSpPr txBox="1">
+            <a:spLocks noGrp="1"/>
+          </p:cNvSpPr>
+          <p:nvPr>
+            <p:ph type="body" idx="1"/>
+          </p:nvPr>
+        </p:nvSpPr>
+        <p:spPr>
+          <a:xfrm>
+            <a:off x="91440" y="1828800"/>
+            <a:ext cx="4114800" cy="1225296"/>
+          </a:xfrm>
+          <a:prstGeom prst="rect">
+            <a:avLst/>
+          </a:prstGeom>
+          <a:noFill/>
+          <a:ln>
+            <a:noFill/>
+          </a:ln>
+        </p:spPr>
+        <p:txBody>
+          <a:bodyPr spcFirstLastPara="1" wrap="square" lIns="91425" tIns="45700" rIns="91425" bIns="45700" anchor="t" anchorCtr="0">
+            <a:noAutofit/>
+          </a:bodyPr>
+          <a:lstStyle/>
+          <a:p>
+            <a:pPr marL="0" lvl="0" indent="0" algn="ctr" rtl="0">
+              <a:lnSpc>
+                <a:spcPct val="107142"/>
+              </a:lnSpc>
+              <a:spcBef>
+                <a:spcPts val="0"/>
+              </a:spcBef>
+              <a:spcAft>
+                <a:spcPts val="0"/>
+              </a:spcAft>
+              <a:buClr>
+                <a:schemeClr val="lt1"/>
+              </a:buClr>
+              <a:buSzPts val="2800"/>
+              <a:buNone/>
+            </a:pPr>
+            <a:r>
+              <a:rPr lang="en-US" dirty="0"/>
+              <a:t>What Are REST APIs?</a:t>
+            </a:r>
+            <a:endParaRPr dirty="0"/>
+          </a:p>
+        </p:txBody>
+      </p:sp>
+      <p:sp>
+        <p:nvSpPr>
+          <p:cNvPr id="173" name="Google Shape;173;p6"/>
+          <p:cNvSpPr txBox="1">
+            <a:spLocks noGrp="1"/>
+          </p:cNvSpPr>
+          <p:nvPr>
+            <p:ph type="body" idx="2"/>
+          </p:nvPr>
+        </p:nvSpPr>
+        <p:spPr>
+          <a:xfrm>
+            <a:off x="4572000" y="255722"/>
+            <a:ext cx="4343400" cy="3264718"/>
+          </a:xfrm>
+          <a:prstGeom prst="rect">
+            <a:avLst/>
+          </a:prstGeom>
+          <a:noFill/>
+          <a:ln>
+            <a:noFill/>
+          </a:ln>
+        </p:spPr>
+        <p:txBody>
+          <a:bodyPr spcFirstLastPara="1" wrap="square" lIns="91425" tIns="45700" rIns="91425" bIns="45700" anchor="t" anchorCtr="0">
+            <a:noAutofit/>
+          </a:bodyPr>
+          <a:lstStyle/>
+          <a:p>
+            <a:pPr marL="285750" lvl="0" indent="-285750">
+              <a:spcBef>
+                <a:spcPts val="0"/>
+              </a:spcBef>
+              <a:buFont typeface="Arial" panose="020B0604020202020204" pitchFamily="34" charset="0"/>
+              <a:buChar char="•"/>
+            </a:pPr>
+            <a:r>
+              <a:rPr lang="en-US" b="1" dirty="0">
+                <a:solidFill>
+                  <a:schemeClr val="tx1"/>
+                </a:solidFill>
+              </a:rPr>
+              <a:t>Re</a:t>
+            </a:r>
+            <a:r>
+              <a:rPr lang="en-US" dirty="0">
+                <a:solidFill>
+                  <a:schemeClr val="tx1"/>
+                </a:solidFill>
+              </a:rPr>
+              <a:t>presentational </a:t>
+            </a:r>
+            <a:r>
+              <a:rPr lang="en-US" b="1" dirty="0">
+                <a:solidFill>
+                  <a:schemeClr val="tx1"/>
+                </a:solidFill>
+              </a:rPr>
+              <a:t>S</a:t>
+            </a:r>
+            <a:r>
+              <a:rPr lang="en-US" dirty="0">
+                <a:solidFill>
+                  <a:schemeClr val="tx1"/>
+                </a:solidFill>
+              </a:rPr>
+              <a:t>tate </a:t>
+            </a:r>
+            <a:r>
+              <a:rPr lang="en-US" b="1" dirty="0">
+                <a:solidFill>
+                  <a:schemeClr val="tx1"/>
+                </a:solidFill>
+              </a:rPr>
+              <a:t>T</a:t>
+            </a:r>
+            <a:r>
+              <a:rPr lang="en-US" dirty="0">
+                <a:solidFill>
+                  <a:schemeClr val="tx1"/>
+                </a:solidFill>
+              </a:rPr>
+              <a:t>ransfer </a:t>
+            </a:r>
+            <a:r>
+              <a:rPr lang="en-US" b="1" dirty="0">
+                <a:solidFill>
+                  <a:schemeClr val="tx1"/>
+                </a:solidFill>
+              </a:rPr>
+              <a:t>A</a:t>
+            </a:r>
+            <a:r>
+              <a:rPr lang="en-US" dirty="0">
+                <a:solidFill>
+                  <a:schemeClr val="tx1"/>
+                </a:solidFill>
+              </a:rPr>
+              <a:t>pplication </a:t>
+            </a:r>
+            <a:r>
+              <a:rPr lang="en-US" b="1" dirty="0">
+                <a:solidFill>
+                  <a:schemeClr val="tx1"/>
+                </a:solidFill>
+              </a:rPr>
+              <a:t>P</a:t>
+            </a:r>
+            <a:r>
+              <a:rPr lang="en-US" dirty="0">
+                <a:solidFill>
+                  <a:schemeClr val="tx1"/>
+                </a:solidFill>
+              </a:rPr>
+              <a:t>rogramming </a:t>
+            </a:r>
+            <a:r>
+              <a:rPr lang="en-US" b="1" dirty="0">
+                <a:solidFill>
+                  <a:schemeClr val="tx1"/>
+                </a:solidFill>
+              </a:rPr>
+              <a:t>I</a:t>
+            </a:r>
+            <a:r>
+              <a:rPr lang="en-US" dirty="0">
+                <a:solidFill>
+                  <a:schemeClr val="tx1"/>
+                </a:solidFill>
+              </a:rPr>
+              <a:t>nterface (probably not helpful)</a:t>
+            </a:r>
+          </a:p>
+          <a:p>
+            <a:pPr marL="285750" lvl="0" indent="-285750">
+              <a:spcBef>
+                <a:spcPts val="0"/>
+              </a:spcBef>
+              <a:buFont typeface="Arial" panose="020B0604020202020204" pitchFamily="34" charset="0"/>
+              <a:buChar char="•"/>
+            </a:pPr>
+            <a:endParaRPr lang="en-US" dirty="0">
+              <a:solidFill>
+                <a:schemeClr val="tx1"/>
+              </a:solidFill>
+            </a:endParaRPr>
+          </a:p>
+          <a:p>
+            <a:pPr marL="285750" lvl="0" indent="-285750">
+              <a:spcBef>
+                <a:spcPts val="0"/>
+              </a:spcBef>
+              <a:spcAft>
+                <a:spcPts val="600"/>
+              </a:spcAft>
+              <a:buFont typeface="Arial" panose="020B0604020202020204" pitchFamily="34" charset="0"/>
+              <a:buChar char="•"/>
+            </a:pPr>
+            <a:r>
+              <a:rPr lang="en-US" dirty="0">
+                <a:solidFill>
+                  <a:schemeClr val="tx1"/>
+                </a:solidFill>
+              </a:rPr>
+              <a:t>A design pattern that:</a:t>
+            </a:r>
+          </a:p>
+          <a:p>
+            <a:pPr marL="742950" lvl="1" indent="-285750">
+              <a:spcBef>
+                <a:spcPts val="0"/>
+              </a:spcBef>
+              <a:spcAft>
+                <a:spcPts val="600"/>
+              </a:spcAft>
+              <a:buFont typeface="Arial" panose="020B0604020202020204" pitchFamily="34" charset="0"/>
+              <a:buChar char="•"/>
+            </a:pPr>
+            <a:r>
+              <a:rPr lang="en-US" dirty="0">
+                <a:solidFill>
+                  <a:schemeClr val="tx1"/>
+                </a:solidFill>
+              </a:rPr>
+              <a:t>Defines web services</a:t>
+            </a:r>
+          </a:p>
+          <a:p>
+            <a:pPr marL="742950" lvl="1" indent="-285750">
+              <a:spcBef>
+                <a:spcPts val="0"/>
+              </a:spcBef>
+              <a:spcAft>
+                <a:spcPts val="600"/>
+              </a:spcAft>
+              <a:buFont typeface="Arial" panose="020B0604020202020204" pitchFamily="34" charset="0"/>
+              <a:buChar char="•"/>
+            </a:pPr>
+            <a:r>
+              <a:rPr lang="en-US" dirty="0">
+                <a:solidFill>
+                  <a:schemeClr val="tx1"/>
+                </a:solidFill>
+              </a:rPr>
+              <a:t>Uses HTTP requests to GET, PUT, POST and DELETE data</a:t>
+            </a:r>
+          </a:p>
+          <a:p>
+            <a:pPr marL="742950" lvl="1" indent="-285750">
+              <a:spcBef>
+                <a:spcPts val="0"/>
+              </a:spcBef>
+              <a:spcAft>
+                <a:spcPts val="600"/>
+              </a:spcAft>
+              <a:buFont typeface="Arial" panose="020B0604020202020204" pitchFamily="34" charset="0"/>
+              <a:buChar char="•"/>
+            </a:pPr>
+            <a:r>
+              <a:rPr lang="en-US" dirty="0">
+                <a:solidFill>
+                  <a:schemeClr val="tx1"/>
+                </a:solidFill>
+              </a:rPr>
+              <a:t>Consists of client and the web service resource</a:t>
+            </a:r>
+          </a:p>
+        </p:txBody>
+      </p:sp>
+    </p:spTree>
+  </p:cSld>
+  <p:clrMapOvr>
+    <a:masterClrMapping/>
+  </p:clrMapOvr>
+  <p:timing>
+    <p:tnLst>
+      <p:par>
+        <p:cTn id="1" dur="indefinite" restart="never" nodeType="tmRoot">
+          <p:childTnLst>
+            <p:seq concurrent="1" nextAc="seek">
+              <p:cTn id="2" dur="indefinite" nodeType="mainSeq">
+                <p:childTnLst>
+                  <p:par>
+                    <p:cTn id="3" fill="hold">
+                      <p:stCondLst>
+                        <p:cond delay="indefinite"/>
+                        <p:cond evt="onBegin" delay="0">
+                          <p:tn val="2"/>
+                        </p:cond>
+                      </p:stCondLst>
+                      <p:childTnLst>
+                        <p:par>
+                          <p:cTn id="4" fill="hold">
+                            <p:stCondLst>
+                              <p:cond delay="0"/>
+                            </p:stCondLst>
+                            <p:childTnLst>
+                              <p:par>
+                                <p:cTn id="5" presetID="10" presetClass="entr" presetSubtype="0" fill="hold" nodeType="withEffect">
+                                  <p:stCondLst>
+                                    <p:cond delay="0"/>
+                                  </p:stCondLst>
+                                  <p:childTnLst>
+                                    <p:set>
+                                      <p:cBhvr>
+                                        <p:cTn id="6" dur="1" fill="hold">
+                                          <p:stCondLst>
+                                            <p:cond delay="0"/>
+                                          </p:stCondLst>
+                                        </p:cTn>
+                                        <p:tgtEl>
+                                          <p:spTgt spid="173">
+                                            <p:txEl>
+                                              <p:pRg st="0" end="0"/>
+                                            </p:txEl>
+                                          </p:spTgt>
+                                        </p:tgtEl>
+                                        <p:attrNameLst>
+                                          <p:attrName>style.visibility</p:attrName>
+                                        </p:attrNameLst>
+                                      </p:cBhvr>
+                                      <p:to>
+                                        <p:strVal val="visible"/>
+                                      </p:to>
+                                    </p:set>
+                                    <p:animEffect transition="in" filter="fade">
+                                      <p:cBhvr>
+                                        <p:cTn id="7" dur="1000"/>
+                                        <p:tgtEl>
+                                          <p:spTgt spid="173">
+                                            <p:txEl>
+                                              <p:pRg st="0" end="0"/>
+                                            </p:txEl>
+                                          </p:spTgt>
+                                        </p:tgtEl>
+                                      </p:cBhvr>
+                                    </p:animEffect>
+                                  </p:childTnLst>
+                                </p:cTn>
+                              </p:par>
+                              <p:par>
+                                <p:cTn id="8" presetID="10" presetClass="entr" presetSubtype="0" fill="hold" nodeType="withEffect">
+                                  <p:stCondLst>
+                                    <p:cond delay="0"/>
+                                  </p:stCondLst>
+                                  <p:childTnLst>
+                                    <p:set>
+                                      <p:cBhvr>
+                                        <p:cTn id="9" dur="1" fill="hold">
+                                          <p:stCondLst>
+                                            <p:cond delay="0"/>
+                                          </p:stCondLst>
+                                        </p:cTn>
+                                        <p:tgtEl>
+                                          <p:spTgt spid="173">
+                                            <p:txEl>
+                                              <p:pRg st="2" end="2"/>
+                                            </p:txEl>
+                                          </p:spTgt>
+                                        </p:tgtEl>
+                                        <p:attrNameLst>
+                                          <p:attrName>style.visibility</p:attrName>
+                                        </p:attrNameLst>
+                                      </p:cBhvr>
+                                      <p:to>
+                                        <p:strVal val="visible"/>
+                                      </p:to>
+                                    </p:set>
+                                    <p:animEffect transition="in" filter="fade">
+                                      <p:cBhvr>
+                                        <p:cTn id="10" dur="1000"/>
+                                        <p:tgtEl>
+                                          <p:spTgt spid="173">
+                                            <p:txEl>
+                                              <p:pRg st="2" end="2"/>
+                                            </p:txEl>
+                                          </p:spTgt>
+                                        </p:tgtEl>
+                                      </p:cBhvr>
+                                    </p:animEffect>
+                                  </p:childTnLst>
+                                </p:cTn>
+                              </p:par>
+                              <p:par>
+                                <p:cTn id="11" presetID="10" presetClass="entr" presetSubtype="0" fill="hold" nodeType="withEffect">
+                                  <p:stCondLst>
+                                    <p:cond delay="0"/>
+                                  </p:stCondLst>
+                                  <p:childTnLst>
+                                    <p:set>
+                                      <p:cBhvr>
+                                        <p:cTn id="12" dur="1" fill="hold">
+                                          <p:stCondLst>
+                                            <p:cond delay="0"/>
+                                          </p:stCondLst>
+                                        </p:cTn>
+                                        <p:tgtEl>
+                                          <p:spTgt spid="173">
+                                            <p:txEl>
+                                              <p:pRg st="3" end="3"/>
+                                            </p:txEl>
+                                          </p:spTgt>
+                                        </p:tgtEl>
+                                        <p:attrNameLst>
+                                          <p:attrName>style.visibility</p:attrName>
+                                        </p:attrNameLst>
+                                      </p:cBhvr>
+                                      <p:to>
+                                        <p:strVal val="visible"/>
+                                      </p:to>
+                                    </p:set>
+                                    <p:animEffect transition="in" filter="fade">
+                                      <p:cBhvr>
+                                        <p:cTn id="13" dur="1000"/>
+                                        <p:tgtEl>
+                                          <p:spTgt spid="173">
+                                            <p:txEl>
+                                              <p:pRg st="3" end="3"/>
+                                            </p:txEl>
+                                          </p:spTgt>
+                                        </p:tgtEl>
+                                      </p:cBhvr>
+                                    </p:animEffect>
+                                  </p:childTnLst>
+                                </p:cTn>
+                              </p:par>
+                              <p:par>
+                                <p:cTn id="14" presetID="10" presetClass="entr" presetSubtype="0" fill="hold" nodeType="withEffect">
+                                  <p:stCondLst>
+                                    <p:cond delay="0"/>
+                                  </p:stCondLst>
+                                  <p:childTnLst>
+                                    <p:set>
+                                      <p:cBhvr>
+                                        <p:cTn id="15" dur="1" fill="hold">
+                                          <p:stCondLst>
+                                            <p:cond delay="0"/>
+                                          </p:stCondLst>
+                                        </p:cTn>
+                                        <p:tgtEl>
+                                          <p:spTgt spid="173">
+                                            <p:txEl>
+                                              <p:pRg st="4" end="4"/>
+                                            </p:txEl>
+                                          </p:spTgt>
+                                        </p:tgtEl>
+                                        <p:attrNameLst>
+                                          <p:attrName>style.visibility</p:attrName>
+                                        </p:attrNameLst>
+                                      </p:cBhvr>
+                                      <p:to>
+                                        <p:strVal val="visible"/>
+                                      </p:to>
+                                    </p:set>
+                                    <p:animEffect transition="in" filter="fade">
+                                      <p:cBhvr>
+                                        <p:cTn id="16" dur="1000"/>
+                                        <p:tgtEl>
+                                          <p:spTgt spid="173">
+                                            <p:txEl>
+                                              <p:pRg st="4" end="4"/>
+                                            </p:txEl>
+                                          </p:spTgt>
+                                        </p:tgtEl>
+                                      </p:cBhvr>
+                                    </p:animEffect>
+                                  </p:childTnLst>
+                                </p:cTn>
+                              </p:par>
+                              <p:par>
+                                <p:cTn id="17" presetID="10" presetClass="entr" presetSubtype="0" fill="hold" nodeType="withEffect">
+                                  <p:stCondLst>
+                                    <p:cond delay="0"/>
+                                  </p:stCondLst>
+                                  <p:childTnLst>
+                                    <p:set>
+                                      <p:cBhvr>
+                                        <p:cTn id="18" dur="1" fill="hold">
+                                          <p:stCondLst>
+                                            <p:cond delay="0"/>
+                                          </p:stCondLst>
+                                        </p:cTn>
+                                        <p:tgtEl>
+                                          <p:spTgt spid="173">
+                                            <p:txEl>
+                                              <p:pRg st="5" end="5"/>
+                                            </p:txEl>
+                                          </p:spTgt>
+                                        </p:tgtEl>
+                                        <p:attrNameLst>
+                                          <p:attrName>style.visibility</p:attrName>
+                                        </p:attrNameLst>
+                                      </p:cBhvr>
+                                      <p:to>
+                                        <p:strVal val="visible"/>
+                                      </p:to>
+                                    </p:set>
+                                    <p:animEffect transition="in" filter="fade">
+                                      <p:cBhvr>
+                                        <p:cTn id="19" dur="1000"/>
+                                        <p:tgtEl>
+                                          <p:spTgt spid="173">
+                                            <p:txEl>
+                                              <p:pRg st="5" end="5"/>
+                                            </p:txEl>
+                                          </p:spTgt>
+                                        </p:tgtEl>
+                                      </p:cBhvr>
+                                    </p:animEffect>
+                                  </p:childTnLst>
+                                </p:cTn>
+                              </p:par>
+                            </p:childTnLst>
+                          </p:cTn>
+                        </p:par>
+                      </p:childTnLst>
+                    </p:cTn>
+                  </p:par>
+                </p:childTnLst>
+              </p:cTn>
+              <p:prevCondLst>
+                <p:cond evt="onPrev" delay="0">
+                  <p:tgtEl>
+                    <p:sldTgt/>
+                  </p:tgtEl>
+                </p:cond>
+              </p:prevCondLst>
+              <p:nextCondLst>
+                <p:cond evt="onNext" delay="0">
+                  <p:tgtEl>
+                    <p:sldTgt/>
+                  </p:tgtEl>
+                </p:cond>
+              </p:nextCondLst>
+            </p:seq>
+          </p:childTnLst>
+        </p:cTn>
+      </p:par>
+    </p:tnLst>
+  </p:timing>
+</p:sld>
+</file>
+
+<file path=ppt/slides/slide30.xml><?xml version="1.0" encoding="utf-8"?>
 <p:sld xmlns:a="http://schemas.openxmlformats.org/drawingml/2006/main" xmlns:r="http://schemas.openxmlformats.org/officeDocument/2006/relationships" xmlns:p="http://schemas.openxmlformats.org/presentationml/2006/main">
   <p:cSld>
     <p:spTree>
@@ -40685,568 +41864,7 @@
 </p:sld>
 </file>
 
-<file path=ppt/slides/slide3.xml><?xml version="1.0" encoding="utf-8"?>
-<p:sld xmlns:a="http://schemas.openxmlformats.org/drawingml/2006/main" xmlns:r="http://schemas.openxmlformats.org/officeDocument/2006/relationships" xmlns:p="http://schemas.openxmlformats.org/presentationml/2006/main">
-  <p:cSld>
-    <p:spTree>
-      <p:nvGrpSpPr>
-        <p:cNvPr id="1" name="Shape 171"/>
-        <p:cNvGrpSpPr/>
-        <p:nvPr/>
-      </p:nvGrpSpPr>
-      <p:grpSpPr>
-        <a:xfrm>
-          <a:off x="0" y="0"/>
-          <a:ext cx="0" cy="0"/>
-          <a:chOff x="0" y="0"/>
-          <a:chExt cx="0" cy="0"/>
-        </a:xfrm>
-      </p:grpSpPr>
-      <p:sp>
-        <p:nvSpPr>
-          <p:cNvPr id="172" name="Google Shape;172;p6"/>
-          <p:cNvSpPr txBox="1">
-            <a:spLocks noGrp="1"/>
-          </p:cNvSpPr>
-          <p:nvPr>
-            <p:ph type="body" idx="1"/>
-          </p:nvPr>
-        </p:nvSpPr>
-        <p:spPr>
-          <a:xfrm>
-            <a:off x="91440" y="1828800"/>
-            <a:ext cx="4114800" cy="1225296"/>
-          </a:xfrm>
-          <a:prstGeom prst="rect">
-            <a:avLst/>
-          </a:prstGeom>
-          <a:noFill/>
-          <a:ln>
-            <a:noFill/>
-          </a:ln>
-        </p:spPr>
-        <p:txBody>
-          <a:bodyPr spcFirstLastPara="1" wrap="square" lIns="91425" tIns="45700" rIns="91425" bIns="45700" anchor="t" anchorCtr="0">
-            <a:noAutofit/>
-          </a:bodyPr>
-          <a:lstStyle/>
-          <a:p>
-            <a:pPr marL="0" lvl="0" indent="0" algn="ctr" rtl="0">
-              <a:lnSpc>
-                <a:spcPct val="107142"/>
-              </a:lnSpc>
-              <a:spcBef>
-                <a:spcPts val="0"/>
-              </a:spcBef>
-              <a:spcAft>
-                <a:spcPts val="0"/>
-              </a:spcAft>
-              <a:buClr>
-                <a:schemeClr val="lt1"/>
-              </a:buClr>
-              <a:buSzPts val="2800"/>
-              <a:buNone/>
-            </a:pPr>
-            <a:r>
-              <a:rPr lang="en-US" dirty="0"/>
-              <a:t>What Are REST APIs?</a:t>
-            </a:r>
-            <a:endParaRPr dirty="0"/>
-          </a:p>
-        </p:txBody>
-      </p:sp>
-      <p:sp>
-        <p:nvSpPr>
-          <p:cNvPr id="173" name="Google Shape;173;p6"/>
-          <p:cNvSpPr txBox="1">
-            <a:spLocks noGrp="1"/>
-          </p:cNvSpPr>
-          <p:nvPr>
-            <p:ph type="body" idx="2"/>
-          </p:nvPr>
-        </p:nvSpPr>
-        <p:spPr>
-          <a:xfrm>
-            <a:off x="4572000" y="255722"/>
-            <a:ext cx="4343400" cy="3264718"/>
-          </a:xfrm>
-          <a:prstGeom prst="rect">
-            <a:avLst/>
-          </a:prstGeom>
-          <a:noFill/>
-          <a:ln>
-            <a:noFill/>
-          </a:ln>
-        </p:spPr>
-        <p:txBody>
-          <a:bodyPr spcFirstLastPara="1" wrap="square" lIns="91425" tIns="45700" rIns="91425" bIns="45700" anchor="t" anchorCtr="0">
-            <a:noAutofit/>
-          </a:bodyPr>
-          <a:lstStyle/>
-          <a:p>
-            <a:pPr marL="285750" lvl="0" indent="-285750">
-              <a:spcBef>
-                <a:spcPts val="0"/>
-              </a:spcBef>
-              <a:buFont typeface="Arial" panose="020B0604020202020204" pitchFamily="34" charset="0"/>
-              <a:buChar char="•"/>
-            </a:pPr>
-            <a:r>
-              <a:rPr lang="en-US" b="1" dirty="0">
-                <a:solidFill>
-                  <a:schemeClr val="tx1"/>
-                </a:solidFill>
-              </a:rPr>
-              <a:t>Re</a:t>
-            </a:r>
-            <a:r>
-              <a:rPr lang="en-US" dirty="0">
-                <a:solidFill>
-                  <a:schemeClr val="tx1"/>
-                </a:solidFill>
-              </a:rPr>
-              <a:t>presentational </a:t>
-            </a:r>
-            <a:r>
-              <a:rPr lang="en-US" b="1" dirty="0">
-                <a:solidFill>
-                  <a:schemeClr val="tx1"/>
-                </a:solidFill>
-              </a:rPr>
-              <a:t>S</a:t>
-            </a:r>
-            <a:r>
-              <a:rPr lang="en-US" dirty="0">
-                <a:solidFill>
-                  <a:schemeClr val="tx1"/>
-                </a:solidFill>
-              </a:rPr>
-              <a:t>tate </a:t>
-            </a:r>
-            <a:r>
-              <a:rPr lang="en-US" b="1" dirty="0">
-                <a:solidFill>
-                  <a:schemeClr val="tx1"/>
-                </a:solidFill>
-              </a:rPr>
-              <a:t>T</a:t>
-            </a:r>
-            <a:r>
-              <a:rPr lang="en-US" dirty="0">
-                <a:solidFill>
-                  <a:schemeClr val="tx1"/>
-                </a:solidFill>
-              </a:rPr>
-              <a:t>ransfer </a:t>
-            </a:r>
-            <a:r>
-              <a:rPr lang="en-US" b="1" dirty="0">
-                <a:solidFill>
-                  <a:schemeClr val="tx1"/>
-                </a:solidFill>
-              </a:rPr>
-              <a:t>A</a:t>
-            </a:r>
-            <a:r>
-              <a:rPr lang="en-US" dirty="0">
-                <a:solidFill>
-                  <a:schemeClr val="tx1"/>
-                </a:solidFill>
-              </a:rPr>
-              <a:t>pplication </a:t>
-            </a:r>
-            <a:r>
-              <a:rPr lang="en-US" b="1" dirty="0">
-                <a:solidFill>
-                  <a:schemeClr val="tx1"/>
-                </a:solidFill>
-              </a:rPr>
-              <a:t>P</a:t>
-            </a:r>
-            <a:r>
-              <a:rPr lang="en-US" dirty="0">
-                <a:solidFill>
-                  <a:schemeClr val="tx1"/>
-                </a:solidFill>
-              </a:rPr>
-              <a:t>rogramming </a:t>
-            </a:r>
-            <a:r>
-              <a:rPr lang="en-US" b="1" dirty="0">
-                <a:solidFill>
-                  <a:schemeClr val="tx1"/>
-                </a:solidFill>
-              </a:rPr>
-              <a:t>I</a:t>
-            </a:r>
-            <a:r>
-              <a:rPr lang="en-US" dirty="0">
-                <a:solidFill>
-                  <a:schemeClr val="tx1"/>
-                </a:solidFill>
-              </a:rPr>
-              <a:t>nterface (probably not helpful)</a:t>
-            </a:r>
-          </a:p>
-          <a:p>
-            <a:pPr marL="285750" lvl="0" indent="-285750">
-              <a:spcBef>
-                <a:spcPts val="0"/>
-              </a:spcBef>
-              <a:buFont typeface="Arial" panose="020B0604020202020204" pitchFamily="34" charset="0"/>
-              <a:buChar char="•"/>
-            </a:pPr>
-            <a:endParaRPr lang="en-US" dirty="0">
-              <a:solidFill>
-                <a:schemeClr val="tx1"/>
-              </a:solidFill>
-            </a:endParaRPr>
-          </a:p>
-          <a:p>
-            <a:pPr marL="285750" lvl="0" indent="-285750">
-              <a:spcBef>
-                <a:spcPts val="0"/>
-              </a:spcBef>
-              <a:buFont typeface="Arial" panose="020B0604020202020204" pitchFamily="34" charset="0"/>
-              <a:buChar char="•"/>
-            </a:pPr>
-            <a:r>
-              <a:rPr lang="en-US" dirty="0">
-                <a:solidFill>
-                  <a:schemeClr val="tx1"/>
-                </a:solidFill>
-              </a:rPr>
-              <a:t>A design pattern that:</a:t>
-            </a:r>
-          </a:p>
-          <a:p>
-            <a:pPr marL="742950" lvl="1" indent="-285750">
-              <a:spcBef>
-                <a:spcPts val="0"/>
-              </a:spcBef>
-              <a:buFont typeface="Arial" panose="020B0604020202020204" pitchFamily="34" charset="0"/>
-              <a:buChar char="•"/>
-            </a:pPr>
-            <a:r>
-              <a:rPr lang="en-US" dirty="0">
-                <a:solidFill>
-                  <a:schemeClr val="tx1"/>
-                </a:solidFill>
-              </a:rPr>
-              <a:t>Defines web services</a:t>
-            </a:r>
-          </a:p>
-          <a:p>
-            <a:pPr marL="742950" lvl="1" indent="-285750">
-              <a:spcBef>
-                <a:spcPts val="0"/>
-              </a:spcBef>
-              <a:buFont typeface="Arial" panose="020B0604020202020204" pitchFamily="34" charset="0"/>
-              <a:buChar char="•"/>
-            </a:pPr>
-            <a:r>
-              <a:rPr lang="en-US" dirty="0">
-                <a:solidFill>
-                  <a:schemeClr val="tx1"/>
-                </a:solidFill>
-              </a:rPr>
-              <a:t>Uses HTTP requests to GET, PUT, POST and DELETE data</a:t>
-            </a:r>
-          </a:p>
-          <a:p>
-            <a:pPr marL="742950" lvl="1" indent="-285750">
-              <a:spcBef>
-                <a:spcPts val="0"/>
-              </a:spcBef>
-              <a:buFont typeface="Arial" panose="020B0604020202020204" pitchFamily="34" charset="0"/>
-              <a:buChar char="•"/>
-            </a:pPr>
-            <a:r>
-              <a:rPr lang="en-US" dirty="0">
-                <a:solidFill>
-                  <a:schemeClr val="tx1"/>
-                </a:solidFill>
-              </a:rPr>
-              <a:t>Consists of client and the web service resource</a:t>
-            </a:r>
-          </a:p>
-        </p:txBody>
-      </p:sp>
-    </p:spTree>
-  </p:cSld>
-  <p:clrMapOvr>
-    <a:masterClrMapping/>
-  </p:clrMapOvr>
-  <p:timing>
-    <p:tnLst>
-      <p:par>
-        <p:cTn id="1" dur="indefinite" restart="never" nodeType="tmRoot">
-          <p:childTnLst>
-            <p:seq concurrent="1" nextAc="seek">
-              <p:cTn id="2" dur="indefinite" nodeType="mainSeq">
-                <p:childTnLst>
-                  <p:par>
-                    <p:cTn id="3" fill="hold">
-                      <p:stCondLst>
-                        <p:cond delay="indefinite"/>
-                        <p:cond evt="onBegin" delay="0">
-                          <p:tn val="2"/>
-                        </p:cond>
-                      </p:stCondLst>
-                      <p:childTnLst>
-                        <p:par>
-                          <p:cTn id="4" fill="hold">
-                            <p:stCondLst>
-                              <p:cond delay="0"/>
-                            </p:stCondLst>
-                            <p:childTnLst>
-                              <p:par>
-                                <p:cTn id="5" presetID="10" presetClass="entr" presetSubtype="0" fill="hold" nodeType="withEffect">
-                                  <p:stCondLst>
-                                    <p:cond delay="0"/>
-                                  </p:stCondLst>
-                                  <p:childTnLst>
-                                    <p:set>
-                                      <p:cBhvr>
-                                        <p:cTn id="6" dur="1" fill="hold">
-                                          <p:stCondLst>
-                                            <p:cond delay="0"/>
-                                          </p:stCondLst>
-                                        </p:cTn>
-                                        <p:tgtEl>
-                                          <p:spTgt spid="173">
-                                            <p:txEl>
-                                              <p:pRg st="0" end="0"/>
-                                            </p:txEl>
-                                          </p:spTgt>
-                                        </p:tgtEl>
-                                        <p:attrNameLst>
-                                          <p:attrName>style.visibility</p:attrName>
-                                        </p:attrNameLst>
-                                      </p:cBhvr>
-                                      <p:to>
-                                        <p:strVal val="visible"/>
-                                      </p:to>
-                                    </p:set>
-                                    <p:animEffect transition="in" filter="fade">
-                                      <p:cBhvr>
-                                        <p:cTn id="7" dur="1000"/>
-                                        <p:tgtEl>
-                                          <p:spTgt spid="173">
-                                            <p:txEl>
-                                              <p:pRg st="0" end="0"/>
-                                            </p:txEl>
-                                          </p:spTgt>
-                                        </p:tgtEl>
-                                      </p:cBhvr>
-                                    </p:animEffect>
-                                  </p:childTnLst>
-                                </p:cTn>
-                              </p:par>
-                              <p:par>
-                                <p:cTn id="8" presetID="10" presetClass="entr" presetSubtype="0" fill="hold" nodeType="withEffect">
-                                  <p:stCondLst>
-                                    <p:cond delay="0"/>
-                                  </p:stCondLst>
-                                  <p:childTnLst>
-                                    <p:set>
-                                      <p:cBhvr>
-                                        <p:cTn id="9" dur="1" fill="hold">
-                                          <p:stCondLst>
-                                            <p:cond delay="0"/>
-                                          </p:stCondLst>
-                                        </p:cTn>
-                                        <p:tgtEl>
-                                          <p:spTgt spid="173">
-                                            <p:txEl>
-                                              <p:pRg st="2" end="2"/>
-                                            </p:txEl>
-                                          </p:spTgt>
-                                        </p:tgtEl>
-                                        <p:attrNameLst>
-                                          <p:attrName>style.visibility</p:attrName>
-                                        </p:attrNameLst>
-                                      </p:cBhvr>
-                                      <p:to>
-                                        <p:strVal val="visible"/>
-                                      </p:to>
-                                    </p:set>
-                                    <p:animEffect transition="in" filter="fade">
-                                      <p:cBhvr>
-                                        <p:cTn id="10" dur="1000"/>
-                                        <p:tgtEl>
-                                          <p:spTgt spid="173">
-                                            <p:txEl>
-                                              <p:pRg st="2" end="2"/>
-                                            </p:txEl>
-                                          </p:spTgt>
-                                        </p:tgtEl>
-                                      </p:cBhvr>
-                                    </p:animEffect>
-                                  </p:childTnLst>
-                                </p:cTn>
-                              </p:par>
-                              <p:par>
-                                <p:cTn id="11" presetID="10" presetClass="entr" presetSubtype="0" fill="hold" nodeType="withEffect">
-                                  <p:stCondLst>
-                                    <p:cond delay="0"/>
-                                  </p:stCondLst>
-                                  <p:childTnLst>
-                                    <p:set>
-                                      <p:cBhvr>
-                                        <p:cTn id="12" dur="1" fill="hold">
-                                          <p:stCondLst>
-                                            <p:cond delay="0"/>
-                                          </p:stCondLst>
-                                        </p:cTn>
-                                        <p:tgtEl>
-                                          <p:spTgt spid="173">
-                                            <p:txEl>
-                                              <p:pRg st="3" end="3"/>
-                                            </p:txEl>
-                                          </p:spTgt>
-                                        </p:tgtEl>
-                                        <p:attrNameLst>
-                                          <p:attrName>style.visibility</p:attrName>
-                                        </p:attrNameLst>
-                                      </p:cBhvr>
-                                      <p:to>
-                                        <p:strVal val="visible"/>
-                                      </p:to>
-                                    </p:set>
-                                    <p:animEffect transition="in" filter="fade">
-                                      <p:cBhvr>
-                                        <p:cTn id="13" dur="1000"/>
-                                        <p:tgtEl>
-                                          <p:spTgt spid="173">
-                                            <p:txEl>
-                                              <p:pRg st="3" end="3"/>
-                                            </p:txEl>
-                                          </p:spTgt>
-                                        </p:tgtEl>
-                                      </p:cBhvr>
-                                    </p:animEffect>
-                                  </p:childTnLst>
-                                </p:cTn>
-                              </p:par>
-                              <p:par>
-                                <p:cTn id="14" presetID="10" presetClass="entr" presetSubtype="0" fill="hold" nodeType="withEffect">
-                                  <p:stCondLst>
-                                    <p:cond delay="0"/>
-                                  </p:stCondLst>
-                                  <p:childTnLst>
-                                    <p:set>
-                                      <p:cBhvr>
-                                        <p:cTn id="15" dur="1" fill="hold">
-                                          <p:stCondLst>
-                                            <p:cond delay="0"/>
-                                          </p:stCondLst>
-                                        </p:cTn>
-                                        <p:tgtEl>
-                                          <p:spTgt spid="173">
-                                            <p:txEl>
-                                              <p:pRg st="4" end="4"/>
-                                            </p:txEl>
-                                          </p:spTgt>
-                                        </p:tgtEl>
-                                        <p:attrNameLst>
-                                          <p:attrName>style.visibility</p:attrName>
-                                        </p:attrNameLst>
-                                      </p:cBhvr>
-                                      <p:to>
-                                        <p:strVal val="visible"/>
-                                      </p:to>
-                                    </p:set>
-                                    <p:animEffect transition="in" filter="fade">
-                                      <p:cBhvr>
-                                        <p:cTn id="16" dur="1000"/>
-                                        <p:tgtEl>
-                                          <p:spTgt spid="173">
-                                            <p:txEl>
-                                              <p:pRg st="4" end="4"/>
-                                            </p:txEl>
-                                          </p:spTgt>
-                                        </p:tgtEl>
-                                      </p:cBhvr>
-                                    </p:animEffect>
-                                  </p:childTnLst>
-                                </p:cTn>
-                              </p:par>
-                              <p:par>
-                                <p:cTn id="17" presetID="10" presetClass="entr" presetSubtype="0" fill="hold" nodeType="withEffect">
-                                  <p:stCondLst>
-                                    <p:cond delay="0"/>
-                                  </p:stCondLst>
-                                  <p:childTnLst>
-                                    <p:set>
-                                      <p:cBhvr>
-                                        <p:cTn id="18" dur="1" fill="hold">
-                                          <p:stCondLst>
-                                            <p:cond delay="0"/>
-                                          </p:stCondLst>
-                                        </p:cTn>
-                                        <p:tgtEl>
-                                          <p:spTgt spid="173">
-                                            <p:txEl>
-                                              <p:pRg st="5" end="5"/>
-                                            </p:txEl>
-                                          </p:spTgt>
-                                        </p:tgtEl>
-                                        <p:attrNameLst>
-                                          <p:attrName>style.visibility</p:attrName>
-                                        </p:attrNameLst>
-                                      </p:cBhvr>
-                                      <p:to>
-                                        <p:strVal val="visible"/>
-                                      </p:to>
-                                    </p:set>
-                                    <p:animEffect transition="in" filter="fade">
-                                      <p:cBhvr>
-                                        <p:cTn id="19" dur="1000"/>
-                                        <p:tgtEl>
-                                          <p:spTgt spid="173">
-                                            <p:txEl>
-                                              <p:pRg st="5" end="5"/>
-                                            </p:txEl>
-                                          </p:spTgt>
-                                        </p:tgtEl>
-                                      </p:cBhvr>
-                                    </p:animEffect>
-                                  </p:childTnLst>
-                                </p:cTn>
-                              </p:par>
-                            </p:childTnLst>
-                          </p:cTn>
-                        </p:par>
-                      </p:childTnLst>
-                    </p:cTn>
-                  </p:par>
-                </p:childTnLst>
-              </p:cTn>
-              <p:prevCondLst>
-                <p:cond evt="onPrev" delay="0">
-                  <p:tgtEl>
-                    <p:sldTgt/>
-                  </p:tgtEl>
-                </p:cond>
-              </p:prevCondLst>
-              <p:nextCondLst>
-                <p:cond evt="onNext" delay="0">
-                  <p:tgtEl>
-                    <p:sldTgt/>
-                  </p:tgtEl>
-                </p:cond>
-              </p:nextCondLst>
-            </p:seq>
-          </p:childTnLst>
-        </p:cTn>
-      </p:par>
-    </p:tnLst>
-  </p:timing>
-</p:sld>
-</file>
-
-<file path=ppt/slides/slide30.xml><?xml version="1.0" encoding="utf-8"?>
+<file path=ppt/slides/slide31.xml><?xml version="1.0" encoding="utf-8"?>
 <p:sld xmlns:a="http://schemas.openxmlformats.org/drawingml/2006/main" xmlns:r="http://schemas.openxmlformats.org/officeDocument/2006/relationships" xmlns:p="http://schemas.openxmlformats.org/presentationml/2006/main">
   <p:cSld>
     <p:spTree>
@@ -42587,7 +43205,7 @@
 </p:sld>
 </file>
 
-<file path=ppt/slides/slide31.xml><?xml version="1.0" encoding="utf-8"?>
+<file path=ppt/slides/slide32.xml><?xml version="1.0" encoding="utf-8"?>
 <p:sld xmlns:a="http://schemas.openxmlformats.org/drawingml/2006/main" xmlns:r="http://schemas.openxmlformats.org/officeDocument/2006/relationships" xmlns:p="http://schemas.openxmlformats.org/presentationml/2006/main">
   <p:cSld>
     <p:spTree>
@@ -43828,7 +44446,7 @@
 </p:sld>
 </file>
 
-<file path=ppt/slides/slide32.xml><?xml version="1.0" encoding="utf-8"?>
+<file path=ppt/slides/slide33.xml><?xml version="1.0" encoding="utf-8"?>
 <p:sld xmlns:a="http://schemas.openxmlformats.org/drawingml/2006/main" xmlns:r="http://schemas.openxmlformats.org/officeDocument/2006/relationships" xmlns:p="http://schemas.openxmlformats.org/presentationml/2006/main">
   <p:cSld>
     <p:spTree>
@@ -44287,7 +44905,7 @@
 </p:sld>
 </file>
 
-<file path=ppt/slides/slide33.xml><?xml version="1.0" encoding="utf-8"?>
+<file path=ppt/slides/slide34.xml><?xml version="1.0" encoding="utf-8"?>
 <p:sld xmlns:a="http://schemas.openxmlformats.org/drawingml/2006/main" xmlns:r="http://schemas.openxmlformats.org/officeDocument/2006/relationships" xmlns:p="http://schemas.openxmlformats.org/presentationml/2006/main">
   <p:cSld>
     <p:spTree>
@@ -45568,7 +46186,7 @@
 </p:sld>
 </file>
 
-<file path=ppt/slides/slide34.xml><?xml version="1.0" encoding="utf-8"?>
+<file path=ppt/slides/slide35.xml><?xml version="1.0" encoding="utf-8"?>
 <p:sld xmlns:a="http://schemas.openxmlformats.org/drawingml/2006/main" xmlns:r="http://schemas.openxmlformats.org/officeDocument/2006/relationships" xmlns:p="http://schemas.openxmlformats.org/presentationml/2006/main">
   <p:cSld>
     <p:spTree>
@@ -46262,7 +46880,7 @@
 </p:sld>
 </file>
 
-<file path=ppt/slides/slide35.xml><?xml version="1.0" encoding="utf-8"?>
+<file path=ppt/slides/slide36.xml><?xml version="1.0" encoding="utf-8"?>
 <p:sld xmlns:a="http://schemas.openxmlformats.org/drawingml/2006/main" xmlns:r="http://schemas.openxmlformats.org/officeDocument/2006/relationships" xmlns:p="http://schemas.openxmlformats.org/presentationml/2006/main">
   <p:cSld>
     <p:spTree>
@@ -46340,7 +46958,7 @@
 </p:sld>
 </file>
 
-<file path=ppt/slides/slide36.xml><?xml version="1.0" encoding="utf-8"?>
+<file path=ppt/slides/slide37.xml><?xml version="1.0" encoding="utf-8"?>
 <p:sld xmlns:a="http://schemas.openxmlformats.org/drawingml/2006/main" xmlns:r="http://schemas.openxmlformats.org/officeDocument/2006/relationships" xmlns:p="http://schemas.openxmlformats.org/presentationml/2006/main">
   <p:cSld>
     <p:spTree>
@@ -46418,7 +47036,7 @@
 </p:sld>
 </file>
 
-<file path=ppt/slides/slide37.xml><?xml version="1.0" encoding="utf-8"?>
+<file path=ppt/slides/slide38.xml><?xml version="1.0" encoding="utf-8"?>
 <p:sld xmlns:a="http://schemas.openxmlformats.org/drawingml/2006/main" xmlns:r="http://schemas.openxmlformats.org/officeDocument/2006/relationships" xmlns:p="http://schemas.openxmlformats.org/presentationml/2006/main">
   <p:cSld>
     <p:spTree>
@@ -46625,7 +47243,7 @@
 </p:sld>
 </file>
 
-<file path=ppt/slides/slide38.xml><?xml version="1.0" encoding="utf-8"?>
+<file path=ppt/slides/slide39.xml><?xml version="1.0" encoding="utf-8"?>
 <p:sld xmlns:a="http://schemas.openxmlformats.org/drawingml/2006/main" xmlns:r="http://schemas.openxmlformats.org/officeDocument/2006/relationships" xmlns:p="http://schemas.openxmlformats.org/presentationml/2006/main">
   <p:cSld>
     <p:spTree>
@@ -46773,8 +47391,8 @@
         </p:nvSpPr>
         <p:spPr>
           <a:xfrm>
-            <a:off x="4572000" y="2286000"/>
-            <a:ext cx="4343400" cy="1234440"/>
+            <a:off x="4572000" y="294468"/>
+            <a:ext cx="4343400" cy="4773478"/>
           </a:xfrm>
           <a:prstGeom prst="rect">
             <a:avLst/>
@@ -46813,7 +47431,7 @@
                   <a:schemeClr val="tx1"/>
                 </a:solidFill>
               </a:rPr>
-              <a:t>Available Brightcove REST APIs</a:t>
+              <a:t>Add functionality NOT available by default</a:t>
             </a:r>
             <a:endParaRPr dirty="0">
               <a:solidFill>
@@ -46827,7 +47445,7 @@
                 <a:spcPct val="90000"/>
               </a:lnSpc>
               <a:spcBef>
-                <a:spcPts val="1800"/>
+                <a:spcPts val="600"/>
               </a:spcBef>
               <a:spcAft>
                 <a:spcPts val="0"/>
@@ -46845,7 +47463,75 @@
                   <a:schemeClr val="tx1"/>
                 </a:solidFill>
               </a:rPr>
-              <a:t>Common Use Cases</a:t>
+              <a:t>Use cases</a:t>
+            </a:r>
+          </a:p>
+          <a:p>
+            <a:pPr marL="742950" lvl="1" indent="-285750">
+              <a:spcBef>
+                <a:spcPts val="600"/>
+              </a:spcBef>
+              <a:buFont typeface="Arial" panose="020B0604020202020204" pitchFamily="34" charset="0"/>
+              <a:buChar char="•"/>
+            </a:pPr>
+            <a:r>
+              <a:rPr lang="en-US" dirty="0">
+                <a:solidFill>
+                  <a:schemeClr val="tx1"/>
+                </a:solidFill>
+              </a:rPr>
+              <a:t>Create a “download video” button </a:t>
+            </a:r>
+          </a:p>
+          <a:p>
+            <a:pPr marL="742950" lvl="1" indent="-285750">
+              <a:spcBef>
+                <a:spcPts val="600"/>
+              </a:spcBef>
+              <a:buFont typeface="Arial" panose="020B0604020202020204" pitchFamily="34" charset="0"/>
+              <a:buChar char="•"/>
+            </a:pPr>
+            <a:r>
+              <a:rPr lang="en-US" dirty="0">
+                <a:solidFill>
+                  <a:schemeClr val="tx1"/>
+                </a:solidFill>
+              </a:rPr>
+              <a:t>Searching to build custom reports/playlists</a:t>
+            </a:r>
+          </a:p>
+          <a:p>
+            <a:pPr marL="742950" lvl="1" indent="-285750">
+              <a:spcBef>
+                <a:spcPts val="600"/>
+              </a:spcBef>
+              <a:buFont typeface="Arial" panose="020B0604020202020204" pitchFamily="34" charset="0"/>
+              <a:buChar char="•"/>
+            </a:pPr>
+            <a:r>
+              <a:rPr lang="en-US" dirty="0">
+                <a:solidFill>
+                  <a:schemeClr val="tx1"/>
+                </a:solidFill>
+              </a:rPr>
+              <a:t>Combine functionality from multiple REST APIs</a:t>
+            </a:r>
+          </a:p>
+          <a:p>
+            <a:pPr marL="742950" lvl="1" indent="-285750">
+              <a:spcBef>
+                <a:spcPts val="600"/>
+              </a:spcBef>
+              <a:buFont typeface="Arial" panose="020B0604020202020204" pitchFamily="34" charset="0"/>
+              <a:buChar char="•"/>
+            </a:pPr>
+            <a:r>
+              <a:rPr lang="en-US" dirty="0">
+                <a:solidFill>
+                  <a:schemeClr val="tx1"/>
+                </a:solidFill>
+              </a:rPr>
+              <a:t>Retrieve data from REST API and display in player</a:t>
             </a:r>
             <a:endParaRPr dirty="0">
               <a:solidFill>
@@ -46877,7 +47563,7 @@
                   <a:schemeClr val="tx1"/>
                 </a:solidFill>
               </a:rPr>
-              <a:t>Examples</a:t>
+              <a:t>Demonstration of examples</a:t>
             </a:r>
             <a:endParaRPr dirty="0">
               <a:solidFill>
@@ -46887,16 +47573,535 @@
           </a:p>
         </p:txBody>
       </p:sp>
+    </p:spTree>
+    <p:extLst>
+      <p:ext uri="{BB962C8B-B14F-4D97-AF65-F5344CB8AC3E}">
+        <p14:creationId xmlns:p14="http://schemas.microsoft.com/office/powerpoint/2010/main" val="2352787803"/>
+      </p:ext>
+    </p:extLst>
+  </p:cSld>
+  <p:clrMapOvr>
+    <a:masterClrMapping/>
+  </p:clrMapOvr>
+  <p:timing>
+    <p:tnLst>
+      <p:par>
+        <p:cTn id="1" dur="indefinite" restart="never" nodeType="tmRoot">
+          <p:childTnLst>
+            <p:seq concurrent="1" nextAc="seek">
+              <p:cTn id="2" dur="indefinite" nodeType="mainSeq">
+                <p:childTnLst>
+                  <p:par>
+                    <p:cTn id="3" fill="hold">
+                      <p:stCondLst>
+                        <p:cond delay="indefinite"/>
+                        <p:cond evt="onBegin" delay="0">
+                          <p:tn val="2"/>
+                        </p:cond>
+                      </p:stCondLst>
+                      <p:childTnLst>
+                        <p:par>
+                          <p:cTn id="4" fill="hold">
+                            <p:stCondLst>
+                              <p:cond delay="0"/>
+                            </p:stCondLst>
+                            <p:childTnLst>
+                              <p:par>
+                                <p:cTn id="5" presetID="10" presetClass="entr" presetSubtype="0" fill="hold" nodeType="withEffect">
+                                  <p:stCondLst>
+                                    <p:cond delay="0"/>
+                                  </p:stCondLst>
+                                  <p:childTnLst>
+                                    <p:set>
+                                      <p:cBhvr>
+                                        <p:cTn id="6" dur="1" fill="hold">
+                                          <p:stCondLst>
+                                            <p:cond delay="0"/>
+                                          </p:stCondLst>
+                                        </p:cTn>
+                                        <p:tgtEl>
+                                          <p:spTgt spid="173">
+                                            <p:txEl>
+                                              <p:pRg st="1" end="1"/>
+                                            </p:txEl>
+                                          </p:spTgt>
+                                        </p:tgtEl>
+                                        <p:attrNameLst>
+                                          <p:attrName>style.visibility</p:attrName>
+                                        </p:attrNameLst>
+                                      </p:cBhvr>
+                                      <p:to>
+                                        <p:strVal val="visible"/>
+                                      </p:to>
+                                    </p:set>
+                                    <p:animEffect transition="in" filter="fade">
+                                      <p:cBhvr>
+                                        <p:cTn id="7" dur="1000"/>
+                                        <p:tgtEl>
+                                          <p:spTgt spid="173">
+                                            <p:txEl>
+                                              <p:pRg st="1" end="1"/>
+                                            </p:txEl>
+                                          </p:spTgt>
+                                        </p:tgtEl>
+                                      </p:cBhvr>
+                                    </p:animEffect>
+                                  </p:childTnLst>
+                                </p:cTn>
+                              </p:par>
+                              <p:par>
+                                <p:cTn id="8" presetID="10" presetClass="entr" presetSubtype="0" fill="hold" nodeType="withEffect">
+                                  <p:stCondLst>
+                                    <p:cond delay="0"/>
+                                  </p:stCondLst>
+                                  <p:childTnLst>
+                                    <p:set>
+                                      <p:cBhvr>
+                                        <p:cTn id="9" dur="1" fill="hold">
+                                          <p:stCondLst>
+                                            <p:cond delay="0"/>
+                                          </p:stCondLst>
+                                        </p:cTn>
+                                        <p:tgtEl>
+                                          <p:spTgt spid="173">
+                                            <p:txEl>
+                                              <p:pRg st="3" end="3"/>
+                                            </p:txEl>
+                                          </p:spTgt>
+                                        </p:tgtEl>
+                                        <p:attrNameLst>
+                                          <p:attrName>style.visibility</p:attrName>
+                                        </p:attrNameLst>
+                                      </p:cBhvr>
+                                      <p:to>
+                                        <p:strVal val="visible"/>
+                                      </p:to>
+                                    </p:set>
+                                    <p:animEffect transition="in" filter="fade">
+                                      <p:cBhvr>
+                                        <p:cTn id="10" dur="1000"/>
+                                        <p:tgtEl>
+                                          <p:spTgt spid="173">
+                                            <p:txEl>
+                                              <p:pRg st="3" end="3"/>
+                                            </p:txEl>
+                                          </p:spTgt>
+                                        </p:tgtEl>
+                                      </p:cBhvr>
+                                    </p:animEffect>
+                                  </p:childTnLst>
+                                </p:cTn>
+                              </p:par>
+                              <p:par>
+                                <p:cTn id="11" presetID="10" presetClass="entr" presetSubtype="0" fill="hold" nodeType="withEffect">
+                                  <p:stCondLst>
+                                    <p:cond delay="0"/>
+                                  </p:stCondLst>
+                                  <p:childTnLst>
+                                    <p:set>
+                                      <p:cBhvr>
+                                        <p:cTn id="12" dur="1" fill="hold">
+                                          <p:stCondLst>
+                                            <p:cond delay="0"/>
+                                          </p:stCondLst>
+                                        </p:cTn>
+                                        <p:tgtEl>
+                                          <p:spTgt spid="173">
+                                            <p:txEl>
+                                              <p:pRg st="2" end="2"/>
+                                            </p:txEl>
+                                          </p:spTgt>
+                                        </p:tgtEl>
+                                        <p:attrNameLst>
+                                          <p:attrName>style.visibility</p:attrName>
+                                        </p:attrNameLst>
+                                      </p:cBhvr>
+                                      <p:to>
+                                        <p:strVal val="visible"/>
+                                      </p:to>
+                                    </p:set>
+                                    <p:animEffect transition="in" filter="fade">
+                                      <p:cBhvr>
+                                        <p:cTn id="13" dur="1000"/>
+                                        <p:tgtEl>
+                                          <p:spTgt spid="173">
+                                            <p:txEl>
+                                              <p:pRg st="2" end="2"/>
+                                            </p:txEl>
+                                          </p:spTgt>
+                                        </p:tgtEl>
+                                      </p:cBhvr>
+                                    </p:animEffect>
+                                  </p:childTnLst>
+                                </p:cTn>
+                              </p:par>
+                              <p:par>
+                                <p:cTn id="14" presetID="10" presetClass="entr" presetSubtype="0" fill="hold" nodeType="withEffect">
+                                  <p:stCondLst>
+                                    <p:cond delay="0"/>
+                                  </p:stCondLst>
+                                  <p:childTnLst>
+                                    <p:set>
+                                      <p:cBhvr>
+                                        <p:cTn id="15" dur="1" fill="hold">
+                                          <p:stCondLst>
+                                            <p:cond delay="0"/>
+                                          </p:stCondLst>
+                                        </p:cTn>
+                                        <p:tgtEl>
+                                          <p:spTgt spid="173">
+                                            <p:txEl>
+                                              <p:pRg st="4" end="4"/>
+                                            </p:txEl>
+                                          </p:spTgt>
+                                        </p:tgtEl>
+                                        <p:attrNameLst>
+                                          <p:attrName>style.visibility</p:attrName>
+                                        </p:attrNameLst>
+                                      </p:cBhvr>
+                                      <p:to>
+                                        <p:strVal val="visible"/>
+                                      </p:to>
+                                    </p:set>
+                                    <p:animEffect transition="in" filter="fade">
+                                      <p:cBhvr>
+                                        <p:cTn id="16" dur="1000"/>
+                                        <p:tgtEl>
+                                          <p:spTgt spid="173">
+                                            <p:txEl>
+                                              <p:pRg st="4" end="4"/>
+                                            </p:txEl>
+                                          </p:spTgt>
+                                        </p:tgtEl>
+                                      </p:cBhvr>
+                                    </p:animEffect>
+                                  </p:childTnLst>
+                                </p:cTn>
+                              </p:par>
+                              <p:par>
+                                <p:cTn id="17" presetID="10" presetClass="entr" presetSubtype="0" fill="hold" nodeType="withEffect">
+                                  <p:stCondLst>
+                                    <p:cond delay="0"/>
+                                  </p:stCondLst>
+                                  <p:childTnLst>
+                                    <p:set>
+                                      <p:cBhvr>
+                                        <p:cTn id="18" dur="1" fill="hold">
+                                          <p:stCondLst>
+                                            <p:cond delay="0"/>
+                                          </p:stCondLst>
+                                        </p:cTn>
+                                        <p:tgtEl>
+                                          <p:spTgt spid="173">
+                                            <p:txEl>
+                                              <p:pRg st="5" end="5"/>
+                                            </p:txEl>
+                                          </p:spTgt>
+                                        </p:tgtEl>
+                                        <p:attrNameLst>
+                                          <p:attrName>style.visibility</p:attrName>
+                                        </p:attrNameLst>
+                                      </p:cBhvr>
+                                      <p:to>
+                                        <p:strVal val="visible"/>
+                                      </p:to>
+                                    </p:set>
+                                    <p:animEffect transition="in" filter="fade">
+                                      <p:cBhvr>
+                                        <p:cTn id="19" dur="1000"/>
+                                        <p:tgtEl>
+                                          <p:spTgt spid="173">
+                                            <p:txEl>
+                                              <p:pRg st="5" end="5"/>
+                                            </p:txEl>
+                                          </p:spTgt>
+                                        </p:tgtEl>
+                                      </p:cBhvr>
+                                    </p:animEffect>
+                                  </p:childTnLst>
+                                </p:cTn>
+                              </p:par>
+                              <p:par>
+                                <p:cTn id="20" presetID="10" presetClass="entr" presetSubtype="0" fill="hold" nodeType="withEffect">
+                                  <p:stCondLst>
+                                    <p:cond delay="0"/>
+                                  </p:stCondLst>
+                                  <p:childTnLst>
+                                    <p:set>
+                                      <p:cBhvr>
+                                        <p:cTn id="21" dur="1" fill="hold">
+                                          <p:stCondLst>
+                                            <p:cond delay="0"/>
+                                          </p:stCondLst>
+                                        </p:cTn>
+                                        <p:tgtEl>
+                                          <p:spTgt spid="173">
+                                            <p:txEl>
+                                              <p:pRg st="0" end="0"/>
+                                            </p:txEl>
+                                          </p:spTgt>
+                                        </p:tgtEl>
+                                        <p:attrNameLst>
+                                          <p:attrName>style.visibility</p:attrName>
+                                        </p:attrNameLst>
+                                      </p:cBhvr>
+                                      <p:to>
+                                        <p:strVal val="visible"/>
+                                      </p:to>
+                                    </p:set>
+                                    <p:animEffect transition="in" filter="fade">
+                                      <p:cBhvr>
+                                        <p:cTn id="22" dur="1000"/>
+                                        <p:tgtEl>
+                                          <p:spTgt spid="173">
+                                            <p:txEl>
+                                              <p:pRg st="0" end="0"/>
+                                            </p:txEl>
+                                          </p:spTgt>
+                                        </p:tgtEl>
+                                      </p:cBhvr>
+                                    </p:animEffect>
+                                  </p:childTnLst>
+                                </p:cTn>
+                              </p:par>
+                              <p:par>
+                                <p:cTn id="23" presetID="10" presetClass="entr" presetSubtype="0" fill="hold" nodeType="withEffect">
+                                  <p:stCondLst>
+                                    <p:cond delay="0"/>
+                                  </p:stCondLst>
+                                  <p:childTnLst>
+                                    <p:set>
+                                      <p:cBhvr>
+                                        <p:cTn id="24" dur="1" fill="hold">
+                                          <p:stCondLst>
+                                            <p:cond delay="0"/>
+                                          </p:stCondLst>
+                                        </p:cTn>
+                                        <p:tgtEl>
+                                          <p:spTgt spid="173">
+                                            <p:txEl>
+                                              <p:pRg st="6" end="6"/>
+                                            </p:txEl>
+                                          </p:spTgt>
+                                        </p:tgtEl>
+                                        <p:attrNameLst>
+                                          <p:attrName>style.visibility</p:attrName>
+                                        </p:attrNameLst>
+                                      </p:cBhvr>
+                                      <p:to>
+                                        <p:strVal val="visible"/>
+                                      </p:to>
+                                    </p:set>
+                                    <p:animEffect transition="in" filter="fade">
+                                      <p:cBhvr>
+                                        <p:cTn id="25" dur="1000"/>
+                                        <p:tgtEl>
+                                          <p:spTgt spid="173">
+                                            <p:txEl>
+                                              <p:pRg st="6" end="6"/>
+                                            </p:txEl>
+                                          </p:spTgt>
+                                        </p:tgtEl>
+                                      </p:cBhvr>
+                                    </p:animEffect>
+                                  </p:childTnLst>
+                                </p:cTn>
+                              </p:par>
+                            </p:childTnLst>
+                          </p:cTn>
+                        </p:par>
+                      </p:childTnLst>
+                    </p:cTn>
+                  </p:par>
+                </p:childTnLst>
+              </p:cTn>
+              <p:prevCondLst>
+                <p:cond evt="onPrev" delay="0">
+                  <p:tgtEl>
+                    <p:sldTgt/>
+                  </p:tgtEl>
+                </p:cond>
+              </p:prevCondLst>
+              <p:nextCondLst>
+                <p:cond evt="onNext" delay="0">
+                  <p:tgtEl>
+                    <p:sldTgt/>
+                  </p:tgtEl>
+                </p:cond>
+              </p:nextCondLst>
+            </p:seq>
+          </p:childTnLst>
+        </p:cTn>
+      </p:par>
+    </p:tnLst>
+  </p:timing>
+</p:sld>
+</file>
+
+<file path=ppt/slides/slide5.xml><?xml version="1.0" encoding="utf-8"?>
+<p:sld xmlns:a="http://schemas.openxmlformats.org/drawingml/2006/main" xmlns:r="http://schemas.openxmlformats.org/officeDocument/2006/relationships" xmlns:p="http://schemas.openxmlformats.org/presentationml/2006/main">
+  <p:cSld>
+    <p:spTree>
+      <p:nvGrpSpPr>
+        <p:cNvPr id="1" name="Shape 171"/>
+        <p:cNvGrpSpPr/>
+        <p:nvPr/>
+      </p:nvGrpSpPr>
+      <p:grpSpPr>
+        <a:xfrm>
+          <a:off x="0" y="0"/>
+          <a:ext cx="0" cy="0"/>
+          <a:chOff x="0" y="0"/>
+          <a:chExt cx="0" cy="0"/>
+        </a:xfrm>
+      </p:grpSpPr>
       <p:sp>
         <p:nvSpPr>
-          <p:cNvPr id="3" name="Text Placeholder 2">
-            <a:extLst>
-              <a:ext uri="{FF2B5EF4-FFF2-40B4-BE49-F238E27FC236}">
-                <a16:creationId xmlns:a16="http://schemas.microsoft.com/office/drawing/2014/main" id="{4D486E3D-6809-0F46-9B46-4D674AB04813}"/>
-              </a:ext>
-            </a:extLst>
-          </p:cNvPr>
-          <p:cNvSpPr>
+          <p:cNvPr id="172" name="Google Shape;172;p6"/>
+          <p:cNvSpPr txBox="1">
+            <a:spLocks noGrp="1"/>
+          </p:cNvSpPr>
+          <p:nvPr>
+            <p:ph type="body" idx="1"/>
+          </p:nvPr>
+        </p:nvSpPr>
+        <p:spPr>
+          <a:xfrm>
+            <a:off x="91440" y="1828800"/>
+            <a:ext cx="4114800" cy="1225296"/>
+          </a:xfrm>
+          <a:prstGeom prst="rect">
+            <a:avLst/>
+          </a:prstGeom>
+          <a:noFill/>
+          <a:ln>
+            <a:noFill/>
+          </a:ln>
+        </p:spPr>
+        <p:txBody>
+          <a:bodyPr spcFirstLastPara="1" wrap="square" lIns="91425" tIns="45700" rIns="91425" bIns="45700" anchor="t" anchorCtr="0">
+            <a:noAutofit/>
+          </a:bodyPr>
+          <a:lstStyle/>
+          <a:p>
+            <a:pPr marL="0" lvl="0" indent="0"/>
+            <a:r>
+              <a:rPr lang="en-US" dirty="0"/>
+              <a:t>High Level Implementation View</a:t>
+            </a:r>
+          </a:p>
+          <a:p>
+            <a:pPr marL="0" lvl="0" indent="0"/>
+            <a:endParaRPr lang="en-US" dirty="0"/>
+          </a:p>
+        </p:txBody>
+      </p:sp>
+      <p:sp>
+        <p:nvSpPr>
+          <p:cNvPr id="173" name="Google Shape;173;p6"/>
+          <p:cNvSpPr txBox="1">
+            <a:spLocks noGrp="1"/>
+          </p:cNvSpPr>
+          <p:nvPr>
+            <p:ph type="body" idx="2"/>
+          </p:nvPr>
+        </p:nvSpPr>
+        <p:spPr>
+          <a:xfrm>
+            <a:off x="4572000" y="970968"/>
+            <a:ext cx="4343400" cy="2549472"/>
+          </a:xfrm>
+          <a:prstGeom prst="rect">
+            <a:avLst/>
+          </a:prstGeom>
+          <a:noFill/>
+          <a:ln>
+            <a:noFill/>
+          </a:ln>
+        </p:spPr>
+        <p:txBody>
+          <a:bodyPr spcFirstLastPara="1" wrap="square" lIns="91425" tIns="45700" rIns="91425" bIns="45700" anchor="t" anchorCtr="0">
+            <a:noAutofit/>
+          </a:bodyPr>
+          <a:lstStyle/>
+          <a:p>
+            <a:pPr marL="285750" lvl="0" indent="-285750" algn="l" rtl="0">
+              <a:lnSpc>
+                <a:spcPct val="90000"/>
+              </a:lnSpc>
+              <a:spcBef>
+                <a:spcPts val="0"/>
+              </a:spcBef>
+              <a:spcAft>
+                <a:spcPts val="0"/>
+              </a:spcAft>
+              <a:buClr>
+                <a:srgbClr val="949595"/>
+              </a:buClr>
+              <a:buSzPts val="1600"/>
+              <a:buFont typeface="Arial" panose="020B0604020202020204" pitchFamily="34" charset="0"/>
+              <a:buChar char="•"/>
+            </a:pPr>
+            <a:r>
+              <a:rPr lang="en-US" dirty="0"/>
+              <a:t>The Main “Players”</a:t>
+            </a:r>
+            <a:endParaRPr dirty="0"/>
+          </a:p>
+          <a:p>
+            <a:pPr marL="285750" lvl="0" indent="-285750" algn="l" rtl="0">
+              <a:lnSpc>
+                <a:spcPct val="90000"/>
+              </a:lnSpc>
+              <a:spcBef>
+                <a:spcPts val="1800"/>
+              </a:spcBef>
+              <a:spcAft>
+                <a:spcPts val="0"/>
+              </a:spcAft>
+              <a:buClr>
+                <a:srgbClr val="949595"/>
+              </a:buClr>
+              <a:buSzPts val="1600"/>
+              <a:buFont typeface="Arial" panose="020B0604020202020204" pitchFamily="34" charset="0"/>
+              <a:buChar char="•"/>
+            </a:pPr>
+            <a:r>
+              <a:rPr lang="en-US" dirty="0"/>
+              <a:t>Point 2 – Example supporting copy.</a:t>
+            </a:r>
+            <a:endParaRPr dirty="0"/>
+          </a:p>
+          <a:p>
+            <a:pPr marL="285750" lvl="0" indent="-285750" algn="l" rtl="0">
+              <a:lnSpc>
+                <a:spcPct val="90000"/>
+              </a:lnSpc>
+              <a:spcBef>
+                <a:spcPts val="1800"/>
+              </a:spcBef>
+              <a:spcAft>
+                <a:spcPts val="0"/>
+              </a:spcAft>
+              <a:buClr>
+                <a:srgbClr val="949595"/>
+              </a:buClr>
+              <a:buSzPts val="1600"/>
+              <a:buFont typeface="Arial" panose="020B0604020202020204" pitchFamily="34" charset="0"/>
+              <a:buChar char="•"/>
+            </a:pPr>
+            <a:r>
+              <a:rPr lang="en-US" dirty="0"/>
+              <a:t>Point 3 – Example supporting copy.</a:t>
+            </a:r>
+            <a:endParaRPr dirty="0"/>
+          </a:p>
+        </p:txBody>
+      </p:sp>
+      <p:sp>
+        <p:nvSpPr>
+          <p:cNvPr id="174" name="Google Shape;174;p6"/>
+          <p:cNvSpPr txBox="1">
             <a:spLocks noGrp="1"/>
           </p:cNvSpPr>
           <p:nvPr>
@@ -46905,25 +48110,51 @@
         </p:nvSpPr>
         <p:spPr>
           <a:xfrm>
-            <a:off x="4572000" y="1508760"/>
-            <a:ext cx="4343400" cy="413030"/>
+            <a:off x="4494508" y="330888"/>
+            <a:ext cx="4343400" cy="640080"/>
           </a:xfrm>
+          <a:prstGeom prst="rect">
+            <a:avLst/>
+          </a:prstGeom>
+          <a:noFill/>
+          <a:ln>
+            <a:noFill/>
+          </a:ln>
         </p:spPr>
         <p:txBody>
-          <a:bodyPr/>
+          <a:bodyPr spcFirstLastPara="1" wrap="square" lIns="91425" tIns="45700" rIns="91425" bIns="45700" anchor="t" anchorCtr="0">
+            <a:noAutofit/>
+          </a:bodyPr>
           <a:lstStyle/>
           <a:p>
+            <a:pPr marL="0" lvl="0" indent="0" algn="l" rtl="0">
+              <a:lnSpc>
+                <a:spcPct val="90000"/>
+              </a:lnSpc>
+              <a:spcBef>
+                <a:spcPts val="0"/>
+              </a:spcBef>
+              <a:spcAft>
+                <a:spcPts val="0"/>
+              </a:spcAft>
+              <a:buClr>
+                <a:srgbClr val="22C2EB"/>
+              </a:buClr>
+              <a:buSzPts val="2200"/>
+              <a:buNone/>
+            </a:pPr>
             <a:r>
               <a:rPr lang="en-US" dirty="0"/>
-              <a:t>Topics in this section:</a:t>
+              <a:t>Topics in this section</a:t>
             </a:r>
+            <a:endParaRPr dirty="0"/>
           </a:p>
         </p:txBody>
       </p:sp>
     </p:spTree>
     <p:extLst>
       <p:ext uri="{BB962C8B-B14F-4D97-AF65-F5344CB8AC3E}">
-        <p14:creationId xmlns:p14="http://schemas.microsoft.com/office/powerpoint/2010/main" val="2352787803"/>
+        <p14:creationId xmlns:p14="http://schemas.microsoft.com/office/powerpoint/2010/main" val="296570408"/>
       </p:ext>
     </p:extLst>
   </p:cSld>
@@ -47113,7 +48344,7 @@
 </p:sld>
 </file>
 
-<file path=ppt/slides/slide5.xml><?xml version="1.0" encoding="utf-8"?>
+<file path=ppt/slides/slide6.xml><?xml version="1.0" encoding="utf-8"?>
 <p:sld xmlns:a="http://schemas.openxmlformats.org/drawingml/2006/main" xmlns:r="http://schemas.openxmlformats.org/officeDocument/2006/relationships" xmlns:p="http://schemas.openxmlformats.org/presentationml/2006/main">
   <p:cSld>
     <p:spTree>
@@ -47161,7 +48392,11 @@
           <a:p>
             <a:r>
               <a:rPr lang="en-US" b="0" dirty="0"/>
-              <a:t>Available Brightcove REST APIs</a:t>
+              <a:t>The Main </a:t>
+            </a:r>
+            <a:r>
+              <a:rPr lang="en-US" b="0"/>
+              <a:t>“Players”</a:t>
             </a:r>
             <a:endParaRPr lang="en-US" dirty="0"/>
           </a:p>
@@ -47592,7 +48827,7 @@
 </p:sld>
 </file>
 
-<file path=ppt/slides/slide6.xml><?xml version="1.0" encoding="utf-8"?>
+<file path=ppt/slides/slide7.xml><?xml version="1.0" encoding="utf-8"?>
 <p:sld xmlns:a="http://schemas.openxmlformats.org/drawingml/2006/main" xmlns:r="http://schemas.openxmlformats.org/officeDocument/2006/relationships" xmlns:p="http://schemas.openxmlformats.org/presentationml/2006/main">
   <p:cSld>
     <p:spTree>
@@ -47706,502 +48941,6 @@
 </p:sld>
 </file>
 
-<file path=ppt/slides/slide7.xml><?xml version="1.0" encoding="utf-8"?>
-<p:sld xmlns:a="http://schemas.openxmlformats.org/drawingml/2006/main" xmlns:r="http://schemas.openxmlformats.org/officeDocument/2006/relationships" xmlns:p="http://schemas.openxmlformats.org/presentationml/2006/main">
-  <p:cSld>
-    <p:spTree>
-      <p:nvGrpSpPr>
-        <p:cNvPr id="1" name="Shape 210"/>
-        <p:cNvGrpSpPr/>
-        <p:nvPr/>
-      </p:nvGrpSpPr>
-      <p:grpSpPr>
-        <a:xfrm>
-          <a:off x="0" y="0"/>
-          <a:ext cx="0" cy="0"/>
-          <a:chOff x="0" y="0"/>
-          <a:chExt cx="0" cy="0"/>
-        </a:xfrm>
-      </p:grpSpPr>
-      <p:sp>
-        <p:nvSpPr>
-          <p:cNvPr id="211" name="Google Shape;211;p11"/>
-          <p:cNvSpPr txBox="1">
-            <a:spLocks noGrp="1"/>
-          </p:cNvSpPr>
-          <p:nvPr>
-            <p:ph type="title"/>
-          </p:nvPr>
-        </p:nvSpPr>
-        <p:spPr>
-          <a:xfrm>
-            <a:off x="292608" y="365760"/>
-            <a:ext cx="8204454" cy="342163"/>
-          </a:xfrm>
-          <a:prstGeom prst="rect">
-            <a:avLst/>
-          </a:prstGeom>
-          <a:noFill/>
-          <a:ln>
-            <a:noFill/>
-          </a:ln>
-        </p:spPr>
-        <p:txBody>
-          <a:bodyPr spcFirstLastPara="1" wrap="square" lIns="91425" tIns="45700" rIns="91425" bIns="45700" anchor="t" anchorCtr="0">
-            <a:noAutofit/>
-          </a:bodyPr>
-          <a:lstStyle/>
-          <a:p>
-            <a:pPr marL="0" lvl="0" indent="0" algn="l" rtl="0">
-              <a:lnSpc>
-                <a:spcPct val="90000"/>
-              </a:lnSpc>
-              <a:spcBef>
-                <a:spcPts val="0"/>
-              </a:spcBef>
-              <a:spcAft>
-                <a:spcPts val="0"/>
-              </a:spcAft>
-              <a:buClr>
-                <a:srgbClr val="22C2EB"/>
-              </a:buClr>
-              <a:buSzPts val="2200"/>
-              <a:buFont typeface="Montserrat ExtraBold"/>
-              <a:buNone/>
-            </a:pPr>
-            <a:r>
-              <a:rPr lang="en-US"/>
-              <a:t>CLICK TO ADD MAIN TITLE</a:t>
-            </a:r>
-            <a:endParaRPr/>
-          </a:p>
-        </p:txBody>
-      </p:sp>
-      <p:sp>
-        <p:nvSpPr>
-          <p:cNvPr id="212" name="Google Shape;212;p11"/>
-          <p:cNvSpPr txBox="1">
-            <a:spLocks noGrp="1"/>
-          </p:cNvSpPr>
-          <p:nvPr>
-            <p:ph type="body" idx="1"/>
-          </p:nvPr>
-        </p:nvSpPr>
-        <p:spPr>
-          <a:xfrm>
-            <a:off x="310896" y="834607"/>
-            <a:ext cx="8204454" cy="1934719"/>
-          </a:xfrm>
-          <a:prstGeom prst="rect">
-            <a:avLst/>
-          </a:prstGeom>
-          <a:noFill/>
-          <a:ln>
-            <a:noFill/>
-          </a:ln>
-        </p:spPr>
-        <p:txBody>
-          <a:bodyPr spcFirstLastPara="1" wrap="square" lIns="91425" tIns="45700" rIns="91425" bIns="45700" anchor="t" anchorCtr="0">
-            <a:noAutofit/>
-          </a:bodyPr>
-          <a:lstStyle/>
-          <a:p>
-            <a:pPr marL="102870" lvl="0" indent="-102870" algn="l" rtl="0">
-              <a:lnSpc>
-                <a:spcPct val="90000"/>
-              </a:lnSpc>
-              <a:spcBef>
-                <a:spcPts val="0"/>
-              </a:spcBef>
-              <a:spcAft>
-                <a:spcPts val="0"/>
-              </a:spcAft>
-              <a:buClr>
-                <a:srgbClr val="949595"/>
-              </a:buClr>
-              <a:buSzPts val="1400"/>
-              <a:buFont typeface="Arial"/>
-              <a:buChar char="•"/>
-            </a:pPr>
-            <a:r>
-              <a:rPr lang="en-US"/>
-              <a:t>Supporting copy here.</a:t>
-            </a:r>
-            <a:endParaRPr/>
-          </a:p>
-          <a:p>
-            <a:pPr marL="448056" lvl="1" indent="-173735" algn="l" rtl="0">
-              <a:lnSpc>
-                <a:spcPct val="90000"/>
-              </a:lnSpc>
-              <a:spcBef>
-                <a:spcPts val="375"/>
-              </a:spcBef>
-              <a:spcAft>
-                <a:spcPts val="0"/>
-              </a:spcAft>
-              <a:buClr>
-                <a:srgbClr val="949595"/>
-              </a:buClr>
-              <a:buSzPts val="980"/>
-              <a:buChar char="◦"/>
-            </a:pPr>
-            <a:r>
-              <a:rPr lang="en-US"/>
-              <a:t>Secondary copy here.</a:t>
-            </a:r>
-            <a:endParaRPr/>
-          </a:p>
-          <a:p>
-            <a:pPr marL="813816" lvl="2" indent="-173736" algn="l" rtl="0">
-              <a:lnSpc>
-                <a:spcPct val="90000"/>
-              </a:lnSpc>
-              <a:spcBef>
-                <a:spcPts val="375"/>
-              </a:spcBef>
-              <a:spcAft>
-                <a:spcPts val="0"/>
-              </a:spcAft>
-              <a:buClr>
-                <a:srgbClr val="949595"/>
-              </a:buClr>
-              <a:buSzPts val="1400"/>
-              <a:buChar char="•"/>
-            </a:pPr>
-            <a:r>
-              <a:rPr lang="en-US"/>
-              <a:t>Third-level copy here.</a:t>
-            </a:r>
-            <a:endParaRPr/>
-          </a:p>
-          <a:p>
-            <a:pPr marL="1179576" lvl="3" indent="-173736" algn="l" rtl="0">
-              <a:lnSpc>
-                <a:spcPct val="90000"/>
-              </a:lnSpc>
-              <a:spcBef>
-                <a:spcPts val="375"/>
-              </a:spcBef>
-              <a:spcAft>
-                <a:spcPts val="0"/>
-              </a:spcAft>
-              <a:buClr>
-                <a:srgbClr val="949595"/>
-              </a:buClr>
-              <a:buSzPts val="1400"/>
-              <a:buChar char="•"/>
-            </a:pPr>
-            <a:r>
-              <a:rPr lang="en-US"/>
-              <a:t>Fourth-level copy here.</a:t>
-            </a:r>
-            <a:endParaRPr/>
-          </a:p>
-          <a:p>
-            <a:pPr marL="1545336" lvl="4" indent="-173736" algn="l" rtl="0">
-              <a:lnSpc>
-                <a:spcPct val="90000"/>
-              </a:lnSpc>
-              <a:spcBef>
-                <a:spcPts val="375"/>
-              </a:spcBef>
-              <a:spcAft>
-                <a:spcPts val="0"/>
-              </a:spcAft>
-              <a:buClr>
-                <a:srgbClr val="949595"/>
-              </a:buClr>
-              <a:buSzPts val="1400"/>
-              <a:buChar char="•"/>
-            </a:pPr>
-            <a:r>
-              <a:rPr lang="en-US"/>
-              <a:t>Fifth-level copy here.</a:t>
-            </a:r>
-            <a:endParaRPr/>
-          </a:p>
-        </p:txBody>
-      </p:sp>
-    </p:spTree>
-    <p:extLst>
-      <p:ext uri="{BB962C8B-B14F-4D97-AF65-F5344CB8AC3E}">
-        <p14:creationId xmlns:p14="http://schemas.microsoft.com/office/powerpoint/2010/main" val="3894065865"/>
-      </p:ext>
-    </p:extLst>
-  </p:cSld>
-  <p:clrMapOvr>
-    <a:masterClrMapping/>
-  </p:clrMapOvr>
-  <p:timing>
-    <p:tnLst>
-      <p:par>
-        <p:cTn id="1" dur="indefinite" restart="never" nodeType="tmRoot">
-          <p:childTnLst>
-            <p:seq concurrent="1" nextAc="seek">
-              <p:cTn id="2" dur="indefinite" nodeType="mainSeq">
-                <p:childTnLst>
-                  <p:par>
-                    <p:cTn id="3" fill="hold">
-                      <p:stCondLst>
-                        <p:cond delay="indefinite"/>
-                        <p:cond evt="onBegin" delay="0">
-                          <p:tn val="2"/>
-                        </p:cond>
-                      </p:stCondLst>
-                      <p:childTnLst>
-                        <p:par>
-                          <p:cTn id="4" fill="hold">
-                            <p:stCondLst>
-                              <p:cond delay="0"/>
-                            </p:stCondLst>
-                            <p:childTnLst>
-                              <p:par>
-                                <p:cTn id="5" presetID="10" presetClass="entr" presetSubtype="0" fill="hold" nodeType="withEffect">
-                                  <p:stCondLst>
-                                    <p:cond delay="0"/>
-                                  </p:stCondLst>
-                                  <p:childTnLst>
-                                    <p:set>
-                                      <p:cBhvr>
-                                        <p:cTn id="6" dur="1" fill="hold">
-                                          <p:stCondLst>
-                                            <p:cond delay="0"/>
-                                          </p:stCondLst>
-                                        </p:cTn>
-                                        <p:tgtEl>
-                                          <p:spTgt spid="212">
-                                            <p:txEl>
-                                              <p:pRg st="0" end="0"/>
-                                            </p:txEl>
-                                          </p:spTgt>
-                                        </p:tgtEl>
-                                        <p:attrNameLst>
-                                          <p:attrName>style.visibility</p:attrName>
-                                        </p:attrNameLst>
-                                      </p:cBhvr>
-                                      <p:to>
-                                        <p:strVal val="visible"/>
-                                      </p:to>
-                                    </p:set>
-                                    <p:animEffect transition="in" filter="fade">
-                                      <p:cBhvr>
-                                        <p:cTn id="7" dur="1000"/>
-                                        <p:tgtEl>
-                                          <p:spTgt spid="212">
-                                            <p:txEl>
-                                              <p:pRg st="0" end="0"/>
-                                            </p:txEl>
-                                          </p:spTgt>
-                                        </p:tgtEl>
-                                      </p:cBhvr>
-                                    </p:animEffect>
-                                  </p:childTnLst>
-                                </p:cTn>
-                              </p:par>
-                              <p:par>
-                                <p:cTn id="8" presetID="10" presetClass="entr" presetSubtype="0" fill="hold" nodeType="withEffect">
-                                  <p:stCondLst>
-                                    <p:cond delay="0"/>
-                                  </p:stCondLst>
-                                  <p:childTnLst>
-                                    <p:set>
-                                      <p:cBhvr>
-                                        <p:cTn id="9" dur="1" fill="hold">
-                                          <p:stCondLst>
-                                            <p:cond delay="0"/>
-                                          </p:stCondLst>
-                                        </p:cTn>
-                                        <p:tgtEl>
-                                          <p:spTgt spid="212">
-                                            <p:txEl>
-                                              <p:pRg st="1" end="1"/>
-                                            </p:txEl>
-                                          </p:spTgt>
-                                        </p:tgtEl>
-                                        <p:attrNameLst>
-                                          <p:attrName>style.visibility</p:attrName>
-                                        </p:attrNameLst>
-                                      </p:cBhvr>
-                                      <p:to>
-                                        <p:strVal val="visible"/>
-                                      </p:to>
-                                    </p:set>
-                                    <p:animEffect transition="in" filter="fade">
-                                      <p:cBhvr>
-                                        <p:cTn id="10" dur="1000"/>
-                                        <p:tgtEl>
-                                          <p:spTgt spid="212">
-                                            <p:txEl>
-                                              <p:pRg st="1" end="1"/>
-                                            </p:txEl>
-                                          </p:spTgt>
-                                        </p:tgtEl>
-                                      </p:cBhvr>
-                                    </p:animEffect>
-                                  </p:childTnLst>
-                                </p:cTn>
-                              </p:par>
-                              <p:par>
-                                <p:cTn id="11" presetID="10" presetClass="entr" presetSubtype="0" fill="hold" nodeType="withEffect">
-                                  <p:stCondLst>
-                                    <p:cond delay="0"/>
-                                  </p:stCondLst>
-                                  <p:childTnLst>
-                                    <p:set>
-                                      <p:cBhvr>
-                                        <p:cTn id="12" dur="1" fill="hold">
-                                          <p:stCondLst>
-                                            <p:cond delay="0"/>
-                                          </p:stCondLst>
-                                        </p:cTn>
-                                        <p:tgtEl>
-                                          <p:spTgt spid="212">
-                                            <p:txEl>
-                                              <p:pRg st="2" end="2"/>
-                                            </p:txEl>
-                                          </p:spTgt>
-                                        </p:tgtEl>
-                                        <p:attrNameLst>
-                                          <p:attrName>style.visibility</p:attrName>
-                                        </p:attrNameLst>
-                                      </p:cBhvr>
-                                      <p:to>
-                                        <p:strVal val="visible"/>
-                                      </p:to>
-                                    </p:set>
-                                    <p:animEffect transition="in" filter="fade">
-                                      <p:cBhvr>
-                                        <p:cTn id="13" dur="1000"/>
-                                        <p:tgtEl>
-                                          <p:spTgt spid="212">
-                                            <p:txEl>
-                                              <p:pRg st="2" end="2"/>
-                                            </p:txEl>
-                                          </p:spTgt>
-                                        </p:tgtEl>
-                                      </p:cBhvr>
-                                    </p:animEffect>
-                                  </p:childTnLst>
-                                </p:cTn>
-                              </p:par>
-                              <p:par>
-                                <p:cTn id="14" presetID="10" presetClass="entr" presetSubtype="0" fill="hold" nodeType="withEffect">
-                                  <p:stCondLst>
-                                    <p:cond delay="0"/>
-                                  </p:stCondLst>
-                                  <p:childTnLst>
-                                    <p:set>
-                                      <p:cBhvr>
-                                        <p:cTn id="15" dur="1" fill="hold">
-                                          <p:stCondLst>
-                                            <p:cond delay="0"/>
-                                          </p:stCondLst>
-                                        </p:cTn>
-                                        <p:tgtEl>
-                                          <p:spTgt spid="212">
-                                            <p:txEl>
-                                              <p:pRg st="3" end="3"/>
-                                            </p:txEl>
-                                          </p:spTgt>
-                                        </p:tgtEl>
-                                        <p:attrNameLst>
-                                          <p:attrName>style.visibility</p:attrName>
-                                        </p:attrNameLst>
-                                      </p:cBhvr>
-                                      <p:to>
-                                        <p:strVal val="visible"/>
-                                      </p:to>
-                                    </p:set>
-                                    <p:animEffect transition="in" filter="fade">
-                                      <p:cBhvr>
-                                        <p:cTn id="16" dur="1000"/>
-                                        <p:tgtEl>
-                                          <p:spTgt spid="212">
-                                            <p:txEl>
-                                              <p:pRg st="3" end="3"/>
-                                            </p:txEl>
-                                          </p:spTgt>
-                                        </p:tgtEl>
-                                      </p:cBhvr>
-                                    </p:animEffect>
-                                  </p:childTnLst>
-                                </p:cTn>
-                              </p:par>
-                              <p:par>
-                                <p:cTn id="17" presetID="10" presetClass="entr" presetSubtype="0" fill="hold" nodeType="withEffect">
-                                  <p:stCondLst>
-                                    <p:cond delay="0"/>
-                                  </p:stCondLst>
-                                  <p:childTnLst>
-                                    <p:set>
-                                      <p:cBhvr>
-                                        <p:cTn id="18" dur="1" fill="hold">
-                                          <p:stCondLst>
-                                            <p:cond delay="0"/>
-                                          </p:stCondLst>
-                                        </p:cTn>
-                                        <p:tgtEl>
-                                          <p:spTgt spid="212">
-                                            <p:txEl>
-                                              <p:pRg st="4" end="4"/>
-                                            </p:txEl>
-                                          </p:spTgt>
-                                        </p:tgtEl>
-                                        <p:attrNameLst>
-                                          <p:attrName>style.visibility</p:attrName>
-                                        </p:attrNameLst>
-                                      </p:cBhvr>
-                                      <p:to>
-                                        <p:strVal val="visible"/>
-                                      </p:to>
-                                    </p:set>
-                                    <p:animEffect transition="in" filter="fade">
-                                      <p:cBhvr>
-                                        <p:cTn id="19" dur="1000"/>
-                                        <p:tgtEl>
-                                          <p:spTgt spid="212">
-                                            <p:txEl>
-                                              <p:pRg st="4" end="4"/>
-                                            </p:txEl>
-                                          </p:spTgt>
-                                        </p:tgtEl>
-                                      </p:cBhvr>
-                                    </p:animEffect>
-                                  </p:childTnLst>
-                                </p:cTn>
-                              </p:par>
-                            </p:childTnLst>
-                          </p:cTn>
-                        </p:par>
-                      </p:childTnLst>
-                    </p:cTn>
-                  </p:par>
-                </p:childTnLst>
-              </p:cTn>
-              <p:prevCondLst>
-                <p:cond evt="onPrev" delay="0">
-                  <p:tgtEl>
-                    <p:sldTgt/>
-                  </p:tgtEl>
-                </p:cond>
-              </p:prevCondLst>
-              <p:nextCondLst>
-                <p:cond evt="onNext" delay="0">
-                  <p:tgtEl>
-                    <p:sldTgt/>
-                  </p:tgtEl>
-                </p:cond>
-              </p:nextCondLst>
-            </p:seq>
-          </p:childTnLst>
-        </p:cTn>
-      </p:par>
-    </p:tnLst>
-  </p:timing>
-</p:sld>
-</file>
-
 <file path=ppt/slides/slide8.xml><?xml version="1.0" encoding="utf-8"?>
 <p:sld xmlns:a="http://schemas.openxmlformats.org/drawingml/2006/main" xmlns:r="http://schemas.openxmlformats.org/officeDocument/2006/relationships" xmlns:p="http://schemas.openxmlformats.org/presentationml/2006/main">
   <p:cSld>
@@ -48422,7 +49161,7 @@
     </p:spTree>
     <p:extLst>
       <p:ext uri="{BB962C8B-B14F-4D97-AF65-F5344CB8AC3E}">
-        <p14:creationId xmlns:p14="http://schemas.microsoft.com/office/powerpoint/2010/main" val="1475947230"/>
+        <p14:creationId xmlns:p14="http://schemas.microsoft.com/office/powerpoint/2010/main" val="3894065865"/>
       </p:ext>
     </p:extLst>
   </p:cSld>
@@ -48918,7 +49657,7 @@
     </p:spTree>
     <p:extLst>
       <p:ext uri="{BB962C8B-B14F-4D97-AF65-F5344CB8AC3E}">
-        <p14:creationId xmlns:p14="http://schemas.microsoft.com/office/powerpoint/2010/main" val="2524564217"/>
+        <p14:creationId xmlns:p14="http://schemas.microsoft.com/office/powerpoint/2010/main" val="1475947230"/>
       </p:ext>
     </p:extLst>
   </p:cSld>

</xml_diff>

<commit_message>
Updates to PLAY preso
</commit_message>
<xml_diff>
--- a/PLAYTV2020/rest-apis-intro.pptx
+++ b/PLAYTV2020/rest-apis-intro.pptx
@@ -48043,10 +48043,18 @@
               <a:buChar char="•"/>
             </a:pPr>
             <a:r>
-              <a:rPr lang="en-US" dirty="0"/>
+              <a:rPr lang="en-US" dirty="0">
+                <a:solidFill>
+                  <a:schemeClr val="tx1"/>
+                </a:solidFill>
+              </a:rPr>
               <a:t>The Main “Players”</a:t>
             </a:r>
-            <a:endParaRPr dirty="0"/>
+            <a:endParaRPr dirty="0">
+              <a:solidFill>
+                <a:schemeClr val="tx1"/>
+              </a:solidFill>
+            </a:endParaRPr>
           </a:p>
           <a:p>
             <a:pPr marL="285750" lvl="0" indent="-285750" algn="l" rtl="0">
@@ -48067,10 +48075,18 @@
               <a:buChar char="•"/>
             </a:pPr>
             <a:r>
-              <a:rPr lang="en-US" dirty="0"/>
-              <a:t>Point 2 – Example supporting copy.</a:t>
+              <a:rPr lang="en-US" dirty="0">
+                <a:solidFill>
+                  <a:schemeClr val="tx1"/>
+                </a:solidFill>
+              </a:rPr>
+              <a:t>Diagram with Emphasis on Asynchronous Behavior</a:t>
             </a:r>
-            <a:endParaRPr dirty="0"/>
+            <a:endParaRPr dirty="0">
+              <a:solidFill>
+                <a:schemeClr val="tx1"/>
+              </a:solidFill>
+            </a:endParaRPr>
           </a:p>
           <a:p>
             <a:pPr marL="285750" lvl="0" indent="-285750" algn="l" rtl="0">
@@ -48091,10 +48107,18 @@
               <a:buChar char="•"/>
             </a:pPr>
             <a:r>
-              <a:rPr lang="en-US" dirty="0"/>
+              <a:rPr lang="en-US" dirty="0">
+                <a:solidFill>
+                  <a:schemeClr val="tx1"/>
+                </a:solidFill>
+              </a:rPr>
               <a:t>Point 3 – Example supporting copy.</a:t>
             </a:r>
-            <a:endParaRPr dirty="0"/>
+            <a:endParaRPr dirty="0">
+              <a:solidFill>
+                <a:schemeClr val="tx1"/>
+              </a:solidFill>
+            </a:endParaRPr>
           </a:p>
         </p:txBody>
       </p:sp>
@@ -48392,11 +48416,7 @@
           <a:p>
             <a:r>
               <a:rPr lang="en-US" b="0" dirty="0"/>
-              <a:t>The Main </a:t>
-            </a:r>
-            <a:r>
-              <a:rPr lang="en-US" b="0"/>
-              <a:t>“Players”</a:t>
+              <a:t>The Main “Players”</a:t>
             </a:r>
             <a:endParaRPr lang="en-US" dirty="0"/>
           </a:p>
@@ -48873,27 +48893,21 @@
           </a:bodyPr>
           <a:lstStyle/>
           <a:p>
-            <a:pPr marL="0" lvl="0" indent="0" algn="l" rtl="0">
-              <a:lnSpc>
-                <a:spcPct val="90000"/>
-              </a:lnSpc>
-              <a:spcBef>
-                <a:spcPts val="0"/>
-              </a:spcBef>
-              <a:spcAft>
-                <a:spcPts val="0"/>
-              </a:spcAft>
-              <a:buClr>
-                <a:srgbClr val="22C2EB"/>
-              </a:buClr>
-              <a:buSzPts val="2200"/>
-              <a:buFont typeface="Montserrat ExtraBold"/>
-              <a:buNone/>
-            </a:pPr>
             <a:r>
+              <a:rPr lang="en-US" b="0" dirty="0"/>
+              <a:t>Diagram </a:t>
+            </a:r>
+            <a:r>
+              <a:rPr lang="en-US" b="0"/>
+              <a:t>- Note </a:t>
+            </a:r>
+            <a:r>
+              <a:rPr lang="en-US" b="0" dirty="0"/>
+              <a:t>Asynchronous Behavior</a:t>
+            </a:r>
+            <a:br>
               <a:rPr lang="en-US" dirty="0"/>
-              <a:t>High Level Overview</a:t>
-            </a:r>
+            </a:br>
             <a:endParaRPr dirty="0"/>
           </a:p>
         </p:txBody>

</xml_diff>